<commit_message>
add screenshots and updates to presentation
</commit_message>
<xml_diff>
--- a/github_demo_11082016.pptx
+++ b/github_demo_11082016.pptx
@@ -8,12 +8,17 @@
     <p:sldId id="256" r:id="rId2"/>
     <p:sldId id="257" r:id="rId3"/>
     <p:sldId id="258" r:id="rId4"/>
-    <p:sldId id="259" r:id="rId5"/>
-    <p:sldId id="260" r:id="rId6"/>
+    <p:sldId id="265" r:id="rId5"/>
+    <p:sldId id="259" r:id="rId6"/>
     <p:sldId id="262" r:id="rId7"/>
     <p:sldId id="263" r:id="rId8"/>
     <p:sldId id="264" r:id="rId9"/>
-    <p:sldId id="261" r:id="rId10"/>
+    <p:sldId id="260" r:id="rId10"/>
+    <p:sldId id="268" r:id="rId11"/>
+    <p:sldId id="266" r:id="rId12"/>
+    <p:sldId id="267" r:id="rId13"/>
+    <p:sldId id="269" r:id="rId14"/>
+    <p:sldId id="261" r:id="rId15"/>
   </p:sldIdLst>
   <p:sldSz cx="10080625" cy="7559675"/>
   <p:notesSz cx="7772400" cy="10058400"/>
@@ -112,6 +117,11 @@
       </a:defRPr>
     </a:lvl9pPr>
   </p:defaultTextStyle>
+  <p:extLst>
+    <p:ext uri="{EFAFB233-063F-42B5-8137-9DF3F51BA10A}">
+      <p15:sldGuideLst xmlns:p15="http://schemas.microsoft.com/office/powerpoint/2012/main"/>
+    </p:ext>
+  </p:extLst>
 </p:presentation>
 </file>
 
@@ -2519,6 +2529,20 @@
               <a:buChar char="•"/>
             </a:pPr>
             <a:r>
+              <a:rPr lang="en-US" sz="3600" b="0" strike="noStrike" spc="-1" dirty="0" smtClean="0">
+                <a:solidFill>
+                  <a:srgbClr val="000000"/>
+                </a:solidFill>
+                <a:uFill>
+                  <a:solidFill>
+                    <a:srgbClr val="FFFFFF"/>
+                  </a:solidFill>
+                </a:uFill>
+                <a:latin typeface="Arial"/>
+              </a:rPr>
+              <a:t>What is </a:t>
+            </a:r>
+            <a:r>
               <a:rPr lang="en-US" sz="3600" b="0" strike="noStrike" spc="-1" dirty="0" err="1" smtClean="0">
                 <a:solidFill>
                   <a:srgbClr val="000000"/>
@@ -2544,22 +2568,19 @@
                 </a:uFill>
                 <a:latin typeface="Arial"/>
               </a:rPr>
-              <a:t> </a:t>
-            </a:r>
-            <a:r>
-              <a:rPr lang="en-US" sz="3600" b="0" strike="noStrike" spc="-1" dirty="0">
-                <a:solidFill>
-                  <a:srgbClr val="000000"/>
-                </a:solidFill>
-                <a:uFill>
-                  <a:solidFill>
-                    <a:srgbClr val="FFFFFF"/>
-                  </a:solidFill>
-                </a:uFill>
-                <a:latin typeface="Arial"/>
-              </a:rPr>
-              <a:t>(the language) </a:t>
-            </a:r>
+              <a:t>? </a:t>
+            </a:r>
+            <a:endParaRPr lang="en-US" sz="3600" b="0" strike="noStrike" spc="-1" dirty="0">
+              <a:solidFill>
+                <a:srgbClr val="000000"/>
+              </a:solidFill>
+              <a:uFill>
+                <a:solidFill>
+                  <a:srgbClr val="FFFFFF"/>
+                </a:solidFill>
+              </a:uFill>
+              <a:latin typeface="Arial"/>
+            </a:endParaRPr>
           </a:p>
           <a:p>
             <a:pPr marL="571500" indent="-571500">
@@ -2598,6 +2619,37 @@
               <a:buChar char="•"/>
             </a:pPr>
             <a:r>
+              <a:rPr lang="en-US" sz="3600" spc="-1" dirty="0" smtClean="0">
+                <a:solidFill>
+                  <a:srgbClr val="000000"/>
+                </a:solidFill>
+                <a:uFill>
+                  <a:solidFill>
+                    <a:srgbClr val="FFFFFF"/>
+                  </a:solidFill>
+                </a:uFill>
+                <a:latin typeface="Arial"/>
+              </a:rPr>
+              <a:t>GitHub Example</a:t>
+            </a:r>
+            <a:endParaRPr lang="en-US" sz="3600" b="0" strike="noStrike" spc="-1" dirty="0" smtClean="0">
+              <a:solidFill>
+                <a:srgbClr val="000000"/>
+              </a:solidFill>
+              <a:uFill>
+                <a:solidFill>
+                  <a:srgbClr val="FFFFFF"/>
+                </a:solidFill>
+              </a:uFill>
+              <a:latin typeface="Arial"/>
+            </a:endParaRPr>
+          </a:p>
+          <a:p>
+            <a:pPr marL="571500" indent="-571500">
+              <a:buFont typeface="Arial" panose="020B0604020202020204" pitchFamily="34" charset="0"/>
+              <a:buChar char="•"/>
+            </a:pPr>
+            <a:r>
               <a:rPr lang="en-US" sz="3600" b="0" strike="noStrike" spc="-1" dirty="0" smtClean="0">
                 <a:solidFill>
                   <a:srgbClr val="000000"/>
@@ -2624,6 +2676,921 @@
                 <a:latin typeface="Arial"/>
               </a:rPr>
               <a:t>of repositories</a:t>
+            </a:r>
+          </a:p>
+        </p:txBody>
+      </p:sp>
+    </p:spTree>
+  </p:cSld>
+  <p:clrMapOvr>
+    <a:masterClrMapping/>
+  </p:clrMapOvr>
+  <p:timing>
+    <p:tnLst>
+      <p:par>
+        <p:cTn id="1" dur="indefinite" restart="never" nodeType="tmRoot">
+          <p:childTnLst>
+            <p:seq>
+              <p:cTn id="2" nodeType="mainSeq"/>
+              <p:prevCondLst>
+                <p:cond evt="onPrev" delay="0">
+                  <p:tgtEl>
+                    <p:sldTgt/>
+                  </p:tgtEl>
+                </p:cond>
+              </p:prevCondLst>
+              <p:nextCondLst>
+                <p:cond evt="onNext" delay="0">
+                  <p:tgtEl>
+                    <p:sldTgt/>
+                  </p:tgtEl>
+                </p:cond>
+              </p:nextCondLst>
+            </p:seq>
+          </p:childTnLst>
+        </p:cTn>
+      </p:par>
+    </p:tnLst>
+  </p:timing>
+</p:sld>
+</file>
+
+<file path=ppt/slides/slide10.xml><?xml version="1.0" encoding="utf-8"?>
+<p:sld xmlns:a="http://schemas.openxmlformats.org/drawingml/2006/main" xmlns:r="http://schemas.openxmlformats.org/officeDocument/2006/relationships" xmlns:p="http://schemas.openxmlformats.org/presentationml/2006/main">
+  <p:cSld>
+    <p:spTree>
+      <p:nvGrpSpPr>
+        <p:cNvPr id="1" name=""/>
+        <p:cNvGrpSpPr/>
+        <p:nvPr/>
+      </p:nvGrpSpPr>
+      <p:grpSpPr>
+        <a:xfrm>
+          <a:off x="0" y="0"/>
+          <a:ext cx="0" cy="0"/>
+          <a:chOff x="0" y="0"/>
+          <a:chExt cx="0" cy="0"/>
+        </a:xfrm>
+      </p:grpSpPr>
+      <p:sp>
+        <p:nvSpPr>
+          <p:cNvPr id="2" name="Title 1"/>
+          <p:cNvSpPr>
+            <a:spLocks noGrp="1"/>
+          </p:cNvSpPr>
+          <p:nvPr>
+            <p:ph type="title"/>
+          </p:nvPr>
+        </p:nvSpPr>
+        <p:spPr/>
+        <p:txBody>
+          <a:bodyPr/>
+          <a:lstStyle/>
+          <a:p>
+            <a:pPr algn="ctr"/>
+            <a:r>
+              <a:rPr lang="en-US" dirty="0" smtClean="0"/>
+              <a:t>GitHub Lingo: Repositories</a:t>
+            </a:r>
+            <a:endParaRPr lang="en-US" dirty="0"/>
+          </a:p>
+        </p:txBody>
+      </p:sp>
+      <p:sp>
+        <p:nvSpPr>
+          <p:cNvPr id="3" name="Text Placeholder 2"/>
+          <p:cNvSpPr>
+            <a:spLocks noGrp="1"/>
+          </p:cNvSpPr>
+          <p:nvPr>
+            <p:ph type="body"/>
+          </p:nvPr>
+        </p:nvSpPr>
+        <p:spPr/>
+        <p:txBody>
+          <a:bodyPr/>
+          <a:lstStyle/>
+          <a:p>
+            <a:r>
+              <a:rPr lang="en-US" sz="2400" spc="-1" dirty="0" smtClean="0">
+                <a:solidFill>
+                  <a:srgbClr val="000000"/>
+                </a:solidFill>
+                <a:uFill>
+                  <a:solidFill>
+                    <a:srgbClr val="FFFFFF"/>
+                  </a:solidFill>
+                </a:uFill>
+              </a:rPr>
+              <a:t>A </a:t>
+            </a:r>
+            <a:r>
+              <a:rPr lang="en-US" sz="2400" b="1" spc="-1" dirty="0" smtClean="0">
+                <a:solidFill>
+                  <a:schemeClr val="accent2">
+                    <a:lumMod val="75000"/>
+                  </a:schemeClr>
+                </a:solidFill>
+                <a:uFill>
+                  <a:solidFill>
+                    <a:srgbClr val="FFFFFF"/>
+                  </a:solidFill>
+                </a:uFill>
+              </a:rPr>
+              <a:t>repository</a:t>
+            </a:r>
+            <a:r>
+              <a:rPr lang="en-US" sz="2400" spc="-1" dirty="0" smtClean="0">
+                <a:solidFill>
+                  <a:schemeClr val="accent2">
+                    <a:lumMod val="75000"/>
+                  </a:schemeClr>
+                </a:solidFill>
+                <a:uFill>
+                  <a:solidFill>
+                    <a:srgbClr val="FFFFFF"/>
+                  </a:solidFill>
+                </a:uFill>
+              </a:rPr>
+              <a:t> (</a:t>
+            </a:r>
+            <a:r>
+              <a:rPr lang="en-US" sz="2400" b="1" spc="-1" dirty="0" smtClean="0">
+                <a:solidFill>
+                  <a:schemeClr val="accent2">
+                    <a:lumMod val="75000"/>
+                  </a:schemeClr>
+                </a:solidFill>
+                <a:uFill>
+                  <a:solidFill>
+                    <a:srgbClr val="FFFFFF"/>
+                  </a:solidFill>
+                </a:uFill>
+              </a:rPr>
+              <a:t>“repo”</a:t>
+            </a:r>
+            <a:r>
+              <a:rPr lang="en-US" sz="2400" spc="-1" dirty="0" smtClean="0">
+                <a:solidFill>
+                  <a:schemeClr val="accent2">
+                    <a:lumMod val="75000"/>
+                  </a:schemeClr>
+                </a:solidFill>
+                <a:uFill>
+                  <a:solidFill>
+                    <a:srgbClr val="FFFFFF"/>
+                  </a:solidFill>
+                </a:uFill>
+              </a:rPr>
+              <a:t>)</a:t>
+            </a:r>
+            <a:r>
+              <a:rPr lang="en-US" sz="2400" b="1" spc="-1" dirty="0" smtClean="0">
+                <a:solidFill>
+                  <a:schemeClr val="accent2">
+                    <a:lumMod val="75000"/>
+                  </a:schemeClr>
+                </a:solidFill>
+                <a:uFill>
+                  <a:solidFill>
+                    <a:srgbClr val="FFFFFF"/>
+                  </a:solidFill>
+                </a:uFill>
+              </a:rPr>
+              <a:t> </a:t>
+            </a:r>
+            <a:r>
+              <a:rPr lang="en-US" sz="2400" spc="-1" dirty="0" smtClean="0">
+                <a:solidFill>
+                  <a:srgbClr val="000000"/>
+                </a:solidFill>
+                <a:uFill>
+                  <a:solidFill>
+                    <a:srgbClr val="FFFFFF"/>
+                  </a:solidFill>
+                </a:uFill>
+              </a:rPr>
+              <a:t>is </a:t>
+            </a:r>
+            <a:r>
+              <a:rPr lang="en-US" sz="2400" spc="-1" dirty="0">
+                <a:solidFill>
+                  <a:srgbClr val="000000"/>
+                </a:solidFill>
+                <a:uFill>
+                  <a:solidFill>
+                    <a:srgbClr val="FFFFFF"/>
+                  </a:solidFill>
+                </a:uFill>
+              </a:rPr>
+              <a:t>the name for the folder where the files you are tracking are </a:t>
+            </a:r>
+            <a:r>
+              <a:rPr lang="en-US" sz="2400" spc="-1" dirty="0" smtClean="0">
+                <a:solidFill>
+                  <a:srgbClr val="000000"/>
+                </a:solidFill>
+                <a:uFill>
+                  <a:solidFill>
+                    <a:srgbClr val="FFFFFF"/>
+                  </a:solidFill>
+                </a:uFill>
+              </a:rPr>
+              <a:t>hosted, both saved on your computer </a:t>
+            </a:r>
+            <a:r>
+              <a:rPr lang="en-US" sz="2400" spc="-1" dirty="0" smtClean="0">
+                <a:solidFill>
+                  <a:schemeClr val="accent2">
+                    <a:lumMod val="75000"/>
+                  </a:schemeClr>
+                </a:solidFill>
+                <a:uFill>
+                  <a:solidFill>
+                    <a:srgbClr val="FFFFFF"/>
+                  </a:solidFill>
+                </a:uFill>
+              </a:rPr>
+              <a:t>(</a:t>
+            </a:r>
+            <a:r>
+              <a:rPr lang="en-US" sz="2400" b="1" spc="-1" dirty="0" smtClean="0">
+                <a:solidFill>
+                  <a:schemeClr val="accent2">
+                    <a:lumMod val="75000"/>
+                  </a:schemeClr>
+                </a:solidFill>
+                <a:uFill>
+                  <a:solidFill>
+                    <a:srgbClr val="FFFFFF"/>
+                  </a:solidFill>
+                </a:uFill>
+              </a:rPr>
+              <a:t>local</a:t>
+            </a:r>
+            <a:r>
+              <a:rPr lang="en-US" sz="2400" spc="-1" dirty="0" smtClean="0">
+                <a:solidFill>
+                  <a:schemeClr val="accent2">
+                    <a:lumMod val="75000"/>
+                  </a:schemeClr>
+                </a:solidFill>
+                <a:uFill>
+                  <a:solidFill>
+                    <a:srgbClr val="FFFFFF"/>
+                  </a:solidFill>
+                </a:uFill>
+              </a:rPr>
+              <a:t>) </a:t>
+            </a:r>
+            <a:r>
+              <a:rPr lang="en-US" sz="2400" spc="-1" dirty="0" smtClean="0">
+                <a:solidFill>
+                  <a:srgbClr val="000000"/>
+                </a:solidFill>
+                <a:uFill>
+                  <a:solidFill>
+                    <a:srgbClr val="FFFFFF"/>
+                  </a:solidFill>
+                </a:uFill>
+              </a:rPr>
+              <a:t>and remote repo </a:t>
+            </a:r>
+            <a:r>
+              <a:rPr lang="en-US" sz="2400" spc="-1" dirty="0" smtClean="0">
+                <a:solidFill>
+                  <a:schemeClr val="accent1">
+                    <a:lumMod val="75000"/>
+                  </a:schemeClr>
+                </a:solidFill>
+                <a:uFill>
+                  <a:solidFill>
+                    <a:srgbClr val="FFFFFF"/>
+                  </a:solidFill>
+                </a:uFill>
+              </a:rPr>
+              <a:t>(</a:t>
+            </a:r>
+            <a:r>
+              <a:rPr lang="en-US" sz="2400" b="1" spc="-1" dirty="0" smtClean="0">
+                <a:solidFill>
+                  <a:schemeClr val="accent1">
+                    <a:lumMod val="75000"/>
+                  </a:schemeClr>
+                </a:solidFill>
+                <a:uFill>
+                  <a:solidFill>
+                    <a:srgbClr val="FFFFFF"/>
+                  </a:solidFill>
+                </a:uFill>
+              </a:rPr>
+              <a:t>GitHub</a:t>
+            </a:r>
+            <a:r>
+              <a:rPr lang="en-US" sz="2400" spc="-1" dirty="0" smtClean="0">
+                <a:solidFill>
+                  <a:schemeClr val="accent1">
+                    <a:lumMod val="75000"/>
+                  </a:schemeClr>
+                </a:solidFill>
+                <a:uFill>
+                  <a:solidFill>
+                    <a:srgbClr val="FFFFFF"/>
+                  </a:solidFill>
+                </a:uFill>
+              </a:rPr>
+              <a:t>)</a:t>
+            </a:r>
+          </a:p>
+          <a:p>
+            <a:endParaRPr lang="en-US" sz="4000" spc="-1" dirty="0" smtClean="0">
+              <a:solidFill>
+                <a:srgbClr val="000000"/>
+              </a:solidFill>
+              <a:uFill>
+                <a:solidFill>
+                  <a:srgbClr val="FFFFFF"/>
+                </a:solidFill>
+              </a:uFill>
+            </a:endParaRPr>
+          </a:p>
+          <a:p>
+            <a:endParaRPr lang="en-US" sz="4000" spc="-1" dirty="0">
+              <a:solidFill>
+                <a:srgbClr val="000000"/>
+              </a:solidFill>
+              <a:uFill>
+                <a:solidFill>
+                  <a:srgbClr val="FFFFFF"/>
+                </a:solidFill>
+              </a:uFill>
+            </a:endParaRPr>
+          </a:p>
+          <a:p>
+            <a:endParaRPr lang="en-US" dirty="0"/>
+          </a:p>
+        </p:txBody>
+      </p:sp>
+      <p:pic>
+        <p:nvPicPr>
+          <p:cNvPr id="5" name="Picture 4"/>
+          <p:cNvPicPr>
+            <a:picLocks noChangeAspect="1"/>
+          </p:cNvPicPr>
+          <p:nvPr/>
+        </p:nvPicPr>
+        <p:blipFill>
+          <a:blip r:embed="rId2" cstate="print">
+            <a:extLst>
+              <a:ext uri="{28A0092B-C50C-407E-A947-70E740481C1C}">
+                <a14:useLocalDpi xmlns:a14="http://schemas.microsoft.com/office/drawing/2010/main" val="0"/>
+              </a:ext>
+            </a:extLst>
+          </a:blip>
+          <a:stretch>
+            <a:fillRect/>
+          </a:stretch>
+        </p:blipFill>
+        <p:spPr>
+          <a:xfrm>
+            <a:off x="1133062" y="2944361"/>
+            <a:ext cx="7823390" cy="4400657"/>
+          </a:xfrm>
+          <a:prstGeom prst="rect">
+            <a:avLst/>
+          </a:prstGeom>
+        </p:spPr>
+      </p:pic>
+    </p:spTree>
+    <p:extLst>
+      <p:ext uri="{BB962C8B-B14F-4D97-AF65-F5344CB8AC3E}">
+        <p14:creationId xmlns:p14="http://schemas.microsoft.com/office/powerpoint/2010/main" val="1791308707"/>
+      </p:ext>
+    </p:extLst>
+  </p:cSld>
+  <p:clrMapOvr>
+    <a:masterClrMapping/>
+  </p:clrMapOvr>
+  <p:timing>
+    <p:tnLst>
+      <p:par>
+        <p:cTn id="1" dur="indefinite" restart="never" nodeType="tmRoot"/>
+      </p:par>
+    </p:tnLst>
+  </p:timing>
+</p:sld>
+</file>
+
+<file path=ppt/slides/slide11.xml><?xml version="1.0" encoding="utf-8"?>
+<p:sld xmlns:a="http://schemas.openxmlformats.org/drawingml/2006/main" xmlns:r="http://schemas.openxmlformats.org/officeDocument/2006/relationships" xmlns:p="http://schemas.openxmlformats.org/presentationml/2006/main">
+  <p:cSld>
+    <p:spTree>
+      <p:nvGrpSpPr>
+        <p:cNvPr id="1" name=""/>
+        <p:cNvGrpSpPr/>
+        <p:nvPr/>
+      </p:nvGrpSpPr>
+      <p:grpSpPr>
+        <a:xfrm>
+          <a:off x="0" y="0"/>
+          <a:ext cx="0" cy="0"/>
+          <a:chOff x="0" y="0"/>
+          <a:chExt cx="0" cy="0"/>
+        </a:xfrm>
+      </p:grpSpPr>
+      <p:sp>
+        <p:nvSpPr>
+          <p:cNvPr id="2" name="Title 1"/>
+          <p:cNvSpPr>
+            <a:spLocks noGrp="1"/>
+          </p:cNvSpPr>
+          <p:nvPr>
+            <p:ph type="title"/>
+          </p:nvPr>
+        </p:nvSpPr>
+        <p:spPr/>
+        <p:txBody>
+          <a:bodyPr/>
+          <a:lstStyle/>
+          <a:p>
+            <a:pPr algn="ctr"/>
+            <a:r>
+              <a:rPr lang="en-US" dirty="0" smtClean="0"/>
+              <a:t>GitHub Lingo: Initializing/Cloning</a:t>
+            </a:r>
+            <a:endParaRPr lang="en-US" dirty="0"/>
+          </a:p>
+        </p:txBody>
+      </p:sp>
+      <p:sp>
+        <p:nvSpPr>
+          <p:cNvPr id="3" name="Text Placeholder 2"/>
+          <p:cNvSpPr>
+            <a:spLocks noGrp="1"/>
+          </p:cNvSpPr>
+          <p:nvPr>
+            <p:ph type="body"/>
+          </p:nvPr>
+        </p:nvSpPr>
+        <p:spPr/>
+        <p:txBody>
+          <a:bodyPr/>
+          <a:lstStyle/>
+          <a:p>
+            <a:r>
+              <a:rPr lang="en-US" dirty="0" smtClean="0"/>
+              <a:t>To create a repo is to </a:t>
+            </a:r>
+            <a:r>
+              <a:rPr lang="en-US" b="1" dirty="0" smtClean="0">
+                <a:solidFill>
+                  <a:schemeClr val="tx2">
+                    <a:lumMod val="60000"/>
+                    <a:lumOff val="40000"/>
+                  </a:schemeClr>
+                </a:solidFill>
+              </a:rPr>
+              <a:t>initialize it</a:t>
+            </a:r>
+          </a:p>
+          <a:p>
+            <a:r>
+              <a:rPr lang="en-US" dirty="0" smtClean="0"/>
+              <a:t>To link a created repository is to </a:t>
+            </a:r>
+            <a:r>
+              <a:rPr lang="en-US" b="1" dirty="0" smtClean="0">
+                <a:solidFill>
+                  <a:schemeClr val="accent2">
+                    <a:lumMod val="75000"/>
+                  </a:schemeClr>
+                </a:solidFill>
+              </a:rPr>
+              <a:t>clone it</a:t>
+            </a:r>
+            <a:endParaRPr lang="en-US" b="1" dirty="0">
+              <a:solidFill>
+                <a:schemeClr val="accent2">
+                  <a:lumMod val="75000"/>
+                </a:schemeClr>
+              </a:solidFill>
+            </a:endParaRPr>
+          </a:p>
+        </p:txBody>
+      </p:sp>
+      <p:pic>
+        <p:nvPicPr>
+          <p:cNvPr id="5" name="Picture 4"/>
+          <p:cNvPicPr>
+            <a:picLocks noChangeAspect="1"/>
+          </p:cNvPicPr>
+          <p:nvPr/>
+        </p:nvPicPr>
+        <p:blipFill>
+          <a:blip r:embed="rId2">
+            <a:extLst>
+              <a:ext uri="{28A0092B-C50C-407E-A947-70E740481C1C}">
+                <a14:useLocalDpi xmlns:a14="http://schemas.microsoft.com/office/drawing/2010/main" val="0"/>
+              </a:ext>
+            </a:extLst>
+          </a:blip>
+          <a:stretch>
+            <a:fillRect/>
+          </a:stretch>
+        </p:blipFill>
+        <p:spPr>
+          <a:xfrm>
+            <a:off x="504000" y="2981738"/>
+            <a:ext cx="8997279" cy="3939045"/>
+          </a:xfrm>
+          <a:prstGeom prst="rect">
+            <a:avLst/>
+          </a:prstGeom>
+        </p:spPr>
+      </p:pic>
+    </p:spTree>
+    <p:extLst>
+      <p:ext uri="{BB962C8B-B14F-4D97-AF65-F5344CB8AC3E}">
+        <p14:creationId xmlns:p14="http://schemas.microsoft.com/office/powerpoint/2010/main" val="3488818745"/>
+      </p:ext>
+    </p:extLst>
+  </p:cSld>
+  <p:clrMapOvr>
+    <a:masterClrMapping/>
+  </p:clrMapOvr>
+  <p:timing>
+    <p:tnLst>
+      <p:par>
+        <p:cTn id="1" dur="indefinite" restart="never" nodeType="tmRoot"/>
+      </p:par>
+    </p:tnLst>
+  </p:timing>
+</p:sld>
+</file>
+
+<file path=ppt/slides/slide12.xml><?xml version="1.0" encoding="utf-8"?>
+<p:sld xmlns:a="http://schemas.openxmlformats.org/drawingml/2006/main" xmlns:r="http://schemas.openxmlformats.org/officeDocument/2006/relationships" xmlns:p="http://schemas.openxmlformats.org/presentationml/2006/main">
+  <p:cSld>
+    <p:spTree>
+      <p:nvGrpSpPr>
+        <p:cNvPr id="1" name=""/>
+        <p:cNvGrpSpPr/>
+        <p:nvPr/>
+      </p:nvGrpSpPr>
+      <p:grpSpPr>
+        <a:xfrm>
+          <a:off x="0" y="0"/>
+          <a:ext cx="0" cy="0"/>
+          <a:chOff x="0" y="0"/>
+          <a:chExt cx="0" cy="0"/>
+        </a:xfrm>
+      </p:grpSpPr>
+      <p:sp>
+        <p:nvSpPr>
+          <p:cNvPr id="2" name="Title 1"/>
+          <p:cNvSpPr>
+            <a:spLocks noGrp="1"/>
+          </p:cNvSpPr>
+          <p:nvPr>
+            <p:ph type="title"/>
+          </p:nvPr>
+        </p:nvSpPr>
+        <p:spPr/>
+        <p:txBody>
+          <a:bodyPr/>
+          <a:lstStyle/>
+          <a:p>
+            <a:r>
+              <a:rPr lang="en-US" dirty="0" smtClean="0"/>
+              <a:t>GitHub Lingo: Committing and Pushing Changes</a:t>
+            </a:r>
+            <a:endParaRPr lang="en-US" dirty="0"/>
+          </a:p>
+        </p:txBody>
+      </p:sp>
+      <p:sp>
+        <p:nvSpPr>
+          <p:cNvPr id="3" name="Text Placeholder 2"/>
+          <p:cNvSpPr>
+            <a:spLocks noGrp="1"/>
+          </p:cNvSpPr>
+          <p:nvPr>
+            <p:ph type="body"/>
+          </p:nvPr>
+        </p:nvSpPr>
+        <p:spPr/>
+        <p:txBody>
+          <a:bodyPr/>
+          <a:lstStyle/>
+          <a:p>
+            <a:r>
+              <a:rPr lang="en-US" dirty="0" smtClean="0"/>
+              <a:t>After creating, adding, editing, or deleting files in local repo, you </a:t>
+            </a:r>
+            <a:r>
+              <a:rPr lang="en-US" dirty="0" smtClean="0">
+                <a:solidFill>
+                  <a:schemeClr val="accent2">
+                    <a:lumMod val="75000"/>
+                  </a:schemeClr>
+                </a:solidFill>
+              </a:rPr>
+              <a:t>commit</a:t>
+            </a:r>
+            <a:r>
+              <a:rPr lang="en-US" dirty="0" smtClean="0"/>
+              <a:t> the changes and </a:t>
+            </a:r>
+            <a:r>
+              <a:rPr lang="en-US" dirty="0" smtClean="0">
+                <a:solidFill>
+                  <a:schemeClr val="accent1">
+                    <a:lumMod val="75000"/>
+                  </a:schemeClr>
+                </a:solidFill>
+              </a:rPr>
+              <a:t>push</a:t>
+            </a:r>
+            <a:r>
+              <a:rPr lang="en-US" dirty="0" smtClean="0"/>
+              <a:t> them to GitHub.</a:t>
+            </a:r>
+            <a:endParaRPr lang="en-US" dirty="0"/>
+          </a:p>
+        </p:txBody>
+      </p:sp>
+      <p:pic>
+        <p:nvPicPr>
+          <p:cNvPr id="4" name="Picture 3"/>
+          <p:cNvPicPr>
+            <a:picLocks noChangeAspect="1"/>
+          </p:cNvPicPr>
+          <p:nvPr/>
+        </p:nvPicPr>
+        <p:blipFill>
+          <a:blip r:embed="rId2" cstate="print">
+            <a:extLst>
+              <a:ext uri="{28A0092B-C50C-407E-A947-70E740481C1C}">
+                <a14:useLocalDpi xmlns:a14="http://schemas.microsoft.com/office/drawing/2010/main" val="0"/>
+              </a:ext>
+            </a:extLst>
+          </a:blip>
+          <a:stretch>
+            <a:fillRect/>
+          </a:stretch>
+        </p:blipFill>
+        <p:spPr>
+          <a:xfrm>
+            <a:off x="2233006" y="2703443"/>
+            <a:ext cx="7342634" cy="4130231"/>
+          </a:xfrm>
+          <a:prstGeom prst="rect">
+            <a:avLst/>
+          </a:prstGeom>
+        </p:spPr>
+      </p:pic>
+    </p:spTree>
+    <p:extLst>
+      <p:ext uri="{BB962C8B-B14F-4D97-AF65-F5344CB8AC3E}">
+        <p14:creationId xmlns:p14="http://schemas.microsoft.com/office/powerpoint/2010/main" val="134445378"/>
+      </p:ext>
+    </p:extLst>
+  </p:cSld>
+  <p:clrMapOvr>
+    <a:masterClrMapping/>
+  </p:clrMapOvr>
+  <p:timing>
+    <p:tnLst>
+      <p:par>
+        <p:cTn id="1" dur="indefinite" restart="never" nodeType="tmRoot"/>
+      </p:par>
+    </p:tnLst>
+  </p:timing>
+</p:sld>
+</file>
+
+<file path=ppt/slides/slide13.xml><?xml version="1.0" encoding="utf-8"?>
+<p:sld xmlns:a="http://schemas.openxmlformats.org/drawingml/2006/main" xmlns:r="http://schemas.openxmlformats.org/officeDocument/2006/relationships" xmlns:p="http://schemas.openxmlformats.org/presentationml/2006/main">
+  <p:cSld>
+    <p:spTree>
+      <p:nvGrpSpPr>
+        <p:cNvPr id="1" name=""/>
+        <p:cNvGrpSpPr/>
+        <p:nvPr/>
+      </p:nvGrpSpPr>
+      <p:grpSpPr>
+        <a:xfrm>
+          <a:off x="0" y="0"/>
+          <a:ext cx="0" cy="0"/>
+          <a:chOff x="0" y="0"/>
+          <a:chExt cx="0" cy="0"/>
+        </a:xfrm>
+      </p:grpSpPr>
+      <p:sp>
+        <p:nvSpPr>
+          <p:cNvPr id="2" name="Title 1"/>
+          <p:cNvSpPr>
+            <a:spLocks noGrp="1"/>
+          </p:cNvSpPr>
+          <p:nvPr>
+            <p:ph type="title"/>
+          </p:nvPr>
+        </p:nvSpPr>
+        <p:spPr/>
+        <p:txBody>
+          <a:bodyPr/>
+          <a:lstStyle/>
+          <a:p>
+            <a:r>
+              <a:rPr lang="en-US" dirty="0" smtClean="0"/>
+              <a:t>GitHub Lingo: Open and Close an Issue</a:t>
+            </a:r>
+            <a:endParaRPr lang="en-US" dirty="0"/>
+          </a:p>
+        </p:txBody>
+      </p:sp>
+      <p:sp>
+        <p:nvSpPr>
+          <p:cNvPr id="3" name="Text Placeholder 2"/>
+          <p:cNvSpPr>
+            <a:spLocks noGrp="1"/>
+          </p:cNvSpPr>
+          <p:nvPr>
+            <p:ph type="body"/>
+          </p:nvPr>
+        </p:nvSpPr>
+        <p:spPr/>
+        <p:txBody>
+          <a:bodyPr/>
+          <a:lstStyle/>
+          <a:p>
+            <a:r>
+              <a:rPr lang="en-US" dirty="0" smtClean="0"/>
+              <a:t>Create (</a:t>
+            </a:r>
+            <a:r>
+              <a:rPr lang="en-US" b="1" dirty="0" smtClean="0">
+                <a:solidFill>
+                  <a:schemeClr val="accent2">
+                    <a:lumMod val="75000"/>
+                  </a:schemeClr>
+                </a:solidFill>
+              </a:rPr>
+              <a:t>Open</a:t>
+            </a:r>
+            <a:r>
+              <a:rPr lang="en-US" dirty="0" smtClean="0"/>
+              <a:t>) an </a:t>
+            </a:r>
+            <a:r>
+              <a:rPr lang="en-US" b="1" dirty="0" smtClean="0"/>
+              <a:t>Issue</a:t>
+            </a:r>
+            <a:r>
+              <a:rPr lang="en-US" dirty="0" smtClean="0"/>
+              <a:t> and </a:t>
+            </a:r>
+            <a:r>
+              <a:rPr lang="en-US" b="1" dirty="0" smtClean="0">
+                <a:solidFill>
+                  <a:schemeClr val="tx2">
+                    <a:lumMod val="60000"/>
+                    <a:lumOff val="40000"/>
+                  </a:schemeClr>
+                </a:solidFill>
+              </a:rPr>
+              <a:t>close</a:t>
+            </a:r>
+            <a:r>
+              <a:rPr lang="en-US" dirty="0" smtClean="0"/>
+              <a:t> it when it is solved. You can also chat about it.</a:t>
+            </a:r>
+            <a:endParaRPr lang="en-US" dirty="0"/>
+          </a:p>
+        </p:txBody>
+      </p:sp>
+    </p:spTree>
+    <p:extLst>
+      <p:ext uri="{BB962C8B-B14F-4D97-AF65-F5344CB8AC3E}">
+        <p14:creationId xmlns:p14="http://schemas.microsoft.com/office/powerpoint/2010/main" val="13759544"/>
+      </p:ext>
+    </p:extLst>
+  </p:cSld>
+  <p:clrMapOvr>
+    <a:masterClrMapping/>
+  </p:clrMapOvr>
+  <p:timing>
+    <p:tnLst>
+      <p:par>
+        <p:cTn id="1" dur="indefinite" restart="never" nodeType="tmRoot"/>
+      </p:par>
+    </p:tnLst>
+  </p:timing>
+</p:sld>
+</file>
+
+<file path=ppt/slides/slide14.xml><?xml version="1.0" encoding="utf-8"?>
+<p:sld xmlns:a="http://schemas.openxmlformats.org/drawingml/2006/main" xmlns:r="http://schemas.openxmlformats.org/officeDocument/2006/relationships" xmlns:p="http://schemas.openxmlformats.org/presentationml/2006/main">
+  <p:cSld>
+    <p:spTree>
+      <p:nvGrpSpPr>
+        <p:cNvPr id="1" name=""/>
+        <p:cNvGrpSpPr/>
+        <p:nvPr/>
+      </p:nvGrpSpPr>
+      <p:grpSpPr>
+        <a:xfrm>
+          <a:off x="0" y="0"/>
+          <a:ext cx="0" cy="0"/>
+          <a:chOff x="0" y="0"/>
+          <a:chExt cx="0" cy="0"/>
+        </a:xfrm>
+      </p:grpSpPr>
+      <p:sp>
+        <p:nvSpPr>
+          <p:cNvPr id="49" name="TextShape 1"/>
+          <p:cNvSpPr txBox="1"/>
+          <p:nvPr/>
+        </p:nvSpPr>
+        <p:spPr>
+          <a:xfrm>
+            <a:off x="504000" y="301320"/>
+            <a:ext cx="9071640" cy="1262160"/>
+          </a:xfrm>
+          <a:prstGeom prst="rect">
+            <a:avLst/>
+          </a:prstGeom>
+          <a:noFill/>
+          <a:ln>
+            <a:noFill/>
+          </a:ln>
+        </p:spPr>
+        <p:txBody>
+          <a:bodyPr lIns="0" tIns="0" rIns="0" bIns="0" anchor="ctr"/>
+          <a:lstStyle/>
+          <a:p>
+            <a:pPr algn="ctr"/>
+            <a:r>
+              <a:rPr lang="en-US" sz="4400" b="0" strike="noStrike" spc="-1">
+                <a:solidFill>
+                  <a:srgbClr val="000000"/>
+                </a:solidFill>
+                <a:uFill>
+                  <a:solidFill>
+                    <a:srgbClr val="FFFFFF"/>
+                  </a:solidFill>
+                </a:uFill>
+                <a:latin typeface="Arial"/>
+              </a:rPr>
+              <a:t>Repository Examples</a:t>
+            </a:r>
+          </a:p>
+        </p:txBody>
+      </p:sp>
+      <p:sp>
+        <p:nvSpPr>
+          <p:cNvPr id="50" name="TextShape 2"/>
+          <p:cNvSpPr txBox="1"/>
+          <p:nvPr/>
+        </p:nvSpPr>
+        <p:spPr>
+          <a:xfrm>
+            <a:off x="504000" y="1769040"/>
+            <a:ext cx="9071640" cy="4384440"/>
+          </a:xfrm>
+          <a:prstGeom prst="rect">
+            <a:avLst/>
+          </a:prstGeom>
+          <a:noFill/>
+          <a:ln>
+            <a:noFill/>
+          </a:ln>
+        </p:spPr>
+        <p:txBody>
+          <a:bodyPr lIns="0" tIns="0" rIns="0" bIns="0"/>
+          <a:lstStyle/>
+          <a:p>
+            <a:pPr marL="432000" indent="-324000">
+              <a:buClr>
+                <a:srgbClr val="000000"/>
+              </a:buClr>
+              <a:buSzPct val="45000"/>
+              <a:buFont typeface="Wingdings" charset="2"/>
+              <a:buChar char=""/>
+            </a:pPr>
+            <a:r>
+              <a:rPr lang="en-US" sz="3200" b="0" strike="noStrike" spc="-1">
+                <a:solidFill>
+                  <a:srgbClr val="000000"/>
+                </a:solidFill>
+                <a:uFill>
+                  <a:solidFill>
+                    <a:srgbClr val="FFFFFF"/>
+                  </a:solidFill>
+                </a:uFill>
+                <a:latin typeface="Arial"/>
+              </a:rPr>
+              <a:t>Camden Coalition</a:t>
             </a:r>
           </a:p>
         </p:txBody>
@@ -2755,16 +3722,32 @@
             <a:r>
               <a:rPr lang="en-US" sz="3200" b="0" strike="noStrike" spc="-1" dirty="0" smtClean="0">
                 <a:solidFill>
-                  <a:srgbClr val="000000"/>
-                </a:solidFill>
-                <a:uFill>
-                  <a:solidFill>
-                    <a:srgbClr val="FFFFFF"/>
-                  </a:solidFill>
-                </a:uFill>
-                <a:latin typeface="Arial"/>
-              </a:rPr>
-              <a:t>Version control is software that helps a team manage the changes to their code or any other documents. (It doesn’t have to be just code!)</a:t>
+                  <a:schemeClr val="accent2">
+                    <a:lumMod val="75000"/>
+                  </a:schemeClr>
+                </a:solidFill>
+                <a:uFill>
+                  <a:solidFill>
+                    <a:srgbClr val="FFFFFF"/>
+                  </a:solidFill>
+                </a:uFill>
+                <a:latin typeface="Arial"/>
+              </a:rPr>
+              <a:t>Version control </a:t>
+            </a:r>
+            <a:r>
+              <a:rPr lang="en-US" sz="3200" b="0" strike="noStrike" spc="-1" dirty="0" smtClean="0">
+                <a:solidFill>
+                  <a:srgbClr val="000000"/>
+                </a:solidFill>
+                <a:uFill>
+                  <a:solidFill>
+                    <a:srgbClr val="FFFFFF"/>
+                  </a:solidFill>
+                </a:uFill>
+                <a:latin typeface="Arial"/>
+              </a:rPr>
+              <a:t>is software that helps a team manage the changes to their code or any other documents. (It doesn’t have to be just code!)</a:t>
             </a:r>
           </a:p>
           <a:p>
@@ -3066,7 +4049,9 @@
             <a:r>
               <a:rPr lang="en-US" sz="3200" b="0" strike="noStrike" spc="-1" dirty="0" err="1">
                 <a:solidFill>
-                  <a:srgbClr val="000000"/>
+                  <a:schemeClr val="accent2">
+                    <a:lumMod val="75000"/>
+                  </a:schemeClr>
                 </a:solidFill>
                 <a:uFill>
                   <a:solidFill>
@@ -3113,7 +4098,23 @@
                 </a:uFill>
                 <a:latin typeface="Arial"/>
               </a:rPr>
-              <a:t>A free and open source distributed version control system</a:t>
+              <a:t>A free and open source distributed </a:t>
+            </a:r>
+            <a:r>
+              <a:rPr lang="en-US" sz="2800" b="0" strike="noStrike" spc="-1" dirty="0">
+                <a:solidFill>
+                  <a:schemeClr val="accent2">
+                    <a:lumMod val="75000"/>
+                  </a:schemeClr>
+                </a:solidFill>
+                <a:uFill>
+                  <a:solidFill>
+                    <a:srgbClr val="FFFFFF"/>
+                  </a:solidFill>
+                </a:uFill>
+                <a:latin typeface="Arial"/>
+              </a:rPr>
+              <a:t>version control system</a:t>
             </a:r>
           </a:p>
           <a:p>
@@ -3142,7 +4143,9 @@
             <a:r>
               <a:rPr lang="en-US" sz="3200" b="0" strike="noStrike" spc="-1" dirty="0" err="1">
                 <a:solidFill>
-                  <a:srgbClr val="000000"/>
+                  <a:schemeClr val="accent2">
+                    <a:lumMod val="75000"/>
+                  </a:schemeClr>
                 </a:solidFill>
                 <a:uFill>
                   <a:solidFill>
@@ -3155,7 +4158,9 @@
             </a:r>
             <a:endParaRPr lang="en-US" sz="3200" b="0" strike="noStrike" spc="-1" dirty="0">
               <a:solidFill>
-                <a:srgbClr val="000000"/>
+                <a:schemeClr val="accent2">
+                  <a:lumMod val="75000"/>
+                </a:schemeClr>
               </a:solidFill>
               <a:uFill>
                 <a:solidFill>
@@ -3177,7 +4182,9 @@
             <a:r>
               <a:rPr lang="en-US" sz="2800" b="0" strike="noStrike" spc="-1" dirty="0" err="1">
                 <a:solidFill>
-                  <a:srgbClr val="000000"/>
+                  <a:schemeClr val="accent2">
+                    <a:lumMod val="75000"/>
+                  </a:schemeClr>
                 </a:solidFill>
                 <a:uFill>
                   <a:solidFill>
@@ -3313,288 +4320,137 @@
       </p:grpSpPr>
       <p:sp>
         <p:nvSpPr>
-          <p:cNvPr id="45" name="TextShape 1"/>
-          <p:cNvSpPr txBox="1"/>
-          <p:nvPr/>
-        </p:nvSpPr>
-        <p:spPr>
-          <a:xfrm>
-            <a:off x="504000" y="301320"/>
-            <a:ext cx="9071640" cy="1262160"/>
-          </a:xfrm>
-          <a:prstGeom prst="rect">
-            <a:avLst/>
-          </a:prstGeom>
-          <a:noFill/>
-          <a:ln>
-            <a:noFill/>
-          </a:ln>
-        </p:spPr>
-        <p:txBody>
-          <a:bodyPr lIns="0" tIns="0" rIns="0" bIns="0" anchor="ctr"/>
+          <p:cNvPr id="2" name="Title 1"/>
+          <p:cNvSpPr>
+            <a:spLocks noGrp="1"/>
+          </p:cNvSpPr>
+          <p:nvPr>
+            <p:ph type="title"/>
+          </p:nvPr>
+        </p:nvSpPr>
+        <p:spPr/>
+        <p:txBody>
+          <a:bodyPr/>
           <a:lstStyle/>
           <a:p>
             <a:pPr algn="ctr"/>
             <a:r>
-              <a:rPr lang="en-US" sz="4400" b="0" strike="noStrike" spc="-1" dirty="0" smtClean="0">
-                <a:solidFill>
-                  <a:srgbClr val="000000"/>
-                </a:solidFill>
-                <a:uFill>
-                  <a:solidFill>
-                    <a:srgbClr val="FFFFFF"/>
-                  </a:solidFill>
-                </a:uFill>
-                <a:latin typeface="Arial"/>
-              </a:rPr>
-              <a:t>vs</a:t>
-            </a:r>
-            <a:endParaRPr lang="en-US" sz="4400" b="0" strike="noStrike" spc="-1" dirty="0">
-              <a:solidFill>
-                <a:srgbClr val="000000"/>
-              </a:solidFill>
-              <a:uFill>
-                <a:solidFill>
-                  <a:srgbClr val="FFFFFF"/>
-                </a:solidFill>
-              </a:uFill>
-              <a:latin typeface="Arial"/>
-            </a:endParaRPr>
-          </a:p>
-        </p:txBody>
-      </p:sp>
-      <p:sp>
-        <p:nvSpPr>
-          <p:cNvPr id="46" name="TextShape 2"/>
-          <p:cNvSpPr txBox="1"/>
-          <p:nvPr/>
-        </p:nvSpPr>
-        <p:spPr>
-          <a:xfrm>
-            <a:off x="504000" y="1769040"/>
-            <a:ext cx="9071640" cy="4384440"/>
-          </a:xfrm>
-          <a:prstGeom prst="rect">
-            <a:avLst/>
-          </a:prstGeom>
-          <a:noFill/>
-          <a:ln>
-            <a:noFill/>
-          </a:ln>
-        </p:spPr>
-        <p:txBody>
-          <a:bodyPr lIns="0" tIns="0" rIns="0" bIns="0"/>
-          <a:lstStyle/>
-          <a:p>
-            <a:pPr marL="457200" indent="-457200">
-              <a:buFont typeface="Arial" panose="020B0604020202020204" pitchFamily="34" charset="0"/>
-              <a:buChar char="•"/>
-            </a:pPr>
-            <a:endParaRPr lang="en-US" sz="3200" spc="-1" dirty="0" smtClean="0">
-              <a:solidFill>
-                <a:srgbClr val="000000"/>
-              </a:solidFill>
-              <a:uFill>
-                <a:solidFill>
-                  <a:srgbClr val="FFFFFF"/>
-                </a:solidFill>
-              </a:uFill>
-              <a:latin typeface="Arial"/>
-            </a:endParaRPr>
-          </a:p>
-          <a:p>
-            <a:pPr marL="457200" indent="-457200">
-              <a:buFont typeface="Arial" panose="020B0604020202020204" pitchFamily="34" charset="0"/>
-              <a:buChar char="•"/>
-            </a:pPr>
-            <a:endParaRPr lang="en-US" sz="3200" spc="-1" dirty="0" smtClean="0">
-              <a:solidFill>
-                <a:srgbClr val="000000"/>
-              </a:solidFill>
-              <a:uFill>
-                <a:solidFill>
-                  <a:srgbClr val="FFFFFF"/>
-                </a:solidFill>
-              </a:uFill>
-              <a:latin typeface="Arial"/>
-            </a:endParaRPr>
-          </a:p>
-          <a:p>
-            <a:pPr marL="457200" indent="-457200">
-              <a:buFont typeface="Arial" panose="020B0604020202020204" pitchFamily="34" charset="0"/>
-              <a:buChar char="•"/>
-            </a:pPr>
-            <a:r>
-              <a:rPr lang="en-US" sz="3200" spc="-1" dirty="0" smtClean="0">
-                <a:solidFill>
-                  <a:srgbClr val="000000"/>
-                </a:solidFill>
-                <a:uFill>
-                  <a:solidFill>
-                    <a:srgbClr val="FFFFFF"/>
-                  </a:solidFill>
-                </a:uFill>
-                <a:latin typeface="Arial"/>
-              </a:rPr>
-              <a:t>GitHub is just a web-based platform for </a:t>
-            </a:r>
-            <a:r>
-              <a:rPr lang="en-US" sz="3200" spc="-1" dirty="0" err="1" smtClean="0">
-                <a:solidFill>
-                  <a:srgbClr val="000000"/>
-                </a:solidFill>
-                <a:uFill>
-                  <a:solidFill>
-                    <a:srgbClr val="FFFFFF"/>
-                  </a:solidFill>
-                </a:uFill>
-                <a:latin typeface="Arial"/>
-              </a:rPr>
+              <a:rPr lang="en-US" dirty="0" err="1" smtClean="0"/>
               <a:t>Git</a:t>
             </a:r>
             <a:r>
-              <a:rPr lang="en-US" sz="3200" spc="-1" dirty="0" smtClean="0">
-                <a:solidFill>
-                  <a:srgbClr val="000000"/>
-                </a:solidFill>
-                <a:uFill>
-                  <a:solidFill>
-                    <a:srgbClr val="FFFFFF"/>
-                  </a:solidFill>
-                </a:uFill>
-                <a:latin typeface="Arial"/>
-              </a:rPr>
-              <a:t>.</a:t>
-            </a:r>
-          </a:p>
-          <a:p>
-            <a:pPr marL="457200" indent="-457200">
-              <a:buFont typeface="Arial" panose="020B0604020202020204" pitchFamily="34" charset="0"/>
-              <a:buChar char="•"/>
-            </a:pPr>
-            <a:r>
-              <a:rPr lang="en-US" sz="3200" b="0" strike="noStrike" spc="-1" dirty="0" smtClean="0">
-                <a:solidFill>
-                  <a:srgbClr val="000000"/>
-                </a:solidFill>
-                <a:uFill>
-                  <a:solidFill>
-                    <a:srgbClr val="FFFFFF"/>
-                  </a:solidFill>
-                </a:uFill>
-                <a:latin typeface="Arial"/>
-              </a:rPr>
-              <a:t>It takes all the abilities of version control in </a:t>
-            </a:r>
-            <a:r>
-              <a:rPr lang="en-US" sz="3200" b="0" strike="noStrike" spc="-1" dirty="0" err="1" smtClean="0">
-                <a:solidFill>
-                  <a:srgbClr val="000000"/>
-                </a:solidFill>
-                <a:uFill>
-                  <a:solidFill>
-                    <a:srgbClr val="FFFFFF"/>
-                  </a:solidFill>
-                </a:uFill>
-                <a:latin typeface="Arial"/>
-              </a:rPr>
+              <a:rPr lang="en-US" dirty="0" smtClean="0"/>
+              <a:t>: Cons (And Pros)</a:t>
+            </a:r>
+            <a:endParaRPr lang="en-US" dirty="0"/>
+          </a:p>
+        </p:txBody>
+      </p:sp>
+      <p:sp>
+        <p:nvSpPr>
+          <p:cNvPr id="3" name="Text Placeholder 2"/>
+          <p:cNvSpPr>
+            <a:spLocks noGrp="1"/>
+          </p:cNvSpPr>
+          <p:nvPr>
+            <p:ph type="body"/>
+          </p:nvPr>
+        </p:nvSpPr>
+        <p:spPr/>
+        <p:txBody>
+          <a:bodyPr/>
+          <a:lstStyle/>
+          <a:p>
+            <a:r>
+              <a:rPr lang="en-US" dirty="0" smtClean="0"/>
+              <a:t>Cons (and Pros)</a:t>
+            </a:r>
+          </a:p>
+          <a:p>
+            <a:pPr lvl="1"/>
+            <a:r>
+              <a:rPr lang="en-US" dirty="0" smtClean="0"/>
+              <a:t>One more thing to learn</a:t>
+            </a:r>
+          </a:p>
+          <a:p>
+            <a:pPr lvl="2"/>
+            <a:r>
+              <a:rPr lang="en-US" dirty="0" err="1" smtClean="0"/>
               <a:t>Git</a:t>
             </a:r>
             <a:r>
-              <a:rPr lang="en-US" sz="3200" b="0" strike="noStrike" spc="-1" dirty="0" smtClean="0">
-                <a:solidFill>
-                  <a:srgbClr val="000000"/>
-                </a:solidFill>
-                <a:uFill>
-                  <a:solidFill>
-                    <a:srgbClr val="FFFFFF"/>
-                  </a:solidFill>
-                </a:uFill>
-                <a:latin typeface="Arial"/>
-              </a:rPr>
-              <a:t> and adds user friendly collaboration and project management features.</a:t>
-            </a:r>
-          </a:p>
-          <a:p>
-            <a:pPr marL="457200" indent="-457200">
-              <a:buFont typeface="Arial" panose="020B0604020202020204" pitchFamily="34" charset="0"/>
-              <a:buChar char="•"/>
-            </a:pPr>
-            <a:endParaRPr lang="en-US" sz="3200" b="0" strike="noStrike" spc="-1" dirty="0">
-              <a:solidFill>
-                <a:srgbClr val="000000"/>
-              </a:solidFill>
-              <a:uFill>
-                <a:solidFill>
-                  <a:srgbClr val="FFFFFF"/>
-                </a:solidFill>
-              </a:uFill>
-              <a:latin typeface="Arial"/>
-            </a:endParaRPr>
-          </a:p>
-        </p:txBody>
-      </p:sp>
-      <p:pic>
-        <p:nvPicPr>
-          <p:cNvPr id="5" name="Picture 4"/>
-          <p:cNvPicPr>
-            <a:picLocks noChangeAspect="1"/>
-          </p:cNvPicPr>
-          <p:nvPr/>
-        </p:nvPicPr>
-        <p:blipFill>
-          <a:blip r:embed="rId2">
-            <a:extLst>
-              <a:ext uri="{28A0092B-C50C-407E-A947-70E740481C1C}">
-                <a14:useLocalDpi xmlns:a14="http://schemas.microsoft.com/office/drawing/2010/main" val="0"/>
-              </a:ext>
-            </a:extLst>
-          </a:blip>
-          <a:stretch>
-            <a:fillRect/>
-          </a:stretch>
-        </p:blipFill>
-        <p:spPr>
-          <a:xfrm>
-            <a:off x="2912167" y="671608"/>
-            <a:ext cx="1446488" cy="604895"/>
-          </a:xfrm>
-          <a:prstGeom prst="rect">
-            <a:avLst/>
-          </a:prstGeom>
-        </p:spPr>
-      </p:pic>
-      <p:pic>
-        <p:nvPicPr>
-          <p:cNvPr id="3" name="Picture 2"/>
-          <p:cNvPicPr>
-            <a:picLocks noChangeAspect="1"/>
-          </p:cNvPicPr>
-          <p:nvPr/>
-        </p:nvPicPr>
-        <p:blipFill>
-          <a:blip r:embed="rId3" cstate="print">
-            <a:extLst>
-              <a:ext uri="{28A0092B-C50C-407E-A947-70E740481C1C}">
-                <a14:useLocalDpi xmlns:a14="http://schemas.microsoft.com/office/drawing/2010/main" val="0"/>
-              </a:ext>
-            </a:extLst>
-          </a:blip>
-          <a:stretch>
-            <a:fillRect/>
-          </a:stretch>
-        </p:blipFill>
-        <p:spPr>
-          <a:xfrm>
-            <a:off x="5441432" y="384632"/>
-            <a:ext cx="2875238" cy="1178848"/>
-          </a:xfrm>
-          <a:prstGeom prst="rect">
-            <a:avLst/>
-          </a:prstGeom>
-        </p:spPr>
-      </p:pic>
+              <a:rPr lang="en-US" dirty="0" smtClean="0"/>
+              <a:t> is a separate programming language from the programming language in which you might want to track changes</a:t>
+            </a:r>
+          </a:p>
+          <a:p>
+            <a:pPr lvl="1"/>
+            <a:r>
+              <a:rPr lang="en-US" dirty="0" err="1" smtClean="0"/>
+              <a:t>Git</a:t>
+            </a:r>
+            <a:r>
+              <a:rPr lang="en-US" dirty="0" smtClean="0"/>
+              <a:t> is very particular</a:t>
+            </a:r>
+          </a:p>
+          <a:p>
+            <a:pPr lvl="2"/>
+            <a:r>
+              <a:rPr lang="en-US" dirty="0" smtClean="0"/>
+              <a:t>You have to go through the correct steps in the right order to get it to work.</a:t>
+            </a:r>
+          </a:p>
+          <a:p>
+            <a:pPr lvl="2"/>
+            <a:r>
+              <a:rPr lang="en-US" dirty="0" smtClean="0"/>
+              <a:t>Learning the </a:t>
+            </a:r>
+            <a:r>
+              <a:rPr lang="en-US" dirty="0" err="1" smtClean="0"/>
+              <a:t>Git</a:t>
+            </a:r>
+            <a:r>
+              <a:rPr lang="en-US" dirty="0" smtClean="0"/>
+              <a:t> workflow can help you think about your own workflow.</a:t>
+            </a:r>
+          </a:p>
+          <a:p>
+            <a:pPr lvl="1"/>
+            <a:r>
+              <a:rPr lang="en-US" sz="2200" dirty="0" smtClean="0"/>
+              <a:t>That said, there are a lot of ways to do the same thing</a:t>
+            </a:r>
+          </a:p>
+          <a:p>
+            <a:pPr lvl="2"/>
+            <a:r>
+              <a:rPr lang="en-US" sz="1800" dirty="0" smtClean="0"/>
+              <a:t>This depends on how you interact with GitHub</a:t>
+            </a:r>
+          </a:p>
+          <a:p>
+            <a:pPr lvl="2"/>
+            <a:endParaRPr lang="en-US" sz="1800" dirty="0" smtClean="0"/>
+          </a:p>
+          <a:p>
+            <a:pPr lvl="2"/>
+            <a:endParaRPr lang="en-US" dirty="0" smtClean="0"/>
+          </a:p>
+          <a:p>
+            <a:pPr lvl="1"/>
+            <a:endParaRPr lang="en-US" dirty="0" smtClean="0"/>
+          </a:p>
+        </p:txBody>
+      </p:sp>
     </p:spTree>
+    <p:extLst>
+      <p:ext uri="{BB962C8B-B14F-4D97-AF65-F5344CB8AC3E}">
+        <p14:creationId xmlns:p14="http://schemas.microsoft.com/office/powerpoint/2010/main" val="2848442526"/>
+      </p:ext>
+    </p:extLst>
   </p:cSld>
   <p:clrMapOvr>
     <a:masterClrMapping/>
@@ -3628,7 +4484,7 @@
       </p:grpSpPr>
       <p:sp>
         <p:nvSpPr>
-          <p:cNvPr id="47" name="TextShape 1"/>
+          <p:cNvPr id="45" name="TextShape 1"/>
           <p:cNvSpPr txBox="1"/>
           <p:nvPr/>
         </p:nvSpPr>
@@ -3662,7 +4518,7 @@
                 </a:uFill>
                 <a:latin typeface="Arial"/>
               </a:rPr>
-              <a:t>GitHub Features and Lingo</a:t>
+              <a:t>vs</a:t>
             </a:r>
             <a:endParaRPr lang="en-US" sz="4400" b="0" strike="noStrike" spc="-1" dirty="0">
               <a:solidFill>
@@ -3680,7 +4536,7 @@
       </p:sp>
       <p:sp>
         <p:nvSpPr>
-          <p:cNvPr id="48" name="TextShape 2"/>
+          <p:cNvPr id="46" name="TextShape 2"/>
           <p:cNvSpPr txBox="1"/>
           <p:nvPr/>
         </p:nvSpPr>
@@ -3701,167 +4557,11 @@
           <a:bodyPr lIns="0" tIns="0" rIns="0" bIns="0"/>
           <a:lstStyle/>
           <a:p>
-            <a:pPr marL="864000" lvl="1" indent="-324000">
-              <a:buClr>
-                <a:srgbClr val="000000"/>
-              </a:buClr>
-              <a:buSzPct val="75000"/>
-              <a:buFont typeface="Symbol" charset="2"/>
-              <a:buChar char=""/>
+            <a:pPr marL="457200" indent="-457200">
+              <a:buFont typeface="Arial" panose="020B0604020202020204" pitchFamily="34" charset="0"/>
+              <a:buChar char="•"/>
             </a:pPr>
-            <a:r>
-              <a:rPr lang="en-US" sz="2800" b="0" strike="noStrike" spc="-1" dirty="0" smtClean="0">
-                <a:solidFill>
-                  <a:srgbClr val="000000"/>
-                </a:solidFill>
-                <a:uFill>
-                  <a:solidFill>
-                    <a:srgbClr val="FFFFFF"/>
-                  </a:solidFill>
-                </a:uFill>
-                <a:latin typeface="Arial"/>
-              </a:rPr>
-              <a:t>Pull </a:t>
-            </a:r>
-            <a:r>
-              <a:rPr lang="en-US" sz="2800" b="0" strike="noStrike" spc="-1" dirty="0">
-                <a:solidFill>
-                  <a:srgbClr val="000000"/>
-                </a:solidFill>
-                <a:uFill>
-                  <a:solidFill>
-                    <a:srgbClr val="FFFFFF"/>
-                  </a:solidFill>
-                </a:uFill>
-                <a:latin typeface="Arial"/>
-              </a:rPr>
-              <a:t>Request</a:t>
-            </a:r>
-          </a:p>
-          <a:p>
-            <a:pPr marL="864000" lvl="1" indent="-324000">
-              <a:buClr>
-                <a:srgbClr val="000000"/>
-              </a:buClr>
-              <a:buSzPct val="75000"/>
-              <a:buFont typeface="Symbol" charset="2"/>
-              <a:buChar char=""/>
-            </a:pPr>
-            <a:r>
-              <a:rPr lang="en-US" sz="2800" b="0" strike="noStrike" spc="-1" dirty="0">
-                <a:solidFill>
-                  <a:srgbClr val="000000"/>
-                </a:solidFill>
-                <a:uFill>
-                  <a:solidFill>
-                    <a:srgbClr val="FFFFFF"/>
-                  </a:solidFill>
-                </a:uFill>
-                <a:latin typeface="Arial"/>
-              </a:rPr>
-              <a:t>Visual Representation of Branches</a:t>
-            </a:r>
-          </a:p>
-          <a:p>
-            <a:pPr marL="864000" lvl="1" indent="-324000">
-              <a:buClr>
-                <a:srgbClr val="000000"/>
-              </a:buClr>
-              <a:buSzPct val="75000"/>
-              <a:buFont typeface="Symbol" charset="2"/>
-              <a:buChar char=""/>
-            </a:pPr>
-            <a:r>
-              <a:rPr lang="en-US" sz="2800" b="0" strike="noStrike" spc="-1" dirty="0" smtClean="0">
-                <a:solidFill>
-                  <a:srgbClr val="000000"/>
-                </a:solidFill>
-                <a:uFill>
-                  <a:solidFill>
-                    <a:srgbClr val="FFFFFF"/>
-                  </a:solidFill>
-                </a:uFill>
-                <a:latin typeface="Arial"/>
-              </a:rPr>
-              <a:t>Repository </a:t>
-            </a:r>
-            <a:r>
-              <a:rPr lang="en-US" sz="2800" b="0" strike="noStrike" spc="-1" dirty="0">
-                <a:solidFill>
-                  <a:srgbClr val="000000"/>
-                </a:solidFill>
-                <a:uFill>
-                  <a:solidFill>
-                    <a:srgbClr val="FFFFFF"/>
-                  </a:solidFill>
-                </a:uFill>
-                <a:latin typeface="Arial"/>
-              </a:rPr>
-              <a:t>(“Repo</a:t>
-            </a:r>
-            <a:r>
-              <a:rPr lang="en-US" sz="2800" b="0" strike="noStrike" spc="-1" dirty="0" smtClean="0">
-                <a:solidFill>
-                  <a:srgbClr val="000000"/>
-                </a:solidFill>
-                <a:uFill>
-                  <a:solidFill>
-                    <a:srgbClr val="FFFFFF"/>
-                  </a:solidFill>
-                </a:uFill>
-                <a:latin typeface="Arial"/>
-              </a:rPr>
-              <a:t>”)</a:t>
-            </a:r>
-          </a:p>
-          <a:p>
-            <a:pPr marL="1321200" lvl="2" indent="-324000">
-              <a:buClr>
-                <a:srgbClr val="000000"/>
-              </a:buClr>
-              <a:buSzPct val="75000"/>
-              <a:buFont typeface="Symbol" charset="2"/>
-              <a:buChar char=""/>
-            </a:pPr>
-            <a:r>
-              <a:rPr lang="en-US" sz="2800" spc="-1" dirty="0" smtClean="0">
-                <a:solidFill>
-                  <a:srgbClr val="000000"/>
-                </a:solidFill>
-                <a:uFill>
-                  <a:solidFill>
-                    <a:srgbClr val="FFFFFF"/>
-                  </a:solidFill>
-                </a:uFill>
-                <a:latin typeface="Arial"/>
-              </a:rPr>
-              <a:t>Repositories is the name for the folder where the files you are tracking are hosted</a:t>
-            </a:r>
-          </a:p>
-          <a:p>
-            <a:pPr marL="864000" lvl="1" indent="-324000">
-              <a:buClr>
-                <a:srgbClr val="000000"/>
-              </a:buClr>
-              <a:buSzPct val="75000"/>
-              <a:buFont typeface="Symbol" charset="2"/>
-              <a:buChar char=""/>
-            </a:pPr>
-            <a:r>
-              <a:rPr lang="en-US" sz="2800" b="0" strike="noStrike" spc="-1" dirty="0" smtClean="0">
-                <a:solidFill>
-                  <a:srgbClr val="000000"/>
-                </a:solidFill>
-                <a:uFill>
-                  <a:solidFill>
-                    <a:srgbClr val="FFFFFF"/>
-                  </a:solidFill>
-                </a:uFill>
-                <a:latin typeface="Arial"/>
-              </a:rPr>
-              <a:t>Cloning/Initializing a Repo</a:t>
-            </a:r>
-            <a:endParaRPr lang="en-US" sz="2800" b="0" strike="noStrike" spc="-1" dirty="0">
+            <a:endParaRPr lang="en-US" sz="3200" spc="-1" dirty="0" smtClean="0">
               <a:solidFill>
                 <a:srgbClr val="000000"/>
               </a:solidFill>
@@ -3874,79 +4574,326 @@
             </a:endParaRPr>
           </a:p>
           <a:p>
-            <a:pPr marL="864000" lvl="1" indent="-324000">
-              <a:buClr>
-                <a:srgbClr val="000000"/>
-              </a:buClr>
-              <a:buSzPct val="75000"/>
-              <a:buFont typeface="Symbol" charset="2"/>
-              <a:buChar char=""/>
+            <a:pPr marL="457200" indent="-457200">
+              <a:buFont typeface="Arial" panose="020B0604020202020204" pitchFamily="34" charset="0"/>
+              <a:buChar char="•"/>
             </a:pPr>
-            <a:r>
-              <a:rPr lang="en-US" sz="2800" b="0" strike="noStrike" spc="-1" dirty="0">
-                <a:solidFill>
-                  <a:srgbClr val="000000"/>
-                </a:solidFill>
-                <a:uFill>
-                  <a:solidFill>
-                    <a:srgbClr val="FFFFFF"/>
-                  </a:solidFill>
-                </a:uFill>
-                <a:latin typeface="Arial"/>
-              </a:rPr>
-              <a:t>Local/Remote</a:t>
-            </a:r>
-          </a:p>
-          <a:p>
-            <a:pPr marL="864000" lvl="1" indent="-324000">
-              <a:buClr>
-                <a:srgbClr val="000000"/>
-              </a:buClr>
-              <a:buSzPct val="75000"/>
-              <a:buFont typeface="Symbol" charset="2"/>
-              <a:buChar char=""/>
+            <a:endParaRPr lang="en-US" sz="3200" spc="-1" dirty="0" smtClean="0">
+              <a:solidFill>
+                <a:srgbClr val="000000"/>
+              </a:solidFill>
+              <a:uFill>
+                <a:solidFill>
+                  <a:srgbClr val="FFFFFF"/>
+                </a:solidFill>
+              </a:uFill>
+              <a:latin typeface="Arial"/>
+            </a:endParaRPr>
+          </a:p>
+          <a:p>
+            <a:pPr marL="457200" indent="-457200">
+              <a:buFont typeface="Arial" panose="020B0604020202020204" pitchFamily="34" charset="0"/>
+              <a:buChar char="•"/>
             </a:pPr>
-            <a:r>
-              <a:rPr lang="en-US" sz="2800" b="0" strike="noStrike" spc="-1" dirty="0">
-                <a:solidFill>
-                  <a:srgbClr val="000000"/>
-                </a:solidFill>
-                <a:uFill>
-                  <a:solidFill>
-                    <a:srgbClr val="FFFFFF"/>
-                  </a:solidFill>
-                </a:uFill>
-                <a:latin typeface="Arial"/>
-              </a:rPr>
-              <a:t>Pull Request</a:t>
-            </a:r>
-          </a:p>
-          <a:p>
-            <a:pPr marL="864000" lvl="1" indent="-324000">
-              <a:buClr>
-                <a:srgbClr val="000000"/>
-              </a:buClr>
-              <a:buSzPct val="75000"/>
-              <a:buFont typeface="Symbol" charset="2"/>
-              <a:buChar char=""/>
+            <a:endParaRPr lang="en-US" sz="3200" spc="-1" dirty="0" smtClean="0">
+              <a:solidFill>
+                <a:srgbClr val="000000"/>
+              </a:solidFill>
+              <a:uFill>
+                <a:solidFill>
+                  <a:srgbClr val="FFFFFF"/>
+                </a:solidFill>
+              </a:uFill>
+              <a:latin typeface="Arial"/>
+            </a:endParaRPr>
+          </a:p>
+          <a:p>
+            <a:pPr marL="457200" indent="-457200">
+              <a:buFont typeface="Arial" panose="020B0604020202020204" pitchFamily="34" charset="0"/>
+              <a:buChar char="•"/>
             </a:pPr>
-            <a:r>
-              <a:rPr lang="en-US" sz="2800" b="0" strike="noStrike" spc="-1" dirty="0">
-                <a:solidFill>
-                  <a:srgbClr val="000000"/>
-                </a:solidFill>
-                <a:uFill>
-                  <a:solidFill>
-                    <a:srgbClr val="FFFFFF"/>
-                  </a:solidFill>
-                </a:uFill>
-                <a:latin typeface="Arial"/>
-              </a:rPr>
-              <a:t>Branches</a:t>
-            </a:r>
-          </a:p>
-        </p:txBody>
-      </p:sp>
+            <a:endParaRPr lang="en-US" sz="3200" spc="-1" dirty="0">
+              <a:solidFill>
+                <a:srgbClr val="000000"/>
+              </a:solidFill>
+              <a:uFill>
+                <a:solidFill>
+                  <a:srgbClr val="FFFFFF"/>
+                </a:solidFill>
+              </a:uFill>
+              <a:latin typeface="Arial"/>
+            </a:endParaRPr>
+          </a:p>
+          <a:p>
+            <a:pPr marL="457200" indent="-457200">
+              <a:buFont typeface="Arial" panose="020B0604020202020204" pitchFamily="34" charset="0"/>
+              <a:buChar char="•"/>
+            </a:pPr>
+            <a:endParaRPr lang="en-US" sz="3200" spc="-1" dirty="0" smtClean="0">
+              <a:solidFill>
+                <a:srgbClr val="000000"/>
+              </a:solidFill>
+              <a:uFill>
+                <a:solidFill>
+                  <a:srgbClr val="FFFFFF"/>
+                </a:solidFill>
+              </a:uFill>
+              <a:latin typeface="Arial"/>
+            </a:endParaRPr>
+          </a:p>
+          <a:p>
+            <a:pPr marL="457200" indent="-457200">
+              <a:buFont typeface="Arial" panose="020B0604020202020204" pitchFamily="34" charset="0"/>
+              <a:buChar char="•"/>
+            </a:pPr>
+            <a:endParaRPr lang="en-US" sz="3200" spc="-1" dirty="0">
+              <a:solidFill>
+                <a:srgbClr val="000000"/>
+              </a:solidFill>
+              <a:uFill>
+                <a:solidFill>
+                  <a:srgbClr val="FFFFFF"/>
+                </a:solidFill>
+              </a:uFill>
+              <a:latin typeface="Arial"/>
+            </a:endParaRPr>
+          </a:p>
+          <a:p>
+            <a:pPr marL="457200" indent="-457200">
+              <a:buFont typeface="Arial" panose="020B0604020202020204" pitchFamily="34" charset="0"/>
+              <a:buChar char="•"/>
+            </a:pPr>
+            <a:endParaRPr lang="en-US" sz="3200" spc="-1" dirty="0" smtClean="0">
+              <a:solidFill>
+                <a:srgbClr val="000000"/>
+              </a:solidFill>
+              <a:uFill>
+                <a:solidFill>
+                  <a:srgbClr val="FFFFFF"/>
+                </a:solidFill>
+              </a:uFill>
+              <a:latin typeface="Arial"/>
+            </a:endParaRPr>
+          </a:p>
+          <a:p>
+            <a:pPr marL="457200" indent="-457200">
+              <a:buFont typeface="Arial" panose="020B0604020202020204" pitchFamily="34" charset="0"/>
+              <a:buChar char="•"/>
+            </a:pPr>
+            <a:r>
+              <a:rPr lang="en-US" sz="3200" spc="-1" dirty="0" smtClean="0">
+                <a:solidFill>
+                  <a:srgbClr val="000000"/>
+                </a:solidFill>
+                <a:uFill>
+                  <a:solidFill>
+                    <a:srgbClr val="FFFFFF"/>
+                  </a:solidFill>
+                </a:uFill>
+                <a:latin typeface="Arial"/>
+              </a:rPr>
+              <a:t>GitHub </a:t>
+            </a:r>
+            <a:r>
+              <a:rPr lang="en-US" sz="3200" spc="-1" dirty="0" smtClean="0">
+                <a:solidFill>
+                  <a:srgbClr val="000000"/>
+                </a:solidFill>
+                <a:uFill>
+                  <a:solidFill>
+                    <a:srgbClr val="FFFFFF"/>
+                  </a:solidFill>
+                </a:uFill>
+                <a:latin typeface="Arial"/>
+              </a:rPr>
+              <a:t>is just a web-based platform for </a:t>
+            </a:r>
+            <a:r>
+              <a:rPr lang="en-US" sz="3200" spc="-1" dirty="0" err="1" smtClean="0">
+                <a:solidFill>
+                  <a:srgbClr val="000000"/>
+                </a:solidFill>
+                <a:uFill>
+                  <a:solidFill>
+                    <a:srgbClr val="FFFFFF"/>
+                  </a:solidFill>
+                </a:uFill>
+                <a:latin typeface="Arial"/>
+              </a:rPr>
+              <a:t>Git</a:t>
+            </a:r>
+            <a:r>
+              <a:rPr lang="en-US" sz="3200" spc="-1" dirty="0" smtClean="0">
+                <a:solidFill>
+                  <a:srgbClr val="000000"/>
+                </a:solidFill>
+                <a:uFill>
+                  <a:solidFill>
+                    <a:srgbClr val="FFFFFF"/>
+                  </a:solidFill>
+                </a:uFill>
+                <a:latin typeface="Arial"/>
+              </a:rPr>
+              <a:t>.</a:t>
+            </a:r>
+          </a:p>
+          <a:p>
+            <a:pPr marL="457200" indent="-457200">
+              <a:buFont typeface="Arial" panose="020B0604020202020204" pitchFamily="34" charset="0"/>
+              <a:buChar char="•"/>
+            </a:pPr>
+            <a:r>
+              <a:rPr lang="en-US" sz="3200" b="0" strike="noStrike" spc="-1" dirty="0" smtClean="0">
+                <a:solidFill>
+                  <a:srgbClr val="000000"/>
+                </a:solidFill>
+                <a:uFill>
+                  <a:solidFill>
+                    <a:srgbClr val="FFFFFF"/>
+                  </a:solidFill>
+                </a:uFill>
+                <a:latin typeface="Arial"/>
+              </a:rPr>
+              <a:t>It takes all the abilities of version control in </a:t>
+            </a:r>
+            <a:r>
+              <a:rPr lang="en-US" sz="3200" b="0" strike="noStrike" spc="-1" dirty="0" err="1" smtClean="0">
+                <a:solidFill>
+                  <a:srgbClr val="000000"/>
+                </a:solidFill>
+                <a:uFill>
+                  <a:solidFill>
+                    <a:srgbClr val="FFFFFF"/>
+                  </a:solidFill>
+                </a:uFill>
+                <a:latin typeface="Arial"/>
+              </a:rPr>
+              <a:t>Git</a:t>
+            </a:r>
+            <a:r>
+              <a:rPr lang="en-US" sz="3200" b="0" strike="noStrike" spc="-1" dirty="0" smtClean="0">
+                <a:solidFill>
+                  <a:srgbClr val="000000"/>
+                </a:solidFill>
+                <a:uFill>
+                  <a:solidFill>
+                    <a:srgbClr val="FFFFFF"/>
+                  </a:solidFill>
+                </a:uFill>
+                <a:latin typeface="Arial"/>
+              </a:rPr>
+              <a:t> and adds user friendly collaboration and project management features.</a:t>
+            </a:r>
+          </a:p>
+          <a:p>
+            <a:pPr marL="457200" indent="-457200">
+              <a:buFont typeface="Arial" panose="020B0604020202020204" pitchFamily="34" charset="0"/>
+              <a:buChar char="•"/>
+            </a:pPr>
+            <a:endParaRPr lang="en-US" sz="3200" b="0" strike="noStrike" spc="-1" dirty="0">
+              <a:solidFill>
+                <a:srgbClr val="000000"/>
+              </a:solidFill>
+              <a:uFill>
+                <a:solidFill>
+                  <a:srgbClr val="FFFFFF"/>
+                </a:solidFill>
+              </a:uFill>
+              <a:latin typeface="Arial"/>
+            </a:endParaRPr>
+          </a:p>
+        </p:txBody>
+      </p:sp>
+      <p:pic>
+        <p:nvPicPr>
+          <p:cNvPr id="5" name="Picture 4"/>
+          <p:cNvPicPr>
+            <a:picLocks noChangeAspect="1"/>
+          </p:cNvPicPr>
+          <p:nvPr/>
+        </p:nvPicPr>
+        <p:blipFill>
+          <a:blip r:embed="rId2">
+            <a:extLst>
+              <a:ext uri="{28A0092B-C50C-407E-A947-70E740481C1C}">
+                <a14:useLocalDpi xmlns:a14="http://schemas.microsoft.com/office/drawing/2010/main" val="0"/>
+              </a:ext>
+            </a:extLst>
+          </a:blip>
+          <a:stretch>
+            <a:fillRect/>
+          </a:stretch>
+        </p:blipFill>
+        <p:spPr>
+          <a:xfrm>
+            <a:off x="2912167" y="671608"/>
+            <a:ext cx="1446488" cy="604895"/>
+          </a:xfrm>
+          <a:prstGeom prst="rect">
+            <a:avLst/>
+          </a:prstGeom>
+        </p:spPr>
+      </p:pic>
+      <p:pic>
+        <p:nvPicPr>
+          <p:cNvPr id="3" name="Picture 2"/>
+          <p:cNvPicPr>
+            <a:picLocks noChangeAspect="1"/>
+          </p:cNvPicPr>
+          <p:nvPr/>
+        </p:nvPicPr>
+        <p:blipFill>
+          <a:blip r:embed="rId3" cstate="print">
+            <a:extLst>
+              <a:ext uri="{28A0092B-C50C-407E-A947-70E740481C1C}">
+                <a14:useLocalDpi xmlns:a14="http://schemas.microsoft.com/office/drawing/2010/main" val="0"/>
+              </a:ext>
+            </a:extLst>
+          </a:blip>
+          <a:stretch>
+            <a:fillRect/>
+          </a:stretch>
+        </p:blipFill>
+        <p:spPr>
+          <a:xfrm>
+            <a:off x="5441432" y="384632"/>
+            <a:ext cx="2875238" cy="1178848"/>
+          </a:xfrm>
+          <a:prstGeom prst="rect">
+            <a:avLst/>
+          </a:prstGeom>
+        </p:spPr>
+      </p:pic>
+      <p:pic>
+        <p:nvPicPr>
+          <p:cNvPr id="4" name="Picture 3"/>
+          <p:cNvPicPr>
+            <a:picLocks noChangeAspect="1"/>
+          </p:cNvPicPr>
+          <p:nvPr/>
+        </p:nvPicPr>
+        <p:blipFill>
+          <a:blip r:embed="rId4" cstate="print">
+            <a:extLst>
+              <a:ext uri="{28A0092B-C50C-407E-A947-70E740481C1C}">
+                <a14:useLocalDpi xmlns:a14="http://schemas.microsoft.com/office/drawing/2010/main" val="0"/>
+              </a:ext>
+            </a:extLst>
+          </a:blip>
+          <a:stretch>
+            <a:fillRect/>
+          </a:stretch>
+        </p:blipFill>
+        <p:spPr>
+          <a:xfrm>
+            <a:off x="2345634" y="1482063"/>
+            <a:ext cx="6380922" cy="3589268"/>
+          </a:xfrm>
+          <a:prstGeom prst="rect">
+            <a:avLst/>
+          </a:prstGeom>
+        </p:spPr>
+      </p:pic>
     </p:spTree>
   </p:cSld>
   <p:clrMapOvr>
@@ -3955,27 +4902,7 @@
   <p:timing>
     <p:tnLst>
       <p:par>
-        <p:cTn id="1" dur="indefinite" restart="never" nodeType="tmRoot">
-          <p:childTnLst>
-            <p:seq>
-              <p:cTn id="2" nodeType="mainSeq"/>
-              <p:prevCondLst>
-                <p:cond evt="onPrev" delay="0">
-                  <p:tgtEl>
-                    <p:sldTgt/>
-                  </p:tgtEl>
-                </p:cond>
-              </p:prevCondLst>
-              <p:nextCondLst>
-                <p:cond evt="onNext" delay="0">
-                  <p:tgtEl>
-                    <p:sldTgt/>
-                  </p:tgtEl>
-                </p:cond>
-              </p:nextCondLst>
-            </p:seq>
-          </p:childTnLst>
-        </p:cTn>
+        <p:cTn id="1" dur="indefinite" restart="never" nodeType="tmRoot"/>
       </p:par>
     </p:tnLst>
   </p:timing>
@@ -4676,7 +5603,7 @@
       </p:grpSpPr>
       <p:sp>
         <p:nvSpPr>
-          <p:cNvPr id="49" name="TextShape 1"/>
+          <p:cNvPr id="47" name="TextShape 1"/>
           <p:cNvSpPr txBox="1"/>
           <p:nvPr/>
         </p:nvSpPr>
@@ -4699,25 +5626,36 @@
           <a:p>
             <a:pPr algn="ctr"/>
             <a:r>
-              <a:rPr lang="en-US" sz="4400" b="0" strike="noStrike" spc="-1">
-                <a:solidFill>
-                  <a:srgbClr val="000000"/>
-                </a:solidFill>
-                <a:uFill>
-                  <a:solidFill>
-                    <a:srgbClr val="FFFFFF"/>
-                  </a:solidFill>
-                </a:uFill>
-                <a:latin typeface="Arial"/>
-              </a:rPr>
-              <a:t>Repository Examples</a:t>
-            </a:r>
-          </a:p>
-        </p:txBody>
-      </p:sp>
-      <p:sp>
-        <p:nvSpPr>
-          <p:cNvPr id="50" name="TextShape 2"/>
+              <a:rPr lang="en-US" sz="4400" b="0" strike="noStrike" spc="-1" dirty="0" smtClean="0">
+                <a:solidFill>
+                  <a:srgbClr val="000000"/>
+                </a:solidFill>
+                <a:uFill>
+                  <a:solidFill>
+                    <a:srgbClr val="FFFFFF"/>
+                  </a:solidFill>
+                </a:uFill>
+                <a:latin typeface="Arial"/>
+              </a:rPr>
+              <a:t>GitHub Features and Lingo</a:t>
+            </a:r>
+            <a:endParaRPr lang="en-US" sz="4400" b="0" strike="noStrike" spc="-1" dirty="0">
+              <a:solidFill>
+                <a:srgbClr val="000000"/>
+              </a:solidFill>
+              <a:uFill>
+                <a:solidFill>
+                  <a:srgbClr val="FFFFFF"/>
+                </a:solidFill>
+              </a:uFill>
+              <a:latin typeface="Arial"/>
+            </a:endParaRPr>
+          </a:p>
+        </p:txBody>
+      </p:sp>
+      <p:sp>
+        <p:nvSpPr>
+          <p:cNvPr id="48" name="TextShape 2"/>
           <p:cNvSpPr txBox="1"/>
           <p:nvPr/>
         </p:nvSpPr>
@@ -4738,27 +5676,322 @@
           <a:bodyPr lIns="0" tIns="0" rIns="0" bIns="0"/>
           <a:lstStyle/>
           <a:p>
-            <a:pPr marL="432000" indent="-324000">
+            <a:pPr marL="864000" lvl="1" indent="-324000">
               <a:buClr>
                 <a:srgbClr val="000000"/>
               </a:buClr>
-              <a:buSzPct val="45000"/>
-              <a:buFont typeface="Wingdings" charset="2"/>
-              <a:buChar char=""/>
+              <a:buSzPct val="75000"/>
+              <a:buFont typeface="Symbol" charset="2"/>
+              <a:buChar char=""/>
             </a:pPr>
             <a:r>
-              <a:rPr lang="en-US" sz="3200" b="0" strike="noStrike" spc="-1">
-                <a:solidFill>
-                  <a:srgbClr val="000000"/>
-                </a:solidFill>
-                <a:uFill>
-                  <a:solidFill>
-                    <a:srgbClr val="FFFFFF"/>
-                  </a:solidFill>
-                </a:uFill>
-                <a:latin typeface="Arial"/>
-              </a:rPr>
-              <a:t>Camden Coalition</a:t>
+              <a:rPr lang="en-US" sz="2800" b="0" strike="noStrike" spc="-1" dirty="0" smtClean="0">
+                <a:solidFill>
+                  <a:srgbClr val="000000"/>
+                </a:solidFill>
+                <a:uFill>
+                  <a:solidFill>
+                    <a:srgbClr val="FFFFFF"/>
+                  </a:solidFill>
+                </a:uFill>
+                <a:latin typeface="Arial"/>
+              </a:rPr>
+              <a:t>Following slides show me using </a:t>
+            </a:r>
+            <a:r>
+              <a:rPr lang="en-US" sz="2800" b="0" strike="noStrike" spc="-1" dirty="0" err="1" smtClean="0">
+                <a:solidFill>
+                  <a:srgbClr val="000000"/>
+                </a:solidFill>
+                <a:uFill>
+                  <a:solidFill>
+                    <a:srgbClr val="FFFFFF"/>
+                  </a:solidFill>
+                </a:uFill>
+                <a:latin typeface="Arial"/>
+              </a:rPr>
+              <a:t>Git</a:t>
+            </a:r>
+            <a:r>
+              <a:rPr lang="en-US" sz="2800" b="0" strike="noStrike" spc="-1" dirty="0" smtClean="0">
+                <a:solidFill>
+                  <a:srgbClr val="000000"/>
+                </a:solidFill>
+                <a:uFill>
+                  <a:solidFill>
+                    <a:srgbClr val="FFFFFF"/>
+                  </a:solidFill>
+                </a:uFill>
+                <a:latin typeface="Arial"/>
+              </a:rPr>
+              <a:t> and GitHub tracking the changes of making this </a:t>
+            </a:r>
+          </a:p>
+          <a:p>
+            <a:pPr marL="864000" lvl="1" indent="-324000">
+              <a:buClr>
+                <a:srgbClr val="000000"/>
+              </a:buClr>
+              <a:buSzPct val="75000"/>
+              <a:buFont typeface="Symbol" charset="2"/>
+              <a:buChar char=""/>
+            </a:pPr>
+            <a:r>
+              <a:rPr lang="en-US" sz="2800" b="0" strike="noStrike" spc="-1" dirty="0" smtClean="0">
+                <a:solidFill>
+                  <a:srgbClr val="000000"/>
+                </a:solidFill>
+                <a:uFill>
+                  <a:solidFill>
+                    <a:srgbClr val="FFFFFF"/>
+                  </a:solidFill>
+                </a:uFill>
+                <a:latin typeface="Arial"/>
+              </a:rPr>
+              <a:t>Repository </a:t>
+            </a:r>
+            <a:r>
+              <a:rPr lang="en-US" sz="2800" b="0" strike="noStrike" spc="-1" dirty="0">
+                <a:solidFill>
+                  <a:srgbClr val="000000"/>
+                </a:solidFill>
+                <a:uFill>
+                  <a:solidFill>
+                    <a:srgbClr val="FFFFFF"/>
+                  </a:solidFill>
+                </a:uFill>
+                <a:latin typeface="Arial"/>
+              </a:rPr>
+              <a:t>(“Repo</a:t>
+            </a:r>
+            <a:r>
+              <a:rPr lang="en-US" sz="2800" b="0" strike="noStrike" spc="-1" dirty="0" smtClean="0">
+                <a:solidFill>
+                  <a:srgbClr val="000000"/>
+                </a:solidFill>
+                <a:uFill>
+                  <a:solidFill>
+                    <a:srgbClr val="FFFFFF"/>
+                  </a:solidFill>
+                </a:uFill>
+                <a:latin typeface="Arial"/>
+              </a:rPr>
+              <a:t>”)</a:t>
+            </a:r>
+          </a:p>
+          <a:p>
+            <a:pPr marL="1321200" lvl="2" indent="-324000">
+              <a:buClr>
+                <a:srgbClr val="000000"/>
+              </a:buClr>
+              <a:buSzPct val="75000"/>
+              <a:buFont typeface="Symbol" charset="2"/>
+              <a:buChar char=""/>
+            </a:pPr>
+            <a:r>
+              <a:rPr lang="en-US" sz="2800" spc="-1" dirty="0" smtClean="0">
+                <a:solidFill>
+                  <a:srgbClr val="000000"/>
+                </a:solidFill>
+                <a:uFill>
+                  <a:solidFill>
+                    <a:srgbClr val="FFFFFF"/>
+                  </a:solidFill>
+                </a:uFill>
+                <a:latin typeface="Arial"/>
+              </a:rPr>
+              <a:t>Repositories is the name for the folder where the files you are tracking are hosted</a:t>
+            </a:r>
+          </a:p>
+          <a:p>
+            <a:pPr marL="864000" lvl="1" indent="-324000">
+              <a:buClr>
+                <a:srgbClr val="000000"/>
+              </a:buClr>
+              <a:buSzPct val="75000"/>
+              <a:buFont typeface="Symbol" charset="2"/>
+              <a:buChar char=""/>
+            </a:pPr>
+            <a:r>
+              <a:rPr lang="en-US" sz="2800" b="0" strike="noStrike" spc="-1" dirty="0" smtClean="0">
+                <a:solidFill>
+                  <a:srgbClr val="000000"/>
+                </a:solidFill>
+                <a:uFill>
+                  <a:solidFill>
+                    <a:srgbClr val="FFFFFF"/>
+                  </a:solidFill>
+                </a:uFill>
+                <a:latin typeface="Arial"/>
+              </a:rPr>
+              <a:t>Cloning/Initializing a Repo</a:t>
+            </a:r>
+            <a:endParaRPr lang="en-US" sz="2800" b="0" strike="noStrike" spc="-1" dirty="0">
+              <a:solidFill>
+                <a:srgbClr val="000000"/>
+              </a:solidFill>
+              <a:uFill>
+                <a:solidFill>
+                  <a:srgbClr val="FFFFFF"/>
+                </a:solidFill>
+              </a:uFill>
+              <a:latin typeface="Arial"/>
+            </a:endParaRPr>
+          </a:p>
+          <a:p>
+            <a:pPr marL="864000" lvl="1" indent="-324000">
+              <a:buClr>
+                <a:srgbClr val="000000"/>
+              </a:buClr>
+              <a:buSzPct val="75000"/>
+              <a:buFont typeface="Symbol" charset="2"/>
+              <a:buChar char=""/>
+            </a:pPr>
+            <a:r>
+              <a:rPr lang="en-US" sz="2800" b="0" strike="noStrike" spc="-1" dirty="0">
+                <a:solidFill>
+                  <a:srgbClr val="000000"/>
+                </a:solidFill>
+                <a:uFill>
+                  <a:solidFill>
+                    <a:srgbClr val="FFFFFF"/>
+                  </a:solidFill>
+                </a:uFill>
+                <a:latin typeface="Arial"/>
+              </a:rPr>
+              <a:t>Local/Remote</a:t>
+            </a:r>
+          </a:p>
+          <a:p>
+            <a:pPr marL="864000" lvl="1" indent="-324000">
+              <a:buClr>
+                <a:srgbClr val="000000"/>
+              </a:buClr>
+              <a:buSzPct val="75000"/>
+              <a:buFont typeface="Symbol" charset="2"/>
+              <a:buChar char=""/>
+            </a:pPr>
+            <a:r>
+              <a:rPr lang="en-US" sz="2800" spc="-1" dirty="0">
+                <a:solidFill>
+                  <a:srgbClr val="000000"/>
+                </a:solidFill>
+                <a:uFill>
+                  <a:solidFill>
+                    <a:srgbClr val="FFFFFF"/>
+                  </a:solidFill>
+                </a:uFill>
+              </a:rPr>
+              <a:t>Pull Request</a:t>
+            </a:r>
+          </a:p>
+          <a:p>
+            <a:pPr marL="864000" lvl="1" indent="-324000">
+              <a:buClr>
+                <a:srgbClr val="000000"/>
+              </a:buClr>
+              <a:buSzPct val="75000"/>
+              <a:buFont typeface="Symbol" charset="2"/>
+              <a:buChar char=""/>
+            </a:pPr>
+            <a:r>
+              <a:rPr lang="en-US" sz="2800" spc="-1" dirty="0">
+                <a:solidFill>
+                  <a:srgbClr val="000000"/>
+                </a:solidFill>
+                <a:uFill>
+                  <a:solidFill>
+                    <a:srgbClr val="FFFFFF"/>
+                  </a:solidFill>
+                </a:uFill>
+              </a:rPr>
+              <a:t>Visual Representation of </a:t>
+            </a:r>
+            <a:r>
+              <a:rPr lang="en-US" sz="2800" spc="-1" dirty="0" smtClean="0">
+                <a:solidFill>
+                  <a:srgbClr val="000000"/>
+                </a:solidFill>
+                <a:uFill>
+                  <a:solidFill>
+                    <a:srgbClr val="FFFFFF"/>
+                  </a:solidFill>
+                </a:uFill>
+              </a:rPr>
+              <a:t>Branches</a:t>
+            </a:r>
+            <a:endParaRPr lang="en-US" sz="2800" b="0" strike="noStrike" spc="-1" dirty="0" smtClean="0">
+              <a:solidFill>
+                <a:srgbClr val="000000"/>
+              </a:solidFill>
+              <a:uFill>
+                <a:solidFill>
+                  <a:srgbClr val="FFFFFF"/>
+                </a:solidFill>
+              </a:uFill>
+              <a:latin typeface="Arial"/>
+            </a:endParaRPr>
+          </a:p>
+          <a:p>
+            <a:pPr marL="864000" lvl="1" indent="-324000">
+              <a:buClr>
+                <a:srgbClr val="000000"/>
+              </a:buClr>
+              <a:buSzPct val="75000"/>
+              <a:buFont typeface="Symbol" charset="2"/>
+              <a:buChar char=""/>
+            </a:pPr>
+            <a:r>
+              <a:rPr lang="en-US" sz="2800" b="0" strike="noStrike" spc="-1" dirty="0" smtClean="0">
+                <a:solidFill>
+                  <a:srgbClr val="000000"/>
+                </a:solidFill>
+                <a:uFill>
+                  <a:solidFill>
+                    <a:srgbClr val="FFFFFF"/>
+                  </a:solidFill>
+                </a:uFill>
+                <a:latin typeface="Arial"/>
+              </a:rPr>
+              <a:t>Pull </a:t>
+            </a:r>
+            <a:r>
+              <a:rPr lang="en-US" sz="2800" b="0" strike="noStrike" spc="-1" dirty="0">
+                <a:solidFill>
+                  <a:srgbClr val="000000"/>
+                </a:solidFill>
+                <a:uFill>
+                  <a:solidFill>
+                    <a:srgbClr val="FFFFFF"/>
+                  </a:solidFill>
+                </a:uFill>
+                <a:latin typeface="Arial"/>
+              </a:rPr>
+              <a:t>Request</a:t>
+            </a:r>
+          </a:p>
+          <a:p>
+            <a:pPr marL="864000" lvl="1" indent="-324000">
+              <a:buClr>
+                <a:srgbClr val="000000"/>
+              </a:buClr>
+              <a:buSzPct val="75000"/>
+              <a:buFont typeface="Symbol" charset="2"/>
+              <a:buChar char=""/>
+            </a:pPr>
+            <a:r>
+              <a:rPr lang="en-US" sz="2800" b="0" strike="noStrike" spc="-1" dirty="0">
+                <a:solidFill>
+                  <a:srgbClr val="000000"/>
+                </a:solidFill>
+                <a:uFill>
+                  <a:solidFill>
+                    <a:srgbClr val="FFFFFF"/>
+                  </a:solidFill>
+                </a:uFill>
+                <a:latin typeface="Arial"/>
+              </a:rPr>
+              <a:t>Branches</a:t>
             </a:r>
           </a:p>
         </p:txBody>

</xml_diff>

<commit_message>
layout edits and issue screenshot
</commit_message>
<xml_diff>
--- a/github_demo_11082016.pptx
+++ b/github_demo_11082016.pptx
@@ -2734,6 +2734,281 @@
       </p:grpSpPr>
       <p:sp>
         <p:nvSpPr>
+          <p:cNvPr id="3" name="Text Placeholder 2"/>
+          <p:cNvSpPr>
+            <a:spLocks noGrp="1"/>
+          </p:cNvSpPr>
+          <p:nvPr>
+            <p:ph type="body"/>
+          </p:nvPr>
+        </p:nvSpPr>
+        <p:spPr/>
+        <p:txBody>
+          <a:bodyPr/>
+          <a:lstStyle/>
+          <a:p>
+            <a:r>
+              <a:rPr lang="en-US" sz="2400" spc="-1" dirty="0" smtClean="0">
+                <a:solidFill>
+                  <a:srgbClr val="000000"/>
+                </a:solidFill>
+                <a:uFill>
+                  <a:solidFill>
+                    <a:srgbClr val="FFFFFF"/>
+                  </a:solidFill>
+                </a:uFill>
+              </a:rPr>
+              <a:t>A </a:t>
+            </a:r>
+            <a:r>
+              <a:rPr lang="en-US" sz="2400" b="1" spc="-1" dirty="0" smtClean="0">
+                <a:solidFill>
+                  <a:schemeClr val="accent2">
+                    <a:lumMod val="75000"/>
+                  </a:schemeClr>
+                </a:solidFill>
+                <a:uFill>
+                  <a:solidFill>
+                    <a:srgbClr val="FFFFFF"/>
+                  </a:solidFill>
+                </a:uFill>
+              </a:rPr>
+              <a:t>repository</a:t>
+            </a:r>
+            <a:r>
+              <a:rPr lang="en-US" sz="2400" spc="-1" dirty="0" smtClean="0">
+                <a:solidFill>
+                  <a:schemeClr val="accent2">
+                    <a:lumMod val="75000"/>
+                  </a:schemeClr>
+                </a:solidFill>
+                <a:uFill>
+                  <a:solidFill>
+                    <a:srgbClr val="FFFFFF"/>
+                  </a:solidFill>
+                </a:uFill>
+              </a:rPr>
+              <a:t> (</a:t>
+            </a:r>
+            <a:r>
+              <a:rPr lang="en-US" sz="2400" b="1" spc="-1" dirty="0" smtClean="0">
+                <a:solidFill>
+                  <a:schemeClr val="accent2">
+                    <a:lumMod val="75000"/>
+                  </a:schemeClr>
+                </a:solidFill>
+                <a:uFill>
+                  <a:solidFill>
+                    <a:srgbClr val="FFFFFF"/>
+                  </a:solidFill>
+                </a:uFill>
+              </a:rPr>
+              <a:t>“repo”</a:t>
+            </a:r>
+            <a:r>
+              <a:rPr lang="en-US" sz="2400" spc="-1" dirty="0" smtClean="0">
+                <a:solidFill>
+                  <a:schemeClr val="accent2">
+                    <a:lumMod val="75000"/>
+                  </a:schemeClr>
+                </a:solidFill>
+                <a:uFill>
+                  <a:solidFill>
+                    <a:srgbClr val="FFFFFF"/>
+                  </a:solidFill>
+                </a:uFill>
+              </a:rPr>
+              <a:t>)</a:t>
+            </a:r>
+            <a:r>
+              <a:rPr lang="en-US" sz="2400" b="1" spc="-1" dirty="0" smtClean="0">
+                <a:solidFill>
+                  <a:schemeClr val="accent2">
+                    <a:lumMod val="75000"/>
+                  </a:schemeClr>
+                </a:solidFill>
+                <a:uFill>
+                  <a:solidFill>
+                    <a:srgbClr val="FFFFFF"/>
+                  </a:solidFill>
+                </a:uFill>
+              </a:rPr>
+              <a:t> </a:t>
+            </a:r>
+            <a:r>
+              <a:rPr lang="en-US" sz="2400" spc="-1" dirty="0" smtClean="0">
+                <a:solidFill>
+                  <a:srgbClr val="000000"/>
+                </a:solidFill>
+                <a:uFill>
+                  <a:solidFill>
+                    <a:srgbClr val="FFFFFF"/>
+                  </a:solidFill>
+                </a:uFill>
+              </a:rPr>
+              <a:t>is </a:t>
+            </a:r>
+            <a:r>
+              <a:rPr lang="en-US" sz="2400" spc="-1" dirty="0">
+                <a:solidFill>
+                  <a:srgbClr val="000000"/>
+                </a:solidFill>
+                <a:uFill>
+                  <a:solidFill>
+                    <a:srgbClr val="FFFFFF"/>
+                  </a:solidFill>
+                </a:uFill>
+              </a:rPr>
+              <a:t>the name for the folder where the files you are tracking are </a:t>
+            </a:r>
+            <a:r>
+              <a:rPr lang="en-US" sz="2400" spc="-1" dirty="0" smtClean="0">
+                <a:solidFill>
+                  <a:srgbClr val="000000"/>
+                </a:solidFill>
+                <a:uFill>
+                  <a:solidFill>
+                    <a:srgbClr val="FFFFFF"/>
+                  </a:solidFill>
+                </a:uFill>
+              </a:rPr>
+              <a:t>hosted, both saved on your computer </a:t>
+            </a:r>
+            <a:r>
+              <a:rPr lang="en-US" sz="2400" spc="-1" dirty="0" smtClean="0">
+                <a:solidFill>
+                  <a:schemeClr val="accent2">
+                    <a:lumMod val="75000"/>
+                  </a:schemeClr>
+                </a:solidFill>
+                <a:uFill>
+                  <a:solidFill>
+                    <a:srgbClr val="FFFFFF"/>
+                  </a:solidFill>
+                </a:uFill>
+              </a:rPr>
+              <a:t>(</a:t>
+            </a:r>
+            <a:r>
+              <a:rPr lang="en-US" sz="2400" b="1" spc="-1" dirty="0" smtClean="0">
+                <a:solidFill>
+                  <a:schemeClr val="accent2">
+                    <a:lumMod val="75000"/>
+                  </a:schemeClr>
+                </a:solidFill>
+                <a:uFill>
+                  <a:solidFill>
+                    <a:srgbClr val="FFFFFF"/>
+                  </a:solidFill>
+                </a:uFill>
+              </a:rPr>
+              <a:t>local</a:t>
+            </a:r>
+            <a:r>
+              <a:rPr lang="en-US" sz="2400" spc="-1" dirty="0" smtClean="0">
+                <a:solidFill>
+                  <a:schemeClr val="accent2">
+                    <a:lumMod val="75000"/>
+                  </a:schemeClr>
+                </a:solidFill>
+                <a:uFill>
+                  <a:solidFill>
+                    <a:srgbClr val="FFFFFF"/>
+                  </a:solidFill>
+                </a:uFill>
+              </a:rPr>
+              <a:t>) </a:t>
+            </a:r>
+            <a:r>
+              <a:rPr lang="en-US" sz="2400" spc="-1" dirty="0" smtClean="0">
+                <a:solidFill>
+                  <a:srgbClr val="000000"/>
+                </a:solidFill>
+                <a:uFill>
+                  <a:solidFill>
+                    <a:srgbClr val="FFFFFF"/>
+                  </a:solidFill>
+                </a:uFill>
+              </a:rPr>
+              <a:t>and remote repo </a:t>
+            </a:r>
+            <a:r>
+              <a:rPr lang="en-US" sz="2400" spc="-1" dirty="0" smtClean="0">
+                <a:solidFill>
+                  <a:schemeClr val="accent1">
+                    <a:lumMod val="75000"/>
+                  </a:schemeClr>
+                </a:solidFill>
+                <a:uFill>
+                  <a:solidFill>
+                    <a:srgbClr val="FFFFFF"/>
+                  </a:solidFill>
+                </a:uFill>
+              </a:rPr>
+              <a:t>(</a:t>
+            </a:r>
+            <a:r>
+              <a:rPr lang="en-US" sz="2400" b="1" spc="-1" dirty="0" smtClean="0">
+                <a:solidFill>
+                  <a:schemeClr val="accent1">
+                    <a:lumMod val="75000"/>
+                  </a:schemeClr>
+                </a:solidFill>
+                <a:uFill>
+                  <a:solidFill>
+                    <a:srgbClr val="FFFFFF"/>
+                  </a:solidFill>
+                </a:uFill>
+              </a:rPr>
+              <a:t>GitHub</a:t>
+            </a:r>
+            <a:r>
+              <a:rPr lang="en-US" sz="2400" spc="-1" dirty="0" smtClean="0">
+                <a:solidFill>
+                  <a:schemeClr val="accent1">
+                    <a:lumMod val="75000"/>
+                  </a:schemeClr>
+                </a:solidFill>
+                <a:uFill>
+                  <a:solidFill>
+                    <a:srgbClr val="FFFFFF"/>
+                  </a:solidFill>
+                </a:uFill>
+              </a:rPr>
+              <a:t>)</a:t>
+            </a:r>
+          </a:p>
+          <a:p>
+            <a:endParaRPr lang="en-US" sz="4000" spc="-1" dirty="0" smtClean="0">
+              <a:solidFill>
+                <a:srgbClr val="000000"/>
+              </a:solidFill>
+              <a:uFill>
+                <a:solidFill>
+                  <a:srgbClr val="FFFFFF"/>
+                </a:solidFill>
+              </a:uFill>
+            </a:endParaRPr>
+          </a:p>
+          <a:p>
+            <a:endParaRPr lang="en-US" sz="4000" spc="-1" dirty="0">
+              <a:solidFill>
+                <a:srgbClr val="000000"/>
+              </a:solidFill>
+              <a:uFill>
+                <a:solidFill>
+                  <a:srgbClr val="FFFFFF"/>
+                </a:solidFill>
+              </a:uFill>
+            </a:endParaRPr>
+          </a:p>
+          <a:p>
+            <a:endParaRPr lang="en-US" dirty="0"/>
+          </a:p>
+        </p:txBody>
+      </p:sp>
+      <p:sp>
+        <p:nvSpPr>
           <p:cNvPr id="2" name="Title 1"/>
           <p:cNvSpPr>
             <a:spLocks noGrp="1"/>
@@ -2752,281 +3027,6 @@
               <a:rPr lang="en-US" dirty="0" smtClean="0"/>
               <a:t>GitHub Lingo: Repositories</a:t>
             </a:r>
-            <a:endParaRPr lang="en-US" dirty="0"/>
-          </a:p>
-        </p:txBody>
-      </p:sp>
-      <p:sp>
-        <p:nvSpPr>
-          <p:cNvPr id="3" name="Text Placeholder 2"/>
-          <p:cNvSpPr>
-            <a:spLocks noGrp="1"/>
-          </p:cNvSpPr>
-          <p:nvPr>
-            <p:ph type="body"/>
-          </p:nvPr>
-        </p:nvSpPr>
-        <p:spPr/>
-        <p:txBody>
-          <a:bodyPr/>
-          <a:lstStyle/>
-          <a:p>
-            <a:r>
-              <a:rPr lang="en-US" sz="2400" spc="-1" dirty="0" smtClean="0">
-                <a:solidFill>
-                  <a:srgbClr val="000000"/>
-                </a:solidFill>
-                <a:uFill>
-                  <a:solidFill>
-                    <a:srgbClr val="FFFFFF"/>
-                  </a:solidFill>
-                </a:uFill>
-              </a:rPr>
-              <a:t>A </a:t>
-            </a:r>
-            <a:r>
-              <a:rPr lang="en-US" sz="2400" b="1" spc="-1" dirty="0" smtClean="0">
-                <a:solidFill>
-                  <a:schemeClr val="accent2">
-                    <a:lumMod val="75000"/>
-                  </a:schemeClr>
-                </a:solidFill>
-                <a:uFill>
-                  <a:solidFill>
-                    <a:srgbClr val="FFFFFF"/>
-                  </a:solidFill>
-                </a:uFill>
-              </a:rPr>
-              <a:t>repository</a:t>
-            </a:r>
-            <a:r>
-              <a:rPr lang="en-US" sz="2400" spc="-1" dirty="0" smtClean="0">
-                <a:solidFill>
-                  <a:schemeClr val="accent2">
-                    <a:lumMod val="75000"/>
-                  </a:schemeClr>
-                </a:solidFill>
-                <a:uFill>
-                  <a:solidFill>
-                    <a:srgbClr val="FFFFFF"/>
-                  </a:solidFill>
-                </a:uFill>
-              </a:rPr>
-              <a:t> (</a:t>
-            </a:r>
-            <a:r>
-              <a:rPr lang="en-US" sz="2400" b="1" spc="-1" dirty="0" smtClean="0">
-                <a:solidFill>
-                  <a:schemeClr val="accent2">
-                    <a:lumMod val="75000"/>
-                  </a:schemeClr>
-                </a:solidFill>
-                <a:uFill>
-                  <a:solidFill>
-                    <a:srgbClr val="FFFFFF"/>
-                  </a:solidFill>
-                </a:uFill>
-              </a:rPr>
-              <a:t>“repo”</a:t>
-            </a:r>
-            <a:r>
-              <a:rPr lang="en-US" sz="2400" spc="-1" dirty="0" smtClean="0">
-                <a:solidFill>
-                  <a:schemeClr val="accent2">
-                    <a:lumMod val="75000"/>
-                  </a:schemeClr>
-                </a:solidFill>
-                <a:uFill>
-                  <a:solidFill>
-                    <a:srgbClr val="FFFFFF"/>
-                  </a:solidFill>
-                </a:uFill>
-              </a:rPr>
-              <a:t>)</a:t>
-            </a:r>
-            <a:r>
-              <a:rPr lang="en-US" sz="2400" b="1" spc="-1" dirty="0" smtClean="0">
-                <a:solidFill>
-                  <a:schemeClr val="accent2">
-                    <a:lumMod val="75000"/>
-                  </a:schemeClr>
-                </a:solidFill>
-                <a:uFill>
-                  <a:solidFill>
-                    <a:srgbClr val="FFFFFF"/>
-                  </a:solidFill>
-                </a:uFill>
-              </a:rPr>
-              <a:t> </a:t>
-            </a:r>
-            <a:r>
-              <a:rPr lang="en-US" sz="2400" spc="-1" dirty="0" smtClean="0">
-                <a:solidFill>
-                  <a:srgbClr val="000000"/>
-                </a:solidFill>
-                <a:uFill>
-                  <a:solidFill>
-                    <a:srgbClr val="FFFFFF"/>
-                  </a:solidFill>
-                </a:uFill>
-              </a:rPr>
-              <a:t>is </a:t>
-            </a:r>
-            <a:r>
-              <a:rPr lang="en-US" sz="2400" spc="-1" dirty="0">
-                <a:solidFill>
-                  <a:srgbClr val="000000"/>
-                </a:solidFill>
-                <a:uFill>
-                  <a:solidFill>
-                    <a:srgbClr val="FFFFFF"/>
-                  </a:solidFill>
-                </a:uFill>
-              </a:rPr>
-              <a:t>the name for the folder where the files you are tracking are </a:t>
-            </a:r>
-            <a:r>
-              <a:rPr lang="en-US" sz="2400" spc="-1" dirty="0" smtClean="0">
-                <a:solidFill>
-                  <a:srgbClr val="000000"/>
-                </a:solidFill>
-                <a:uFill>
-                  <a:solidFill>
-                    <a:srgbClr val="FFFFFF"/>
-                  </a:solidFill>
-                </a:uFill>
-              </a:rPr>
-              <a:t>hosted, both saved on your computer </a:t>
-            </a:r>
-            <a:r>
-              <a:rPr lang="en-US" sz="2400" spc="-1" dirty="0" smtClean="0">
-                <a:solidFill>
-                  <a:schemeClr val="accent2">
-                    <a:lumMod val="75000"/>
-                  </a:schemeClr>
-                </a:solidFill>
-                <a:uFill>
-                  <a:solidFill>
-                    <a:srgbClr val="FFFFFF"/>
-                  </a:solidFill>
-                </a:uFill>
-              </a:rPr>
-              <a:t>(</a:t>
-            </a:r>
-            <a:r>
-              <a:rPr lang="en-US" sz="2400" b="1" spc="-1" dirty="0" smtClean="0">
-                <a:solidFill>
-                  <a:schemeClr val="accent2">
-                    <a:lumMod val="75000"/>
-                  </a:schemeClr>
-                </a:solidFill>
-                <a:uFill>
-                  <a:solidFill>
-                    <a:srgbClr val="FFFFFF"/>
-                  </a:solidFill>
-                </a:uFill>
-              </a:rPr>
-              <a:t>local</a:t>
-            </a:r>
-            <a:r>
-              <a:rPr lang="en-US" sz="2400" spc="-1" dirty="0" smtClean="0">
-                <a:solidFill>
-                  <a:schemeClr val="accent2">
-                    <a:lumMod val="75000"/>
-                  </a:schemeClr>
-                </a:solidFill>
-                <a:uFill>
-                  <a:solidFill>
-                    <a:srgbClr val="FFFFFF"/>
-                  </a:solidFill>
-                </a:uFill>
-              </a:rPr>
-              <a:t>) </a:t>
-            </a:r>
-            <a:r>
-              <a:rPr lang="en-US" sz="2400" spc="-1" dirty="0" smtClean="0">
-                <a:solidFill>
-                  <a:srgbClr val="000000"/>
-                </a:solidFill>
-                <a:uFill>
-                  <a:solidFill>
-                    <a:srgbClr val="FFFFFF"/>
-                  </a:solidFill>
-                </a:uFill>
-              </a:rPr>
-              <a:t>and remote repo </a:t>
-            </a:r>
-            <a:r>
-              <a:rPr lang="en-US" sz="2400" spc="-1" dirty="0" smtClean="0">
-                <a:solidFill>
-                  <a:schemeClr val="accent1">
-                    <a:lumMod val="75000"/>
-                  </a:schemeClr>
-                </a:solidFill>
-                <a:uFill>
-                  <a:solidFill>
-                    <a:srgbClr val="FFFFFF"/>
-                  </a:solidFill>
-                </a:uFill>
-              </a:rPr>
-              <a:t>(</a:t>
-            </a:r>
-            <a:r>
-              <a:rPr lang="en-US" sz="2400" b="1" spc="-1" dirty="0" smtClean="0">
-                <a:solidFill>
-                  <a:schemeClr val="accent1">
-                    <a:lumMod val="75000"/>
-                  </a:schemeClr>
-                </a:solidFill>
-                <a:uFill>
-                  <a:solidFill>
-                    <a:srgbClr val="FFFFFF"/>
-                  </a:solidFill>
-                </a:uFill>
-              </a:rPr>
-              <a:t>GitHub</a:t>
-            </a:r>
-            <a:r>
-              <a:rPr lang="en-US" sz="2400" spc="-1" dirty="0" smtClean="0">
-                <a:solidFill>
-                  <a:schemeClr val="accent1">
-                    <a:lumMod val="75000"/>
-                  </a:schemeClr>
-                </a:solidFill>
-                <a:uFill>
-                  <a:solidFill>
-                    <a:srgbClr val="FFFFFF"/>
-                  </a:solidFill>
-                </a:uFill>
-              </a:rPr>
-              <a:t>)</a:t>
-            </a:r>
-          </a:p>
-          <a:p>
-            <a:endParaRPr lang="en-US" sz="4000" spc="-1" dirty="0" smtClean="0">
-              <a:solidFill>
-                <a:srgbClr val="000000"/>
-              </a:solidFill>
-              <a:uFill>
-                <a:solidFill>
-                  <a:srgbClr val="FFFFFF"/>
-                </a:solidFill>
-              </a:uFill>
-            </a:endParaRPr>
-          </a:p>
-          <a:p>
-            <a:endParaRPr lang="en-US" sz="4000" spc="-1" dirty="0">
-              <a:solidFill>
-                <a:srgbClr val="000000"/>
-              </a:solidFill>
-              <a:uFill>
-                <a:solidFill>
-                  <a:srgbClr val="FFFFFF"/>
-                </a:solidFill>
-              </a:uFill>
-            </a:endParaRPr>
-          </a:p>
-          <a:p>
             <a:endParaRPr lang="en-US" dirty="0"/>
           </a:p>
         </p:txBody>
@@ -3100,6 +3100,62 @@
       </p:grpSpPr>
       <p:sp>
         <p:nvSpPr>
+          <p:cNvPr id="3" name="Text Placeholder 2"/>
+          <p:cNvSpPr>
+            <a:spLocks noGrp="1"/>
+          </p:cNvSpPr>
+          <p:nvPr>
+            <p:ph type="body"/>
+          </p:nvPr>
+        </p:nvSpPr>
+        <p:spPr/>
+        <p:txBody>
+          <a:bodyPr/>
+          <a:lstStyle/>
+          <a:p>
+            <a:r>
+              <a:rPr lang="en-US" dirty="0" smtClean="0"/>
+              <a:t>To create a repo is to </a:t>
+            </a:r>
+            <a:r>
+              <a:rPr lang="en-US" b="1" dirty="0" smtClean="0">
+                <a:solidFill>
+                  <a:schemeClr val="tx2">
+                    <a:lumMod val="60000"/>
+                    <a:lumOff val="40000"/>
+                  </a:schemeClr>
+                </a:solidFill>
+              </a:rPr>
+              <a:t>initialize it</a:t>
+            </a:r>
+          </a:p>
+          <a:p>
+            <a:r>
+              <a:rPr lang="en-US" dirty="0" smtClean="0"/>
+              <a:t>To link a created repository is to </a:t>
+            </a:r>
+            <a:r>
+              <a:rPr lang="en-US" b="1" dirty="0" smtClean="0">
+                <a:solidFill>
+                  <a:schemeClr val="accent2">
+                    <a:lumMod val="75000"/>
+                  </a:schemeClr>
+                </a:solidFill>
+              </a:rPr>
+              <a:t>clone it</a:t>
+            </a:r>
+            <a:endParaRPr lang="en-US" b="1" dirty="0">
+              <a:solidFill>
+                <a:schemeClr val="accent2">
+                  <a:lumMod val="75000"/>
+                </a:schemeClr>
+              </a:solidFill>
+            </a:endParaRPr>
+          </a:p>
+        </p:txBody>
+      </p:sp>
+      <p:sp>
+        <p:nvSpPr>
           <p:cNvPr id="2" name="Title 1"/>
           <p:cNvSpPr>
             <a:spLocks noGrp="1"/>
@@ -3119,62 +3175,6 @@
               <a:t>GitHub Lingo: Initializing/Cloning</a:t>
             </a:r>
             <a:endParaRPr lang="en-US" dirty="0"/>
-          </a:p>
-        </p:txBody>
-      </p:sp>
-      <p:sp>
-        <p:nvSpPr>
-          <p:cNvPr id="3" name="Text Placeholder 2"/>
-          <p:cNvSpPr>
-            <a:spLocks noGrp="1"/>
-          </p:cNvSpPr>
-          <p:nvPr>
-            <p:ph type="body"/>
-          </p:nvPr>
-        </p:nvSpPr>
-        <p:spPr/>
-        <p:txBody>
-          <a:bodyPr/>
-          <a:lstStyle/>
-          <a:p>
-            <a:r>
-              <a:rPr lang="en-US" dirty="0" smtClean="0"/>
-              <a:t>To create a repo is to </a:t>
-            </a:r>
-            <a:r>
-              <a:rPr lang="en-US" b="1" dirty="0" smtClean="0">
-                <a:solidFill>
-                  <a:schemeClr val="tx2">
-                    <a:lumMod val="60000"/>
-                    <a:lumOff val="40000"/>
-                  </a:schemeClr>
-                </a:solidFill>
-              </a:rPr>
-              <a:t>initialize it</a:t>
-            </a:r>
-          </a:p>
-          <a:p>
-            <a:r>
-              <a:rPr lang="en-US" dirty="0" smtClean="0"/>
-              <a:t>To link a created repository is to </a:t>
-            </a:r>
-            <a:r>
-              <a:rPr lang="en-US" b="1" dirty="0" smtClean="0">
-                <a:solidFill>
-                  <a:schemeClr val="accent2">
-                    <a:lumMod val="75000"/>
-                  </a:schemeClr>
-                </a:solidFill>
-              </a:rPr>
-              <a:t>clone it</a:t>
-            </a:r>
-            <a:endParaRPr lang="en-US" b="1" dirty="0">
-              <a:solidFill>
-                <a:schemeClr val="accent2">
-                  <a:lumMod val="75000"/>
-                </a:schemeClr>
-              </a:solidFill>
-            </a:endParaRPr>
           </a:p>
         </p:txBody>
       </p:sp>
@@ -3247,6 +3247,57 @@
       </p:grpSpPr>
       <p:sp>
         <p:nvSpPr>
+          <p:cNvPr id="3" name="Text Placeholder 2"/>
+          <p:cNvSpPr>
+            <a:spLocks noGrp="1"/>
+          </p:cNvSpPr>
+          <p:nvPr>
+            <p:ph type="body"/>
+          </p:nvPr>
+        </p:nvSpPr>
+        <p:spPr/>
+        <p:txBody>
+          <a:bodyPr/>
+          <a:lstStyle/>
+          <a:p>
+            <a:r>
+              <a:rPr lang="en-US" dirty="0" smtClean="0"/>
+              <a:t>After creating, adding, editing, or deleting files in local repo, you </a:t>
+            </a:r>
+            <a:r>
+              <a:rPr lang="en-US" dirty="0" smtClean="0">
+                <a:solidFill>
+                  <a:schemeClr val="accent2">
+                    <a:lumMod val="75000"/>
+                  </a:schemeClr>
+                </a:solidFill>
+              </a:rPr>
+              <a:t>commit</a:t>
+            </a:r>
+            <a:r>
+              <a:rPr lang="en-US" dirty="0" smtClean="0"/>
+              <a:t> the changes and </a:t>
+            </a:r>
+            <a:r>
+              <a:rPr lang="en-US" dirty="0" smtClean="0">
+                <a:solidFill>
+                  <a:schemeClr val="accent1">
+                    <a:lumMod val="75000"/>
+                  </a:schemeClr>
+                </a:solidFill>
+              </a:rPr>
+              <a:t>push</a:t>
+            </a:r>
+            <a:r>
+              <a:rPr lang="en-US" dirty="0" smtClean="0"/>
+              <a:t> them to GitHub.</a:t>
+            </a:r>
+            <a:endParaRPr lang="en-US" dirty="0"/>
+          </a:p>
+        </p:txBody>
+      </p:sp>
+      <p:sp>
+        <p:nvSpPr>
           <p:cNvPr id="2" name="Title 1"/>
           <p:cNvSpPr>
             <a:spLocks noGrp="1"/>
@@ -3263,57 +3314,6 @@
             <a:r>
               <a:rPr lang="en-US" dirty="0" smtClean="0"/>
               <a:t>GitHub Lingo: Committing and Pushing Changes</a:t>
-            </a:r>
-            <a:endParaRPr lang="en-US" dirty="0"/>
-          </a:p>
-        </p:txBody>
-      </p:sp>
-      <p:sp>
-        <p:nvSpPr>
-          <p:cNvPr id="3" name="Text Placeholder 2"/>
-          <p:cNvSpPr>
-            <a:spLocks noGrp="1"/>
-          </p:cNvSpPr>
-          <p:nvPr>
-            <p:ph type="body"/>
-          </p:nvPr>
-        </p:nvSpPr>
-        <p:spPr/>
-        <p:txBody>
-          <a:bodyPr/>
-          <a:lstStyle/>
-          <a:p>
-            <a:r>
-              <a:rPr lang="en-US" dirty="0" smtClean="0"/>
-              <a:t>After creating, adding, editing, or deleting files in local repo, you </a:t>
-            </a:r>
-            <a:r>
-              <a:rPr lang="en-US" dirty="0" smtClean="0">
-                <a:solidFill>
-                  <a:schemeClr val="accent2">
-                    <a:lumMod val="75000"/>
-                  </a:schemeClr>
-                </a:solidFill>
-              </a:rPr>
-              <a:t>commit</a:t>
-            </a:r>
-            <a:r>
-              <a:rPr lang="en-US" dirty="0" smtClean="0"/>
-              <a:t> the changes and </a:t>
-            </a:r>
-            <a:r>
-              <a:rPr lang="en-US" dirty="0" smtClean="0">
-                <a:solidFill>
-                  <a:schemeClr val="accent1">
-                    <a:lumMod val="75000"/>
-                  </a:schemeClr>
-                </a:solidFill>
-              </a:rPr>
-              <a:t>push</a:t>
-            </a:r>
-            <a:r>
-              <a:rPr lang="en-US" dirty="0" smtClean="0"/>
-              <a:t> them to GitHub.</a:t>
             </a:r>
             <a:endParaRPr lang="en-US" dirty="0"/>
           </a:p>
@@ -3388,6 +3388,66 @@
       </p:grpSpPr>
       <p:sp>
         <p:nvSpPr>
+          <p:cNvPr id="3" name="Text Placeholder 2"/>
+          <p:cNvSpPr>
+            <a:spLocks noGrp="1"/>
+          </p:cNvSpPr>
+          <p:nvPr>
+            <p:ph type="body"/>
+          </p:nvPr>
+        </p:nvSpPr>
+        <p:spPr/>
+        <p:txBody>
+          <a:bodyPr/>
+          <a:lstStyle/>
+          <a:p>
+            <a:r>
+              <a:rPr lang="en-US" dirty="0" smtClean="0"/>
+              <a:t>Create (</a:t>
+            </a:r>
+            <a:r>
+              <a:rPr lang="en-US" b="1" dirty="0" smtClean="0">
+                <a:solidFill>
+                  <a:schemeClr val="accent2">
+                    <a:lumMod val="75000"/>
+                  </a:schemeClr>
+                </a:solidFill>
+              </a:rPr>
+              <a:t>Open</a:t>
+            </a:r>
+            <a:r>
+              <a:rPr lang="en-US" dirty="0" smtClean="0"/>
+              <a:t>) an </a:t>
+            </a:r>
+            <a:r>
+              <a:rPr lang="en-US" b="1" dirty="0" smtClean="0"/>
+              <a:t>Issue</a:t>
+            </a:r>
+            <a:r>
+              <a:rPr lang="en-US" dirty="0" smtClean="0"/>
+              <a:t> and </a:t>
+            </a:r>
+            <a:r>
+              <a:rPr lang="en-US" b="1" dirty="0" smtClean="0">
+                <a:solidFill>
+                  <a:schemeClr val="tx2">
+                    <a:lumMod val="60000"/>
+                    <a:lumOff val="40000"/>
+                  </a:schemeClr>
+                </a:solidFill>
+              </a:rPr>
+              <a:t>close</a:t>
+            </a:r>
+            <a:r>
+              <a:rPr lang="en-US" dirty="0" smtClean="0"/>
+              <a:t> it when it is solved. You can also chat about it.</a:t>
+            </a:r>
+            <a:endParaRPr lang="en-US" dirty="0"/>
+          </a:p>
+        </p:txBody>
+      </p:sp>
+      <p:sp>
+        <p:nvSpPr>
           <p:cNvPr id="2" name="Title 1"/>
           <p:cNvSpPr>
             <a:spLocks noGrp="1"/>
@@ -3401,6 +3461,7 @@
           <a:bodyPr/>
           <a:lstStyle/>
           <a:p>
+            <a:pPr algn="ctr"/>
             <a:r>
               <a:rPr lang="en-US" dirty="0" smtClean="0"/>
               <a:t>GitHub Lingo: Open and Close an Issue</a:t>
@@ -3409,66 +3470,36 @@
           </a:p>
         </p:txBody>
       </p:sp>
-      <p:sp>
-        <p:nvSpPr>
-          <p:cNvPr id="3" name="Text Placeholder 2"/>
-          <p:cNvSpPr>
-            <a:spLocks noGrp="1"/>
-          </p:cNvSpPr>
-          <p:nvPr>
-            <p:ph type="body"/>
-          </p:nvPr>
-        </p:nvSpPr>
-        <p:spPr/>
-        <p:txBody>
-          <a:bodyPr/>
-          <a:lstStyle/>
-          <a:p>
-            <a:r>
-              <a:rPr lang="en-US" dirty="0" smtClean="0"/>
-              <a:t>Create (</a:t>
-            </a:r>
-            <a:r>
-              <a:rPr lang="en-US" b="1" dirty="0" smtClean="0">
-                <a:solidFill>
-                  <a:schemeClr val="accent2">
-                    <a:lumMod val="75000"/>
-                  </a:schemeClr>
-                </a:solidFill>
-              </a:rPr>
-              <a:t>Open</a:t>
-            </a:r>
-            <a:r>
-              <a:rPr lang="en-US" dirty="0" smtClean="0"/>
-              <a:t>) an </a:t>
-            </a:r>
-            <a:r>
-              <a:rPr lang="en-US" b="1" dirty="0" smtClean="0"/>
-              <a:t>Issue</a:t>
-            </a:r>
-            <a:r>
-              <a:rPr lang="en-US" dirty="0" smtClean="0"/>
-              <a:t> and </a:t>
-            </a:r>
-            <a:r>
-              <a:rPr lang="en-US" b="1" dirty="0" smtClean="0">
-                <a:solidFill>
-                  <a:schemeClr val="tx2">
-                    <a:lumMod val="60000"/>
-                    <a:lumOff val="40000"/>
-                  </a:schemeClr>
-                </a:solidFill>
-              </a:rPr>
-              <a:t>close</a:t>
-            </a:r>
-            <a:r>
-              <a:rPr lang="en-US" dirty="0" smtClean="0"/>
-              <a:t> it when it is solved. You can also chat about it.</a:t>
-            </a:r>
-            <a:endParaRPr lang="en-US" dirty="0"/>
-          </a:p>
-        </p:txBody>
-      </p:sp>
+      <p:pic>
+        <p:nvPicPr>
+          <p:cNvPr id="4" name="Picture 3"/>
+          <p:cNvPicPr>
+            <a:picLocks noChangeAspect="1"/>
+          </p:cNvPicPr>
+          <p:nvPr/>
+        </p:nvPicPr>
+        <p:blipFill>
+          <a:blip r:embed="rId2">
+            <a:extLst>
+              <a:ext uri="{28A0092B-C50C-407E-A947-70E740481C1C}">
+                <a14:useLocalDpi xmlns:a14="http://schemas.microsoft.com/office/drawing/2010/main" val="0"/>
+              </a:ext>
+            </a:extLst>
+          </a:blip>
+          <a:stretch>
+            <a:fillRect/>
+          </a:stretch>
+        </p:blipFill>
+        <p:spPr>
+          <a:xfrm>
+            <a:off x="504000" y="2991679"/>
+            <a:ext cx="8611346" cy="3530400"/>
+          </a:xfrm>
+          <a:prstGeom prst="rect">
+            <a:avLst/>
+          </a:prstGeom>
+        </p:spPr>
+      </p:pic>
     </p:spTree>
     <p:extLst>
       <p:ext uri="{BB962C8B-B14F-4D97-AF65-F5344CB8AC3E}">
@@ -3531,19 +3562,30 @@
           <a:p>
             <a:pPr algn="ctr"/>
             <a:r>
-              <a:rPr lang="en-US" sz="4400" b="0" strike="noStrike" spc="-1">
-                <a:solidFill>
-                  <a:srgbClr val="000000"/>
-                </a:solidFill>
-                <a:uFill>
-                  <a:solidFill>
-                    <a:srgbClr val="FFFFFF"/>
-                  </a:solidFill>
-                </a:uFill>
-                <a:latin typeface="Arial"/>
-              </a:rPr>
-              <a:t>Repository Examples</a:t>
-            </a:r>
+              <a:rPr lang="en-US" sz="4400" spc="-1" dirty="0" smtClean="0">
+                <a:solidFill>
+                  <a:srgbClr val="000000"/>
+                </a:solidFill>
+                <a:uFill>
+                  <a:solidFill>
+                    <a:srgbClr val="FFFFFF"/>
+                  </a:solidFill>
+                </a:uFill>
+                <a:latin typeface="Arial"/>
+              </a:rPr>
+              <a:t>GitHub Lingo: Branching &amp; Pull Requests</a:t>
+            </a:r>
+            <a:endParaRPr lang="en-US" sz="4400" b="0" strike="noStrike" spc="-1" dirty="0">
+              <a:solidFill>
+                <a:srgbClr val="000000"/>
+              </a:solidFill>
+              <a:uFill>
+                <a:solidFill>
+                  <a:srgbClr val="FFFFFF"/>
+                </a:solidFill>
+              </a:uFill>
+              <a:latin typeface="Arial"/>
+            </a:endParaRPr>
           </a:p>
         </p:txBody>
       </p:sp>
@@ -3579,19 +3621,148 @@
               <a:buChar char=""/>
             </a:pPr>
             <a:r>
-              <a:rPr lang="en-US" sz="3200" b="0" strike="noStrike" spc="-1">
-                <a:solidFill>
-                  <a:srgbClr val="000000"/>
-                </a:solidFill>
-                <a:uFill>
-                  <a:solidFill>
-                    <a:srgbClr val="FFFFFF"/>
-                  </a:solidFill>
-                </a:uFill>
-                <a:latin typeface="Arial"/>
-              </a:rPr>
-              <a:t>Camden Coalition</a:t>
-            </a:r>
+              <a:rPr lang="en-US" sz="3200" b="0" strike="noStrike" spc="-1" dirty="0" smtClean="0">
+                <a:solidFill>
+                  <a:srgbClr val="000000"/>
+                </a:solidFill>
+                <a:uFill>
+                  <a:solidFill>
+                    <a:srgbClr val="FFFFFF"/>
+                  </a:solidFill>
+                </a:uFill>
+                <a:latin typeface="Arial"/>
+              </a:rPr>
+              <a:t>You can separate your work from the </a:t>
+            </a:r>
+            <a:r>
+              <a:rPr lang="en-US" sz="3200" b="1" strike="noStrike" spc="-1" dirty="0" smtClean="0">
+                <a:solidFill>
+                  <a:srgbClr val="000000"/>
+                </a:solidFill>
+                <a:uFill>
+                  <a:solidFill>
+                    <a:srgbClr val="FFFFFF"/>
+                  </a:solidFill>
+                </a:uFill>
+                <a:latin typeface="Arial"/>
+              </a:rPr>
+              <a:t>master</a:t>
+            </a:r>
+            <a:r>
+              <a:rPr lang="en-US" sz="3200" strike="noStrike" spc="-1" dirty="0" smtClean="0">
+                <a:solidFill>
+                  <a:srgbClr val="000000"/>
+                </a:solidFill>
+                <a:uFill>
+                  <a:solidFill>
+                    <a:srgbClr val="FFFFFF"/>
+                  </a:solidFill>
+                </a:uFill>
+                <a:latin typeface="Arial"/>
+              </a:rPr>
+              <a:t> “branch” and save it to another branch.</a:t>
+            </a:r>
+          </a:p>
+          <a:p>
+            <a:pPr marL="432000" indent="-324000">
+              <a:buClr>
+                <a:srgbClr val="000000"/>
+              </a:buClr>
+              <a:buSzPct val="45000"/>
+              <a:buFont typeface="Wingdings" charset="2"/>
+              <a:buChar char=""/>
+            </a:pPr>
+            <a:r>
+              <a:rPr lang="en-US" sz="3200" spc="-1" dirty="0" smtClean="0">
+                <a:solidFill>
+                  <a:srgbClr val="000000"/>
+                </a:solidFill>
+                <a:uFill>
+                  <a:solidFill>
+                    <a:srgbClr val="FFFFFF"/>
+                  </a:solidFill>
+                </a:uFill>
+                <a:latin typeface="Arial"/>
+              </a:rPr>
+              <a:t>Create a </a:t>
+            </a:r>
+            <a:r>
+              <a:rPr lang="en-US" sz="3200" b="1" spc="-1" dirty="0" smtClean="0">
+                <a:solidFill>
+                  <a:srgbClr val="000000"/>
+                </a:solidFill>
+                <a:uFill>
+                  <a:solidFill>
+                    <a:srgbClr val="FFFFFF"/>
+                  </a:solidFill>
+                </a:uFill>
+                <a:latin typeface="Arial"/>
+              </a:rPr>
+              <a:t>pull request</a:t>
+            </a:r>
+            <a:r>
+              <a:rPr lang="en-US" sz="3200" spc="-1" dirty="0" smtClean="0">
+                <a:solidFill>
+                  <a:srgbClr val="000000"/>
+                </a:solidFill>
+                <a:uFill>
+                  <a:solidFill>
+                    <a:srgbClr val="FFFFFF"/>
+                  </a:solidFill>
+                </a:uFill>
+                <a:latin typeface="Arial"/>
+              </a:rPr>
+              <a:t> to notify repo manager of change.</a:t>
+            </a:r>
+          </a:p>
+          <a:p>
+            <a:pPr marL="432000" indent="-324000">
+              <a:buClr>
+                <a:srgbClr val="000000"/>
+              </a:buClr>
+              <a:buSzPct val="45000"/>
+              <a:buFont typeface="Wingdings" charset="2"/>
+              <a:buChar char=""/>
+            </a:pPr>
+            <a:r>
+              <a:rPr lang="en-US" sz="3200" spc="-1" dirty="0" smtClean="0">
+                <a:solidFill>
+                  <a:srgbClr val="000000"/>
+                </a:solidFill>
+                <a:uFill>
+                  <a:solidFill>
+                    <a:srgbClr val="FFFFFF"/>
+                  </a:solidFill>
+                </a:uFill>
+                <a:latin typeface="Arial"/>
+              </a:rPr>
+              <a:t>Repo manager can decide to “pull” the changes into master branch… </a:t>
+            </a:r>
+            <a:r>
+              <a:rPr lang="en-US" sz="3200" spc="-1" smtClean="0">
+                <a:solidFill>
+                  <a:srgbClr val="000000"/>
+                </a:solidFill>
+                <a:uFill>
+                  <a:solidFill>
+                    <a:srgbClr val="FFFFFF"/>
+                  </a:solidFill>
+                </a:uFill>
+                <a:latin typeface="Arial"/>
+              </a:rPr>
+              <a:t>or reject them.</a:t>
+            </a:r>
+            <a:endParaRPr lang="en-US" sz="3200" strike="noStrike" spc="-1" dirty="0">
+              <a:solidFill>
+                <a:srgbClr val="000000"/>
+              </a:solidFill>
+              <a:uFill>
+                <a:solidFill>
+                  <a:srgbClr val="FFFFFF"/>
+                </a:solidFill>
+              </a:uFill>
+              <a:latin typeface="Arial"/>
+            </a:endParaRPr>
           </a:p>
         </p:txBody>
       </p:sp>
@@ -4320,6 +4491,105 @@
       </p:grpSpPr>
       <p:sp>
         <p:nvSpPr>
+          <p:cNvPr id="3" name="Text Placeholder 2"/>
+          <p:cNvSpPr>
+            <a:spLocks noGrp="1"/>
+          </p:cNvSpPr>
+          <p:nvPr>
+            <p:ph type="body"/>
+          </p:nvPr>
+        </p:nvSpPr>
+        <p:spPr/>
+        <p:txBody>
+          <a:bodyPr/>
+          <a:lstStyle/>
+          <a:p>
+            <a:r>
+              <a:rPr lang="en-US" dirty="0" smtClean="0"/>
+              <a:t>Cons (and Pros)</a:t>
+            </a:r>
+          </a:p>
+          <a:p>
+            <a:pPr lvl="1"/>
+            <a:r>
+              <a:rPr lang="en-US" dirty="0" smtClean="0"/>
+              <a:t>One more thing to learn</a:t>
+            </a:r>
+          </a:p>
+          <a:p>
+            <a:pPr lvl="2"/>
+            <a:r>
+              <a:rPr lang="en-US" dirty="0" err="1" smtClean="0"/>
+              <a:t>Git</a:t>
+            </a:r>
+            <a:r>
+              <a:rPr lang="en-US" dirty="0" smtClean="0"/>
+              <a:t> is a separate programming language from the programming language in which you might want to track changes</a:t>
+            </a:r>
+          </a:p>
+          <a:p>
+            <a:pPr lvl="1"/>
+            <a:r>
+              <a:rPr lang="en-US" dirty="0" err="1" smtClean="0"/>
+              <a:t>Git</a:t>
+            </a:r>
+            <a:r>
+              <a:rPr lang="en-US" dirty="0" smtClean="0"/>
+              <a:t> is very particular</a:t>
+            </a:r>
+          </a:p>
+          <a:p>
+            <a:pPr lvl="2"/>
+            <a:r>
+              <a:rPr lang="en-US" dirty="0" smtClean="0"/>
+              <a:t>You have to go through the correct steps in the right order to get it to work.</a:t>
+            </a:r>
+          </a:p>
+          <a:p>
+            <a:pPr lvl="2"/>
+            <a:r>
+              <a:rPr lang="en-US" dirty="0" smtClean="0"/>
+              <a:t>Learning the </a:t>
+            </a:r>
+            <a:r>
+              <a:rPr lang="en-US" dirty="0" err="1" smtClean="0"/>
+              <a:t>Git</a:t>
+            </a:r>
+            <a:r>
+              <a:rPr lang="en-US" dirty="0" smtClean="0"/>
+              <a:t> workflow can help you think about your own workflow.</a:t>
+            </a:r>
+          </a:p>
+          <a:p>
+            <a:pPr lvl="1"/>
+            <a:r>
+              <a:rPr lang="en-US" sz="2200" dirty="0" smtClean="0"/>
+              <a:t>That said, there are a lot of ways to do the same thing</a:t>
+            </a:r>
+          </a:p>
+          <a:p>
+            <a:pPr lvl="2"/>
+            <a:r>
+              <a:rPr lang="en-US" sz="1800" dirty="0" smtClean="0"/>
+              <a:t>This depends on how you interact with GitHub</a:t>
+            </a:r>
+          </a:p>
+          <a:p>
+            <a:pPr lvl="2"/>
+            <a:endParaRPr lang="en-US" sz="1800" dirty="0" smtClean="0"/>
+          </a:p>
+          <a:p>
+            <a:pPr lvl="2"/>
+            <a:endParaRPr lang="en-US" dirty="0" smtClean="0"/>
+          </a:p>
+          <a:p>
+            <a:pPr lvl="1"/>
+            <a:endParaRPr lang="en-US" dirty="0" smtClean="0"/>
+          </a:p>
+        </p:txBody>
+      </p:sp>
+      <p:sp>
+        <p:nvSpPr>
           <p:cNvPr id="2" name="Title 1"/>
           <p:cNvSpPr>
             <a:spLocks noGrp="1"/>
@@ -4343,105 +4613,6 @@
               <a:t>: Cons (And Pros)</a:t>
             </a:r>
             <a:endParaRPr lang="en-US" dirty="0"/>
-          </a:p>
-        </p:txBody>
-      </p:sp>
-      <p:sp>
-        <p:nvSpPr>
-          <p:cNvPr id="3" name="Text Placeholder 2"/>
-          <p:cNvSpPr>
-            <a:spLocks noGrp="1"/>
-          </p:cNvSpPr>
-          <p:nvPr>
-            <p:ph type="body"/>
-          </p:nvPr>
-        </p:nvSpPr>
-        <p:spPr/>
-        <p:txBody>
-          <a:bodyPr/>
-          <a:lstStyle/>
-          <a:p>
-            <a:r>
-              <a:rPr lang="en-US" dirty="0" smtClean="0"/>
-              <a:t>Cons (and Pros)</a:t>
-            </a:r>
-          </a:p>
-          <a:p>
-            <a:pPr lvl="1"/>
-            <a:r>
-              <a:rPr lang="en-US" dirty="0" smtClean="0"/>
-              <a:t>One more thing to learn</a:t>
-            </a:r>
-          </a:p>
-          <a:p>
-            <a:pPr lvl="2"/>
-            <a:r>
-              <a:rPr lang="en-US" dirty="0" err="1" smtClean="0"/>
-              <a:t>Git</a:t>
-            </a:r>
-            <a:r>
-              <a:rPr lang="en-US" dirty="0" smtClean="0"/>
-              <a:t> is a separate programming language from the programming language in which you might want to track changes</a:t>
-            </a:r>
-          </a:p>
-          <a:p>
-            <a:pPr lvl="1"/>
-            <a:r>
-              <a:rPr lang="en-US" dirty="0" err="1" smtClean="0"/>
-              <a:t>Git</a:t>
-            </a:r>
-            <a:r>
-              <a:rPr lang="en-US" dirty="0" smtClean="0"/>
-              <a:t> is very particular</a:t>
-            </a:r>
-          </a:p>
-          <a:p>
-            <a:pPr lvl="2"/>
-            <a:r>
-              <a:rPr lang="en-US" dirty="0" smtClean="0"/>
-              <a:t>You have to go through the correct steps in the right order to get it to work.</a:t>
-            </a:r>
-          </a:p>
-          <a:p>
-            <a:pPr lvl="2"/>
-            <a:r>
-              <a:rPr lang="en-US" dirty="0" smtClean="0"/>
-              <a:t>Learning the </a:t>
-            </a:r>
-            <a:r>
-              <a:rPr lang="en-US" dirty="0" err="1" smtClean="0"/>
-              <a:t>Git</a:t>
-            </a:r>
-            <a:r>
-              <a:rPr lang="en-US" dirty="0" smtClean="0"/>
-              <a:t> workflow can help you think about your own workflow.</a:t>
-            </a:r>
-          </a:p>
-          <a:p>
-            <a:pPr lvl="1"/>
-            <a:r>
-              <a:rPr lang="en-US" sz="2200" dirty="0" smtClean="0"/>
-              <a:t>That said, there are a lot of ways to do the same thing</a:t>
-            </a:r>
-          </a:p>
-          <a:p>
-            <a:pPr lvl="2"/>
-            <a:r>
-              <a:rPr lang="en-US" sz="1800" dirty="0" smtClean="0"/>
-              <a:t>This depends on how you interact with GitHub</a:t>
-            </a:r>
-          </a:p>
-          <a:p>
-            <a:pPr lvl="2"/>
-            <a:endParaRPr lang="en-US" sz="1800" dirty="0" smtClean="0"/>
-          </a:p>
-          <a:p>
-            <a:pPr lvl="2"/>
-            <a:endParaRPr lang="en-US" dirty="0" smtClean="0"/>
-          </a:p>
-          <a:p>
-            <a:pPr lvl="1"/>
-            <a:endParaRPr lang="en-US" dirty="0" smtClean="0"/>
           </a:p>
         </p:txBody>
       </p:sp>
@@ -4692,21 +4863,7 @@
                 </a:uFill>
                 <a:latin typeface="Arial"/>
               </a:rPr>
-              <a:t>GitHub </a:t>
-            </a:r>
-            <a:r>
-              <a:rPr lang="en-US" sz="3200" spc="-1" dirty="0" smtClean="0">
-                <a:solidFill>
-                  <a:srgbClr val="000000"/>
-                </a:solidFill>
-                <a:uFill>
-                  <a:solidFill>
-                    <a:srgbClr val="FFFFFF"/>
-                  </a:solidFill>
-                </a:uFill>
-                <a:latin typeface="Arial"/>
-              </a:rPr>
-              <a:t>is just a web-based platform for </a:t>
+              <a:t>GitHub is just a web-based platform for </a:t>
             </a:r>
             <a:r>
               <a:rPr lang="en-US" sz="3200" spc="-1" dirty="0" err="1" smtClean="0">

</xml_diff>

<commit_message>
final changes before presentation on 11-08-2016
</commit_message>
<xml_diff>
--- a/github_demo_11082016.pptx
+++ b/github_demo_11082016.pptx
@@ -4,6 +4,9 @@
   <p:sldMasterIdLst>
     <p:sldMasterId id="2147483648" r:id="rId1"/>
   </p:sldMasterIdLst>
+  <p:notesMasterIdLst>
+    <p:notesMasterId r:id="rId19"/>
+  </p:notesMasterIdLst>
   <p:sldIdLst>
     <p:sldId id="256" r:id="rId2"/>
     <p:sldId id="257" r:id="rId3"/>
@@ -19,6 +22,9 @@
     <p:sldId id="267" r:id="rId13"/>
     <p:sldId id="269" r:id="rId14"/>
     <p:sldId id="261" r:id="rId15"/>
+    <p:sldId id="270" r:id="rId16"/>
+    <p:sldId id="271" r:id="rId17"/>
+    <p:sldId id="272" r:id="rId18"/>
   </p:sldIdLst>
   <p:sldSz cx="10080625" cy="7559675"/>
   <p:notesSz cx="7772400" cy="10058400"/>
@@ -123,6 +129,1480 @@
     </p:ext>
   </p:extLst>
 </p:presentation>
+</file>
+
+<file path=ppt/notesMasters/notesMaster1.xml><?xml version="1.0" encoding="utf-8"?>
+<p:notesMaster xmlns:a="http://schemas.openxmlformats.org/drawingml/2006/main" xmlns:r="http://schemas.openxmlformats.org/officeDocument/2006/relationships" xmlns:p="http://schemas.openxmlformats.org/presentationml/2006/main">
+  <p:cSld>
+    <p:bg>
+      <p:bgRef idx="1001">
+        <a:schemeClr val="bg1"/>
+      </p:bgRef>
+    </p:bg>
+    <p:spTree>
+      <p:nvGrpSpPr>
+        <p:cNvPr id="1" name=""/>
+        <p:cNvGrpSpPr/>
+        <p:nvPr/>
+      </p:nvGrpSpPr>
+      <p:grpSpPr>
+        <a:xfrm>
+          <a:off x="0" y="0"/>
+          <a:ext cx="0" cy="0"/>
+          <a:chOff x="0" y="0"/>
+          <a:chExt cx="0" cy="0"/>
+        </a:xfrm>
+      </p:grpSpPr>
+      <p:sp>
+        <p:nvSpPr>
+          <p:cNvPr id="2" name="Header Placeholder 1"/>
+          <p:cNvSpPr>
+            <a:spLocks noGrp="1"/>
+          </p:cNvSpPr>
+          <p:nvPr>
+            <p:ph type="hdr" sz="quarter"/>
+          </p:nvPr>
+        </p:nvSpPr>
+        <p:spPr>
+          <a:xfrm>
+            <a:off x="0" y="0"/>
+            <a:ext cx="3368675" cy="504825"/>
+          </a:xfrm>
+          <a:prstGeom prst="rect">
+            <a:avLst/>
+          </a:prstGeom>
+        </p:spPr>
+        <p:txBody>
+          <a:bodyPr vert="horz" lIns="91440" tIns="45720" rIns="91440" bIns="45720" rtlCol="0"/>
+          <a:lstStyle>
+            <a:lvl1pPr algn="l">
+              <a:defRPr sz="1200"/>
+            </a:lvl1pPr>
+          </a:lstStyle>
+          <a:p>
+            <a:endParaRPr lang="en-US"/>
+          </a:p>
+        </p:txBody>
+      </p:sp>
+      <p:sp>
+        <p:nvSpPr>
+          <p:cNvPr id="3" name="Date Placeholder 2"/>
+          <p:cNvSpPr>
+            <a:spLocks noGrp="1"/>
+          </p:cNvSpPr>
+          <p:nvPr>
+            <p:ph type="dt" idx="1"/>
+          </p:nvPr>
+        </p:nvSpPr>
+        <p:spPr>
+          <a:xfrm>
+            <a:off x="4402138" y="0"/>
+            <a:ext cx="3368675" cy="504825"/>
+          </a:xfrm>
+          <a:prstGeom prst="rect">
+            <a:avLst/>
+          </a:prstGeom>
+        </p:spPr>
+        <p:txBody>
+          <a:bodyPr vert="horz" lIns="91440" tIns="45720" rIns="91440" bIns="45720" rtlCol="0"/>
+          <a:lstStyle>
+            <a:lvl1pPr algn="r">
+              <a:defRPr sz="1200"/>
+            </a:lvl1pPr>
+          </a:lstStyle>
+          <a:p>
+            <a:fld id="{1B44D45B-E1AD-42EC-AC73-CE8215CB3A93}" type="datetimeFigureOut">
+              <a:rPr lang="en-US" smtClean="0"/>
+              <a:t>11/8/2016</a:t>
+            </a:fld>
+            <a:endParaRPr lang="en-US"/>
+          </a:p>
+        </p:txBody>
+      </p:sp>
+      <p:sp>
+        <p:nvSpPr>
+          <p:cNvPr id="4" name="Slide Image Placeholder 3"/>
+          <p:cNvSpPr>
+            <a:spLocks noGrp="1" noRot="1" noChangeAspect="1"/>
+          </p:cNvSpPr>
+          <p:nvPr>
+            <p:ph type="sldImg" idx="2"/>
+          </p:nvPr>
+        </p:nvSpPr>
+        <p:spPr>
+          <a:xfrm>
+            <a:off x="1624013" y="1257300"/>
+            <a:ext cx="4524375" cy="3394075"/>
+          </a:xfrm>
+          <a:prstGeom prst="rect">
+            <a:avLst/>
+          </a:prstGeom>
+          <a:noFill/>
+          <a:ln w="12700">
+            <a:solidFill>
+              <a:prstClr val="black"/>
+            </a:solidFill>
+          </a:ln>
+        </p:spPr>
+        <p:txBody>
+          <a:bodyPr vert="horz" lIns="91440" tIns="45720" rIns="91440" bIns="45720" rtlCol="0" anchor="ctr"/>
+          <a:lstStyle/>
+          <a:p>
+            <a:endParaRPr lang="en-US"/>
+          </a:p>
+        </p:txBody>
+      </p:sp>
+      <p:sp>
+        <p:nvSpPr>
+          <p:cNvPr id="5" name="Notes Placeholder 4"/>
+          <p:cNvSpPr>
+            <a:spLocks noGrp="1"/>
+          </p:cNvSpPr>
+          <p:nvPr>
+            <p:ph type="body" sz="quarter" idx="3"/>
+          </p:nvPr>
+        </p:nvSpPr>
+        <p:spPr>
+          <a:xfrm>
+            <a:off x="777875" y="4840288"/>
+            <a:ext cx="6216650" cy="3960812"/>
+          </a:xfrm>
+          <a:prstGeom prst="rect">
+            <a:avLst/>
+          </a:prstGeom>
+        </p:spPr>
+        <p:txBody>
+          <a:bodyPr vert="horz" lIns="91440" tIns="45720" rIns="91440" bIns="45720" rtlCol="0"/>
+          <a:lstStyle/>
+          <a:p>
+            <a:pPr lvl="0"/>
+            <a:r>
+              <a:rPr lang="en-US" smtClean="0"/>
+              <a:t>Click to edit Master text styles</a:t>
+            </a:r>
+          </a:p>
+          <a:p>
+            <a:pPr lvl="1"/>
+            <a:r>
+              <a:rPr lang="en-US" smtClean="0"/>
+              <a:t>Second level</a:t>
+            </a:r>
+          </a:p>
+          <a:p>
+            <a:pPr lvl="2"/>
+            <a:r>
+              <a:rPr lang="en-US" smtClean="0"/>
+              <a:t>Third level</a:t>
+            </a:r>
+          </a:p>
+          <a:p>
+            <a:pPr lvl="3"/>
+            <a:r>
+              <a:rPr lang="en-US" smtClean="0"/>
+              <a:t>Fourth level</a:t>
+            </a:r>
+          </a:p>
+          <a:p>
+            <a:pPr lvl="4"/>
+            <a:r>
+              <a:rPr lang="en-US" smtClean="0"/>
+              <a:t>Fifth level</a:t>
+            </a:r>
+            <a:endParaRPr lang="en-US"/>
+          </a:p>
+        </p:txBody>
+      </p:sp>
+      <p:sp>
+        <p:nvSpPr>
+          <p:cNvPr id="6" name="Footer Placeholder 5"/>
+          <p:cNvSpPr>
+            <a:spLocks noGrp="1"/>
+          </p:cNvSpPr>
+          <p:nvPr>
+            <p:ph type="ftr" sz="quarter" idx="4"/>
+          </p:nvPr>
+        </p:nvSpPr>
+        <p:spPr>
+          <a:xfrm>
+            <a:off x="0" y="9553575"/>
+            <a:ext cx="3368675" cy="504825"/>
+          </a:xfrm>
+          <a:prstGeom prst="rect">
+            <a:avLst/>
+          </a:prstGeom>
+        </p:spPr>
+        <p:txBody>
+          <a:bodyPr vert="horz" lIns="91440" tIns="45720" rIns="91440" bIns="45720" rtlCol="0" anchor="b"/>
+          <a:lstStyle>
+            <a:lvl1pPr algn="l">
+              <a:defRPr sz="1200"/>
+            </a:lvl1pPr>
+          </a:lstStyle>
+          <a:p>
+            <a:endParaRPr lang="en-US"/>
+          </a:p>
+        </p:txBody>
+      </p:sp>
+      <p:sp>
+        <p:nvSpPr>
+          <p:cNvPr id="7" name="Slide Number Placeholder 6"/>
+          <p:cNvSpPr>
+            <a:spLocks noGrp="1"/>
+          </p:cNvSpPr>
+          <p:nvPr>
+            <p:ph type="sldNum" sz="quarter" idx="5"/>
+          </p:nvPr>
+        </p:nvSpPr>
+        <p:spPr>
+          <a:xfrm>
+            <a:off x="4402138" y="9553575"/>
+            <a:ext cx="3368675" cy="504825"/>
+          </a:xfrm>
+          <a:prstGeom prst="rect">
+            <a:avLst/>
+          </a:prstGeom>
+        </p:spPr>
+        <p:txBody>
+          <a:bodyPr vert="horz" lIns="91440" tIns="45720" rIns="91440" bIns="45720" rtlCol="0" anchor="b"/>
+          <a:lstStyle>
+            <a:lvl1pPr algn="r">
+              <a:defRPr sz="1200"/>
+            </a:lvl1pPr>
+          </a:lstStyle>
+          <a:p>
+            <a:fld id="{587F8519-4A54-4F72-AACD-51BE3B796FF1}" type="slidenum">
+              <a:rPr lang="en-US" smtClean="0"/>
+              <a:t>‹#›</a:t>
+            </a:fld>
+            <a:endParaRPr lang="en-US"/>
+          </a:p>
+        </p:txBody>
+      </p:sp>
+    </p:spTree>
+    <p:extLst>
+      <p:ext uri="{BB962C8B-B14F-4D97-AF65-F5344CB8AC3E}">
+        <p14:creationId xmlns:p14="http://schemas.microsoft.com/office/powerpoint/2010/main" val="2335255918"/>
+      </p:ext>
+    </p:extLst>
+  </p:cSld>
+  <p:clrMap bg1="lt1" tx1="dk1" bg2="lt2" tx2="dk2" accent1="accent1" accent2="accent2" accent3="accent3" accent4="accent4" accent5="accent5" accent6="accent6" hlink="hlink" folHlink="folHlink"/>
+  <p:notesStyle>
+    <a:lvl1pPr marL="0" algn="l" defTabSz="914400" rtl="0" eaLnBrk="1" latinLnBrk="0" hangingPunct="1">
+      <a:defRPr sz="1200" kern="1200">
+        <a:solidFill>
+          <a:schemeClr val="tx1"/>
+        </a:solidFill>
+        <a:latin typeface="+mn-lt"/>
+        <a:ea typeface="+mn-ea"/>
+        <a:cs typeface="+mn-cs"/>
+      </a:defRPr>
+    </a:lvl1pPr>
+    <a:lvl2pPr marL="457200" algn="l" defTabSz="914400" rtl="0" eaLnBrk="1" latinLnBrk="0" hangingPunct="1">
+      <a:defRPr sz="1200" kern="1200">
+        <a:solidFill>
+          <a:schemeClr val="tx1"/>
+        </a:solidFill>
+        <a:latin typeface="+mn-lt"/>
+        <a:ea typeface="+mn-ea"/>
+        <a:cs typeface="+mn-cs"/>
+      </a:defRPr>
+    </a:lvl2pPr>
+    <a:lvl3pPr marL="914400" algn="l" defTabSz="914400" rtl="0" eaLnBrk="1" latinLnBrk="0" hangingPunct="1">
+      <a:defRPr sz="1200" kern="1200">
+        <a:solidFill>
+          <a:schemeClr val="tx1"/>
+        </a:solidFill>
+        <a:latin typeface="+mn-lt"/>
+        <a:ea typeface="+mn-ea"/>
+        <a:cs typeface="+mn-cs"/>
+      </a:defRPr>
+    </a:lvl3pPr>
+    <a:lvl4pPr marL="1371600" algn="l" defTabSz="914400" rtl="0" eaLnBrk="1" latinLnBrk="0" hangingPunct="1">
+      <a:defRPr sz="1200" kern="1200">
+        <a:solidFill>
+          <a:schemeClr val="tx1"/>
+        </a:solidFill>
+        <a:latin typeface="+mn-lt"/>
+        <a:ea typeface="+mn-ea"/>
+        <a:cs typeface="+mn-cs"/>
+      </a:defRPr>
+    </a:lvl4pPr>
+    <a:lvl5pPr marL="1828800" algn="l" defTabSz="914400" rtl="0" eaLnBrk="1" latinLnBrk="0" hangingPunct="1">
+      <a:defRPr sz="1200" kern="1200">
+        <a:solidFill>
+          <a:schemeClr val="tx1"/>
+        </a:solidFill>
+        <a:latin typeface="+mn-lt"/>
+        <a:ea typeface="+mn-ea"/>
+        <a:cs typeface="+mn-cs"/>
+      </a:defRPr>
+    </a:lvl5pPr>
+    <a:lvl6pPr marL="2286000" algn="l" defTabSz="914400" rtl="0" eaLnBrk="1" latinLnBrk="0" hangingPunct="1">
+      <a:defRPr sz="1200" kern="1200">
+        <a:solidFill>
+          <a:schemeClr val="tx1"/>
+        </a:solidFill>
+        <a:latin typeface="+mn-lt"/>
+        <a:ea typeface="+mn-ea"/>
+        <a:cs typeface="+mn-cs"/>
+      </a:defRPr>
+    </a:lvl6pPr>
+    <a:lvl7pPr marL="2743200" algn="l" defTabSz="914400" rtl="0" eaLnBrk="1" latinLnBrk="0" hangingPunct="1">
+      <a:defRPr sz="1200" kern="1200">
+        <a:solidFill>
+          <a:schemeClr val="tx1"/>
+        </a:solidFill>
+        <a:latin typeface="+mn-lt"/>
+        <a:ea typeface="+mn-ea"/>
+        <a:cs typeface="+mn-cs"/>
+      </a:defRPr>
+    </a:lvl7pPr>
+    <a:lvl8pPr marL="3200400" algn="l" defTabSz="914400" rtl="0" eaLnBrk="1" latinLnBrk="0" hangingPunct="1">
+      <a:defRPr sz="1200" kern="1200">
+        <a:solidFill>
+          <a:schemeClr val="tx1"/>
+        </a:solidFill>
+        <a:latin typeface="+mn-lt"/>
+        <a:ea typeface="+mn-ea"/>
+        <a:cs typeface="+mn-cs"/>
+      </a:defRPr>
+    </a:lvl8pPr>
+    <a:lvl9pPr marL="3657600" algn="l" defTabSz="914400" rtl="0" eaLnBrk="1" latinLnBrk="0" hangingPunct="1">
+      <a:defRPr sz="1200" kern="1200">
+        <a:solidFill>
+          <a:schemeClr val="tx1"/>
+        </a:solidFill>
+        <a:latin typeface="+mn-lt"/>
+        <a:ea typeface="+mn-ea"/>
+        <a:cs typeface="+mn-cs"/>
+      </a:defRPr>
+    </a:lvl9pPr>
+  </p:notesStyle>
+</p:notesMaster>
+</file>
+
+<file path=ppt/notesSlides/notesSlide1.xml><?xml version="1.0" encoding="utf-8"?>
+<p:notes xmlns:a="http://schemas.openxmlformats.org/drawingml/2006/main" xmlns:r="http://schemas.openxmlformats.org/officeDocument/2006/relationships" xmlns:p="http://schemas.openxmlformats.org/presentationml/2006/main">
+  <p:cSld>
+    <p:spTree>
+      <p:nvGrpSpPr>
+        <p:cNvPr id="1" name=""/>
+        <p:cNvGrpSpPr/>
+        <p:nvPr/>
+      </p:nvGrpSpPr>
+      <p:grpSpPr>
+        <a:xfrm>
+          <a:off x="0" y="0"/>
+          <a:ext cx="0" cy="0"/>
+          <a:chOff x="0" y="0"/>
+          <a:chExt cx="0" cy="0"/>
+        </a:xfrm>
+      </p:grpSpPr>
+      <p:sp>
+        <p:nvSpPr>
+          <p:cNvPr id="2" name="Slide Image Placeholder 1"/>
+          <p:cNvSpPr>
+            <a:spLocks noGrp="1" noRot="1" noChangeAspect="1"/>
+          </p:cNvSpPr>
+          <p:nvPr>
+            <p:ph type="sldImg"/>
+          </p:nvPr>
+        </p:nvSpPr>
+        <p:spPr/>
+      </p:sp>
+      <p:sp>
+        <p:nvSpPr>
+          <p:cNvPr id="3" name="Notes Placeholder 2"/>
+          <p:cNvSpPr>
+            <a:spLocks noGrp="1"/>
+          </p:cNvSpPr>
+          <p:nvPr>
+            <p:ph type="body" idx="1"/>
+          </p:nvPr>
+        </p:nvSpPr>
+        <p:spPr/>
+        <p:txBody>
+          <a:bodyPr/>
+          <a:lstStyle/>
+          <a:p>
+            <a:r>
+              <a:rPr lang="en-US" dirty="0" smtClean="0"/>
+              <a:t>Version control is the idea behind </a:t>
+            </a:r>
+            <a:r>
+              <a:rPr lang="en-US" dirty="0" err="1" smtClean="0"/>
+              <a:t>Git</a:t>
+            </a:r>
+            <a:r>
+              <a:rPr lang="en-US" dirty="0" smtClean="0"/>
+              <a:t>.</a:t>
+            </a:r>
+            <a:endParaRPr lang="en-US" dirty="0"/>
+          </a:p>
+        </p:txBody>
+      </p:sp>
+      <p:sp>
+        <p:nvSpPr>
+          <p:cNvPr id="4" name="Slide Number Placeholder 3"/>
+          <p:cNvSpPr>
+            <a:spLocks noGrp="1"/>
+          </p:cNvSpPr>
+          <p:nvPr>
+            <p:ph type="sldNum" sz="quarter" idx="10"/>
+          </p:nvPr>
+        </p:nvSpPr>
+        <p:spPr/>
+        <p:txBody>
+          <a:bodyPr/>
+          <a:lstStyle/>
+          <a:p>
+            <a:fld id="{587F8519-4A54-4F72-AACD-51BE3B796FF1}" type="slidenum">
+              <a:rPr lang="en-US" smtClean="0"/>
+              <a:t>2</a:t>
+            </a:fld>
+            <a:endParaRPr lang="en-US"/>
+          </a:p>
+        </p:txBody>
+      </p:sp>
+    </p:spTree>
+    <p:extLst>
+      <p:ext uri="{BB962C8B-B14F-4D97-AF65-F5344CB8AC3E}">
+        <p14:creationId xmlns:p14="http://schemas.microsoft.com/office/powerpoint/2010/main" val="1686746539"/>
+      </p:ext>
+    </p:extLst>
+  </p:cSld>
+  <p:clrMapOvr>
+    <a:masterClrMapping/>
+  </p:clrMapOvr>
+</p:notes>
+</file>
+
+<file path=ppt/notesSlides/notesSlide10.xml><?xml version="1.0" encoding="utf-8"?>
+<p:notes xmlns:a="http://schemas.openxmlformats.org/drawingml/2006/main" xmlns:r="http://schemas.openxmlformats.org/officeDocument/2006/relationships" xmlns:p="http://schemas.openxmlformats.org/presentationml/2006/main">
+  <p:cSld>
+    <p:spTree>
+      <p:nvGrpSpPr>
+        <p:cNvPr id="1" name=""/>
+        <p:cNvGrpSpPr/>
+        <p:nvPr/>
+      </p:nvGrpSpPr>
+      <p:grpSpPr>
+        <a:xfrm>
+          <a:off x="0" y="0"/>
+          <a:ext cx="0" cy="0"/>
+          <a:chOff x="0" y="0"/>
+          <a:chExt cx="0" cy="0"/>
+        </a:xfrm>
+      </p:grpSpPr>
+      <p:sp>
+        <p:nvSpPr>
+          <p:cNvPr id="2" name="Slide Image Placeholder 1"/>
+          <p:cNvSpPr>
+            <a:spLocks noGrp="1" noRot="1" noChangeAspect="1"/>
+          </p:cNvSpPr>
+          <p:nvPr>
+            <p:ph type="sldImg"/>
+          </p:nvPr>
+        </p:nvSpPr>
+        <p:spPr/>
+      </p:sp>
+      <p:sp>
+        <p:nvSpPr>
+          <p:cNvPr id="3" name="Notes Placeholder 2"/>
+          <p:cNvSpPr>
+            <a:spLocks noGrp="1"/>
+          </p:cNvSpPr>
+          <p:nvPr>
+            <p:ph type="body" idx="1"/>
+          </p:nvPr>
+        </p:nvSpPr>
+        <p:spPr/>
+        <p:txBody>
+          <a:bodyPr/>
+          <a:lstStyle/>
+          <a:p>
+            <a:r>
+              <a:rPr lang="en-US" dirty="0" smtClean="0"/>
+              <a:t>Once you’re done with your edits, you can make a pull request. A pull request notifies the repository owner</a:t>
+            </a:r>
+            <a:r>
+              <a:rPr lang="en-US" baseline="0" dirty="0" smtClean="0"/>
+              <a:t> that you have some proposed changes.</a:t>
+            </a:r>
+            <a:endParaRPr lang="en-US" dirty="0"/>
+          </a:p>
+        </p:txBody>
+      </p:sp>
+      <p:sp>
+        <p:nvSpPr>
+          <p:cNvPr id="4" name="Slide Number Placeholder 3"/>
+          <p:cNvSpPr>
+            <a:spLocks noGrp="1"/>
+          </p:cNvSpPr>
+          <p:nvPr>
+            <p:ph type="sldNum" sz="quarter" idx="10"/>
+          </p:nvPr>
+        </p:nvSpPr>
+        <p:spPr/>
+        <p:txBody>
+          <a:bodyPr/>
+          <a:lstStyle/>
+          <a:p>
+            <a:fld id="{587F8519-4A54-4F72-AACD-51BE3B796FF1}" type="slidenum">
+              <a:rPr lang="en-US" smtClean="0"/>
+              <a:t>15</a:t>
+            </a:fld>
+            <a:endParaRPr lang="en-US"/>
+          </a:p>
+        </p:txBody>
+      </p:sp>
+    </p:spTree>
+    <p:extLst>
+      <p:ext uri="{BB962C8B-B14F-4D97-AF65-F5344CB8AC3E}">
+        <p14:creationId xmlns:p14="http://schemas.microsoft.com/office/powerpoint/2010/main" val="761096908"/>
+      </p:ext>
+    </p:extLst>
+  </p:cSld>
+  <p:clrMapOvr>
+    <a:masterClrMapping/>
+  </p:clrMapOvr>
+</p:notes>
+</file>
+
+<file path=ppt/notesSlides/notesSlide11.xml><?xml version="1.0" encoding="utf-8"?>
+<p:notes xmlns:a="http://schemas.openxmlformats.org/drawingml/2006/main" xmlns:r="http://schemas.openxmlformats.org/officeDocument/2006/relationships" xmlns:p="http://schemas.openxmlformats.org/presentationml/2006/main">
+  <p:cSld>
+    <p:spTree>
+      <p:nvGrpSpPr>
+        <p:cNvPr id="1" name=""/>
+        <p:cNvGrpSpPr/>
+        <p:nvPr/>
+      </p:nvGrpSpPr>
+      <p:grpSpPr>
+        <a:xfrm>
+          <a:off x="0" y="0"/>
+          <a:ext cx="0" cy="0"/>
+          <a:chOff x="0" y="0"/>
+          <a:chExt cx="0" cy="0"/>
+        </a:xfrm>
+      </p:grpSpPr>
+      <p:sp>
+        <p:nvSpPr>
+          <p:cNvPr id="2" name="Slide Image Placeholder 1"/>
+          <p:cNvSpPr>
+            <a:spLocks noGrp="1" noRot="1" noChangeAspect="1"/>
+          </p:cNvSpPr>
+          <p:nvPr>
+            <p:ph type="sldImg"/>
+          </p:nvPr>
+        </p:nvSpPr>
+        <p:spPr/>
+      </p:sp>
+      <p:sp>
+        <p:nvSpPr>
+          <p:cNvPr id="3" name="Notes Placeholder 2"/>
+          <p:cNvSpPr>
+            <a:spLocks noGrp="1"/>
+          </p:cNvSpPr>
+          <p:nvPr>
+            <p:ph type="body" idx="1"/>
+          </p:nvPr>
+        </p:nvSpPr>
+        <p:spPr/>
+        <p:txBody>
+          <a:bodyPr/>
+          <a:lstStyle/>
+          <a:p>
+            <a:r>
+              <a:rPr lang="en-US" dirty="0" smtClean="0"/>
+              <a:t>Once</a:t>
+            </a:r>
+            <a:r>
+              <a:rPr lang="en-US" baseline="0" dirty="0" smtClean="0"/>
+              <a:t> the repo owner(s) decide what to do with the pull request, the branches can be deleted or left. Whatever you want.</a:t>
+            </a:r>
+            <a:endParaRPr lang="en-US" dirty="0"/>
+          </a:p>
+        </p:txBody>
+      </p:sp>
+      <p:sp>
+        <p:nvSpPr>
+          <p:cNvPr id="4" name="Slide Number Placeholder 3"/>
+          <p:cNvSpPr>
+            <a:spLocks noGrp="1"/>
+          </p:cNvSpPr>
+          <p:nvPr>
+            <p:ph type="sldNum" sz="quarter" idx="10"/>
+          </p:nvPr>
+        </p:nvSpPr>
+        <p:spPr/>
+        <p:txBody>
+          <a:bodyPr/>
+          <a:lstStyle/>
+          <a:p>
+            <a:fld id="{587F8519-4A54-4F72-AACD-51BE3B796FF1}" type="slidenum">
+              <a:rPr lang="en-US" smtClean="0"/>
+              <a:t>16</a:t>
+            </a:fld>
+            <a:endParaRPr lang="en-US"/>
+          </a:p>
+        </p:txBody>
+      </p:sp>
+    </p:spTree>
+    <p:extLst>
+      <p:ext uri="{BB962C8B-B14F-4D97-AF65-F5344CB8AC3E}">
+        <p14:creationId xmlns:p14="http://schemas.microsoft.com/office/powerpoint/2010/main" val="3901135488"/>
+      </p:ext>
+    </p:extLst>
+  </p:cSld>
+  <p:clrMapOvr>
+    <a:masterClrMapping/>
+  </p:clrMapOvr>
+</p:notes>
+</file>
+
+<file path=ppt/notesSlides/notesSlide12.xml><?xml version="1.0" encoding="utf-8"?>
+<p:notes xmlns:a="http://schemas.openxmlformats.org/drawingml/2006/main" xmlns:r="http://schemas.openxmlformats.org/officeDocument/2006/relationships" xmlns:p="http://schemas.openxmlformats.org/presentationml/2006/main">
+  <p:cSld>
+    <p:spTree>
+      <p:nvGrpSpPr>
+        <p:cNvPr id="1" name=""/>
+        <p:cNvGrpSpPr/>
+        <p:nvPr/>
+      </p:nvGrpSpPr>
+      <p:grpSpPr>
+        <a:xfrm>
+          <a:off x="0" y="0"/>
+          <a:ext cx="0" cy="0"/>
+          <a:chOff x="0" y="0"/>
+          <a:chExt cx="0" cy="0"/>
+        </a:xfrm>
+      </p:grpSpPr>
+      <p:sp>
+        <p:nvSpPr>
+          <p:cNvPr id="2" name="Slide Image Placeholder 1"/>
+          <p:cNvSpPr>
+            <a:spLocks noGrp="1" noRot="1" noChangeAspect="1"/>
+          </p:cNvSpPr>
+          <p:nvPr>
+            <p:ph type="sldImg"/>
+          </p:nvPr>
+        </p:nvSpPr>
+        <p:spPr/>
+      </p:sp>
+      <p:sp>
+        <p:nvSpPr>
+          <p:cNvPr id="3" name="Notes Placeholder 2"/>
+          <p:cNvSpPr>
+            <a:spLocks noGrp="1"/>
+          </p:cNvSpPr>
+          <p:nvPr>
+            <p:ph type="body" idx="1"/>
+          </p:nvPr>
+        </p:nvSpPr>
+        <p:spPr/>
+        <p:txBody>
+          <a:bodyPr/>
+          <a:lstStyle/>
+          <a:p>
+            <a:endParaRPr lang="en-US" dirty="0"/>
+          </a:p>
+        </p:txBody>
+      </p:sp>
+      <p:sp>
+        <p:nvSpPr>
+          <p:cNvPr id="4" name="Slide Number Placeholder 3"/>
+          <p:cNvSpPr>
+            <a:spLocks noGrp="1"/>
+          </p:cNvSpPr>
+          <p:nvPr>
+            <p:ph type="sldNum" sz="quarter" idx="10"/>
+          </p:nvPr>
+        </p:nvSpPr>
+        <p:spPr/>
+        <p:txBody>
+          <a:bodyPr/>
+          <a:lstStyle/>
+          <a:p>
+            <a:fld id="{587F8519-4A54-4F72-AACD-51BE3B796FF1}" type="slidenum">
+              <a:rPr lang="en-US" smtClean="0"/>
+              <a:t>17</a:t>
+            </a:fld>
+            <a:endParaRPr lang="en-US"/>
+          </a:p>
+        </p:txBody>
+      </p:sp>
+    </p:spTree>
+    <p:extLst>
+      <p:ext uri="{BB962C8B-B14F-4D97-AF65-F5344CB8AC3E}">
+        <p14:creationId xmlns:p14="http://schemas.microsoft.com/office/powerpoint/2010/main" val="1972121151"/>
+      </p:ext>
+    </p:extLst>
+  </p:cSld>
+  <p:clrMapOvr>
+    <a:masterClrMapping/>
+  </p:clrMapOvr>
+</p:notes>
+</file>
+
+<file path=ppt/notesSlides/notesSlide2.xml><?xml version="1.0" encoding="utf-8"?>
+<p:notes xmlns:a="http://schemas.openxmlformats.org/drawingml/2006/main" xmlns:r="http://schemas.openxmlformats.org/officeDocument/2006/relationships" xmlns:p="http://schemas.openxmlformats.org/presentationml/2006/main">
+  <p:cSld>
+    <p:spTree>
+      <p:nvGrpSpPr>
+        <p:cNvPr id="1" name=""/>
+        <p:cNvGrpSpPr/>
+        <p:nvPr/>
+      </p:nvGrpSpPr>
+      <p:grpSpPr>
+        <a:xfrm>
+          <a:off x="0" y="0"/>
+          <a:ext cx="0" cy="0"/>
+          <a:chOff x="0" y="0"/>
+          <a:chExt cx="0" cy="0"/>
+        </a:xfrm>
+      </p:grpSpPr>
+      <p:sp>
+        <p:nvSpPr>
+          <p:cNvPr id="2" name="Slide Image Placeholder 1"/>
+          <p:cNvSpPr>
+            <a:spLocks noGrp="1" noRot="1" noChangeAspect="1"/>
+          </p:cNvSpPr>
+          <p:nvPr>
+            <p:ph type="sldImg"/>
+          </p:nvPr>
+        </p:nvSpPr>
+        <p:spPr/>
+      </p:sp>
+      <p:sp>
+        <p:nvSpPr>
+          <p:cNvPr id="3" name="Notes Placeholder 2"/>
+          <p:cNvSpPr>
+            <a:spLocks noGrp="1"/>
+          </p:cNvSpPr>
+          <p:nvPr>
+            <p:ph type="body" idx="1"/>
+          </p:nvPr>
+        </p:nvSpPr>
+        <p:spPr/>
+        <p:txBody>
+          <a:bodyPr/>
+          <a:lstStyle/>
+          <a:p>
+            <a:r>
+              <a:rPr lang="en-US" dirty="0" smtClean="0"/>
+              <a:t>So that’s </a:t>
+            </a:r>
+            <a:r>
+              <a:rPr lang="en-US" dirty="0" err="1" smtClean="0"/>
+              <a:t>Git</a:t>
+            </a:r>
+            <a:r>
+              <a:rPr lang="en-US" dirty="0" smtClean="0"/>
+              <a:t>. What is GitHub?</a:t>
+            </a:r>
+          </a:p>
+          <a:p>
+            <a:r>
+              <a:rPr lang="en-US" dirty="0" smtClean="0"/>
+              <a:t>-------------------------------------</a:t>
+            </a:r>
+          </a:p>
+          <a:p>
+            <a:r>
+              <a:rPr lang="en-US" dirty="0" smtClean="0"/>
+              <a:t>It’s the</a:t>
+            </a:r>
+            <a:r>
+              <a:rPr lang="en-US" baseline="0" dirty="0" smtClean="0"/>
+              <a:t> most utilized public centralized source code location that amateur and professional software developers and companies use. Everyone from Facebook, Microsoft, R, the White House, the libraries of JavaScript that power nearly every web site you use are on GitHub.</a:t>
+            </a:r>
+            <a:endParaRPr lang="en-US" dirty="0"/>
+          </a:p>
+        </p:txBody>
+      </p:sp>
+      <p:sp>
+        <p:nvSpPr>
+          <p:cNvPr id="4" name="Slide Number Placeholder 3"/>
+          <p:cNvSpPr>
+            <a:spLocks noGrp="1"/>
+          </p:cNvSpPr>
+          <p:nvPr>
+            <p:ph type="sldNum" sz="quarter" idx="10"/>
+          </p:nvPr>
+        </p:nvSpPr>
+        <p:spPr/>
+        <p:txBody>
+          <a:bodyPr/>
+          <a:lstStyle/>
+          <a:p>
+            <a:fld id="{587F8519-4A54-4F72-AACD-51BE3B796FF1}" type="slidenum">
+              <a:rPr lang="en-US" smtClean="0"/>
+              <a:t>5</a:t>
+            </a:fld>
+            <a:endParaRPr lang="en-US"/>
+          </a:p>
+        </p:txBody>
+      </p:sp>
+    </p:spTree>
+    <p:extLst>
+      <p:ext uri="{BB962C8B-B14F-4D97-AF65-F5344CB8AC3E}">
+        <p14:creationId xmlns:p14="http://schemas.microsoft.com/office/powerpoint/2010/main" val="1417168024"/>
+      </p:ext>
+    </p:extLst>
+  </p:cSld>
+  <p:clrMapOvr>
+    <a:masterClrMapping/>
+  </p:clrMapOvr>
+</p:notes>
+</file>
+
+<file path=ppt/notesSlides/notesSlide3.xml><?xml version="1.0" encoding="utf-8"?>
+<p:notes xmlns:a="http://schemas.openxmlformats.org/drawingml/2006/main" xmlns:r="http://schemas.openxmlformats.org/officeDocument/2006/relationships" xmlns:p="http://schemas.openxmlformats.org/presentationml/2006/main">
+  <p:cSld>
+    <p:spTree>
+      <p:nvGrpSpPr>
+        <p:cNvPr id="1" name=""/>
+        <p:cNvGrpSpPr/>
+        <p:nvPr/>
+      </p:nvGrpSpPr>
+      <p:grpSpPr>
+        <a:xfrm>
+          <a:off x="0" y="0"/>
+          <a:ext cx="0" cy="0"/>
+          <a:chOff x="0" y="0"/>
+          <a:chExt cx="0" cy="0"/>
+        </a:xfrm>
+      </p:grpSpPr>
+      <p:sp>
+        <p:nvSpPr>
+          <p:cNvPr id="2" name="Slide Image Placeholder 1"/>
+          <p:cNvSpPr>
+            <a:spLocks noGrp="1" noRot="1" noChangeAspect="1"/>
+          </p:cNvSpPr>
+          <p:nvPr>
+            <p:ph type="sldImg"/>
+          </p:nvPr>
+        </p:nvSpPr>
+        <p:spPr/>
+      </p:sp>
+      <p:sp>
+        <p:nvSpPr>
+          <p:cNvPr id="3" name="Notes Placeholder 2"/>
+          <p:cNvSpPr>
+            <a:spLocks noGrp="1"/>
+          </p:cNvSpPr>
+          <p:nvPr>
+            <p:ph type="body" idx="1"/>
+          </p:nvPr>
+        </p:nvSpPr>
+        <p:spPr/>
+        <p:txBody>
+          <a:bodyPr/>
+          <a:lstStyle/>
+          <a:p>
+            <a:r>
+              <a:rPr lang="en-US" dirty="0" smtClean="0"/>
+              <a:t>Now we’ll go over the different ways you can interact with GitHub.</a:t>
+            </a:r>
+            <a:endParaRPr lang="en-US" dirty="0"/>
+          </a:p>
+        </p:txBody>
+      </p:sp>
+      <p:sp>
+        <p:nvSpPr>
+          <p:cNvPr id="4" name="Slide Number Placeholder 3"/>
+          <p:cNvSpPr>
+            <a:spLocks noGrp="1"/>
+          </p:cNvSpPr>
+          <p:nvPr>
+            <p:ph type="sldNum" sz="quarter" idx="10"/>
+          </p:nvPr>
+        </p:nvSpPr>
+        <p:spPr/>
+        <p:txBody>
+          <a:bodyPr/>
+          <a:lstStyle/>
+          <a:p>
+            <a:fld id="{587F8519-4A54-4F72-AACD-51BE3B796FF1}" type="slidenum">
+              <a:rPr lang="en-US" smtClean="0"/>
+              <a:t>6</a:t>
+            </a:fld>
+            <a:endParaRPr lang="en-US"/>
+          </a:p>
+        </p:txBody>
+      </p:sp>
+    </p:spTree>
+    <p:extLst>
+      <p:ext uri="{BB962C8B-B14F-4D97-AF65-F5344CB8AC3E}">
+        <p14:creationId xmlns:p14="http://schemas.microsoft.com/office/powerpoint/2010/main" val="4105192560"/>
+      </p:ext>
+    </p:extLst>
+  </p:cSld>
+  <p:clrMapOvr>
+    <a:masterClrMapping/>
+  </p:clrMapOvr>
+</p:notes>
+</file>
+
+<file path=ppt/notesSlides/notesSlide4.xml><?xml version="1.0" encoding="utf-8"?>
+<p:notes xmlns:a="http://schemas.openxmlformats.org/drawingml/2006/main" xmlns:r="http://schemas.openxmlformats.org/officeDocument/2006/relationships" xmlns:p="http://schemas.openxmlformats.org/presentationml/2006/main">
+  <p:cSld>
+    <p:spTree>
+      <p:nvGrpSpPr>
+        <p:cNvPr id="1" name=""/>
+        <p:cNvGrpSpPr/>
+        <p:nvPr/>
+      </p:nvGrpSpPr>
+      <p:grpSpPr>
+        <a:xfrm>
+          <a:off x="0" y="0"/>
+          <a:ext cx="0" cy="0"/>
+          <a:chOff x="0" y="0"/>
+          <a:chExt cx="0" cy="0"/>
+        </a:xfrm>
+      </p:grpSpPr>
+      <p:sp>
+        <p:nvSpPr>
+          <p:cNvPr id="2" name="Slide Image Placeholder 1"/>
+          <p:cNvSpPr>
+            <a:spLocks noGrp="1" noRot="1" noChangeAspect="1"/>
+          </p:cNvSpPr>
+          <p:nvPr>
+            <p:ph type="sldImg"/>
+          </p:nvPr>
+        </p:nvSpPr>
+        <p:spPr/>
+      </p:sp>
+      <p:sp>
+        <p:nvSpPr>
+          <p:cNvPr id="3" name="Notes Placeholder 2"/>
+          <p:cNvSpPr>
+            <a:spLocks noGrp="1"/>
+          </p:cNvSpPr>
+          <p:nvPr>
+            <p:ph type="body" idx="1"/>
+          </p:nvPr>
+        </p:nvSpPr>
+        <p:spPr/>
+        <p:txBody>
+          <a:bodyPr/>
+          <a:lstStyle/>
+          <a:p>
+            <a:r>
+              <a:rPr lang="en-US" dirty="0" smtClean="0"/>
+              <a:t>I don’t really use this desktop application for GitHub too much.</a:t>
+            </a:r>
+            <a:r>
+              <a:rPr lang="en-US" baseline="0" dirty="0" smtClean="0"/>
+              <a:t> It helps visualize GitHub for you.</a:t>
+            </a:r>
+            <a:endParaRPr lang="en-US" dirty="0"/>
+          </a:p>
+        </p:txBody>
+      </p:sp>
+      <p:sp>
+        <p:nvSpPr>
+          <p:cNvPr id="4" name="Slide Number Placeholder 3"/>
+          <p:cNvSpPr>
+            <a:spLocks noGrp="1"/>
+          </p:cNvSpPr>
+          <p:nvPr>
+            <p:ph type="sldNum" sz="quarter" idx="10"/>
+          </p:nvPr>
+        </p:nvSpPr>
+        <p:spPr/>
+        <p:txBody>
+          <a:bodyPr/>
+          <a:lstStyle/>
+          <a:p>
+            <a:fld id="{587F8519-4A54-4F72-AACD-51BE3B796FF1}" type="slidenum">
+              <a:rPr lang="en-US" smtClean="0"/>
+              <a:t>7</a:t>
+            </a:fld>
+            <a:endParaRPr lang="en-US"/>
+          </a:p>
+        </p:txBody>
+      </p:sp>
+    </p:spTree>
+    <p:extLst>
+      <p:ext uri="{BB962C8B-B14F-4D97-AF65-F5344CB8AC3E}">
+        <p14:creationId xmlns:p14="http://schemas.microsoft.com/office/powerpoint/2010/main" val="1461513675"/>
+      </p:ext>
+    </p:extLst>
+  </p:cSld>
+  <p:clrMapOvr>
+    <a:masterClrMapping/>
+  </p:clrMapOvr>
+</p:notes>
+</file>
+
+<file path=ppt/notesSlides/notesSlide5.xml><?xml version="1.0" encoding="utf-8"?>
+<p:notes xmlns:a="http://schemas.openxmlformats.org/drawingml/2006/main" xmlns:r="http://schemas.openxmlformats.org/officeDocument/2006/relationships" xmlns:p="http://schemas.openxmlformats.org/presentationml/2006/main">
+  <p:cSld>
+    <p:spTree>
+      <p:nvGrpSpPr>
+        <p:cNvPr id="1" name=""/>
+        <p:cNvGrpSpPr/>
+        <p:nvPr/>
+      </p:nvGrpSpPr>
+      <p:grpSpPr>
+        <a:xfrm>
+          <a:off x="0" y="0"/>
+          <a:ext cx="0" cy="0"/>
+          <a:chOff x="0" y="0"/>
+          <a:chExt cx="0" cy="0"/>
+        </a:xfrm>
+      </p:grpSpPr>
+      <p:sp>
+        <p:nvSpPr>
+          <p:cNvPr id="2" name="Slide Image Placeholder 1"/>
+          <p:cNvSpPr>
+            <a:spLocks noGrp="1" noRot="1" noChangeAspect="1"/>
+          </p:cNvSpPr>
+          <p:nvPr>
+            <p:ph type="sldImg"/>
+          </p:nvPr>
+        </p:nvSpPr>
+        <p:spPr/>
+      </p:sp>
+      <p:sp>
+        <p:nvSpPr>
+          <p:cNvPr id="3" name="Notes Placeholder 2"/>
+          <p:cNvSpPr>
+            <a:spLocks noGrp="1"/>
+          </p:cNvSpPr>
+          <p:nvPr>
+            <p:ph type="body" idx="1"/>
+          </p:nvPr>
+        </p:nvSpPr>
+        <p:spPr/>
+        <p:txBody>
+          <a:bodyPr/>
+          <a:lstStyle/>
+          <a:p>
+            <a:r>
+              <a:rPr lang="en-US" dirty="0" smtClean="0"/>
+              <a:t>A newer feature of GitHub is dragging and dropping files directly into GitHub. This screenshot is from the GitHub web page. Downside: as far as I can tell, it doesn’t really allow for connecting your</a:t>
+            </a:r>
+            <a:r>
+              <a:rPr lang="en-US" baseline="0" dirty="0" smtClean="0"/>
+              <a:t> local computer to the remote GitHub repository (I’ll explain what those words mean in a second.)</a:t>
+            </a:r>
+            <a:endParaRPr lang="en-US" dirty="0"/>
+          </a:p>
+        </p:txBody>
+      </p:sp>
+      <p:sp>
+        <p:nvSpPr>
+          <p:cNvPr id="4" name="Slide Number Placeholder 3"/>
+          <p:cNvSpPr>
+            <a:spLocks noGrp="1"/>
+          </p:cNvSpPr>
+          <p:nvPr>
+            <p:ph type="sldNum" sz="quarter" idx="10"/>
+          </p:nvPr>
+        </p:nvSpPr>
+        <p:spPr/>
+        <p:txBody>
+          <a:bodyPr/>
+          <a:lstStyle/>
+          <a:p>
+            <a:fld id="{587F8519-4A54-4F72-AACD-51BE3B796FF1}" type="slidenum">
+              <a:rPr lang="en-US" smtClean="0"/>
+              <a:t>8</a:t>
+            </a:fld>
+            <a:endParaRPr lang="en-US"/>
+          </a:p>
+        </p:txBody>
+      </p:sp>
+    </p:spTree>
+    <p:extLst>
+      <p:ext uri="{BB962C8B-B14F-4D97-AF65-F5344CB8AC3E}">
+        <p14:creationId xmlns:p14="http://schemas.microsoft.com/office/powerpoint/2010/main" val="2160485562"/>
+      </p:ext>
+    </p:extLst>
+  </p:cSld>
+  <p:clrMapOvr>
+    <a:masterClrMapping/>
+  </p:clrMapOvr>
+</p:notes>
+</file>
+
+<file path=ppt/notesSlides/notesSlide6.xml><?xml version="1.0" encoding="utf-8"?>
+<p:notes xmlns:a="http://schemas.openxmlformats.org/drawingml/2006/main" xmlns:r="http://schemas.openxmlformats.org/officeDocument/2006/relationships" xmlns:p="http://schemas.openxmlformats.org/presentationml/2006/main">
+  <p:cSld>
+    <p:spTree>
+      <p:nvGrpSpPr>
+        <p:cNvPr id="1" name=""/>
+        <p:cNvGrpSpPr/>
+        <p:nvPr/>
+      </p:nvGrpSpPr>
+      <p:grpSpPr>
+        <a:xfrm>
+          <a:off x="0" y="0"/>
+          <a:ext cx="0" cy="0"/>
+          <a:chOff x="0" y="0"/>
+          <a:chExt cx="0" cy="0"/>
+        </a:xfrm>
+      </p:grpSpPr>
+      <p:sp>
+        <p:nvSpPr>
+          <p:cNvPr id="2" name="Slide Image Placeholder 1"/>
+          <p:cNvSpPr>
+            <a:spLocks noGrp="1" noRot="1" noChangeAspect="1"/>
+          </p:cNvSpPr>
+          <p:nvPr>
+            <p:ph type="sldImg"/>
+          </p:nvPr>
+        </p:nvSpPr>
+        <p:spPr/>
+      </p:sp>
+      <p:sp>
+        <p:nvSpPr>
+          <p:cNvPr id="3" name="Notes Placeholder 2"/>
+          <p:cNvSpPr>
+            <a:spLocks noGrp="1"/>
+          </p:cNvSpPr>
+          <p:nvPr>
+            <p:ph type="body" idx="1"/>
+          </p:nvPr>
+        </p:nvSpPr>
+        <p:spPr/>
+        <p:txBody>
+          <a:bodyPr/>
+          <a:lstStyle/>
+          <a:p>
+            <a:r>
+              <a:rPr lang="en-US" dirty="0" smtClean="0"/>
+              <a:t>Right here, I’m on my</a:t>
+            </a:r>
+            <a:r>
+              <a:rPr lang="en-US" baseline="0" dirty="0" smtClean="0"/>
+              <a:t> GitHub account page. I’m creating a repository.</a:t>
+            </a:r>
+            <a:endParaRPr lang="en-US" dirty="0"/>
+          </a:p>
+        </p:txBody>
+      </p:sp>
+      <p:sp>
+        <p:nvSpPr>
+          <p:cNvPr id="4" name="Slide Number Placeholder 3"/>
+          <p:cNvSpPr>
+            <a:spLocks noGrp="1"/>
+          </p:cNvSpPr>
+          <p:nvPr>
+            <p:ph type="sldNum" sz="quarter" idx="10"/>
+          </p:nvPr>
+        </p:nvSpPr>
+        <p:spPr/>
+        <p:txBody>
+          <a:bodyPr/>
+          <a:lstStyle/>
+          <a:p>
+            <a:fld id="{587F8519-4A54-4F72-AACD-51BE3B796FF1}" type="slidenum">
+              <a:rPr lang="en-US" smtClean="0"/>
+              <a:t>10</a:t>
+            </a:fld>
+            <a:endParaRPr lang="en-US"/>
+          </a:p>
+        </p:txBody>
+      </p:sp>
+    </p:spTree>
+    <p:extLst>
+      <p:ext uri="{BB962C8B-B14F-4D97-AF65-F5344CB8AC3E}">
+        <p14:creationId xmlns:p14="http://schemas.microsoft.com/office/powerpoint/2010/main" val="2862366824"/>
+      </p:ext>
+    </p:extLst>
+  </p:cSld>
+  <p:clrMapOvr>
+    <a:masterClrMapping/>
+  </p:clrMapOvr>
+</p:notes>
+</file>
+
+<file path=ppt/notesSlides/notesSlide7.xml><?xml version="1.0" encoding="utf-8"?>
+<p:notes xmlns:a="http://schemas.openxmlformats.org/drawingml/2006/main" xmlns:r="http://schemas.openxmlformats.org/officeDocument/2006/relationships" xmlns:p="http://schemas.openxmlformats.org/presentationml/2006/main">
+  <p:cSld>
+    <p:spTree>
+      <p:nvGrpSpPr>
+        <p:cNvPr id="1" name=""/>
+        <p:cNvGrpSpPr/>
+        <p:nvPr/>
+      </p:nvGrpSpPr>
+      <p:grpSpPr>
+        <a:xfrm>
+          <a:off x="0" y="0"/>
+          <a:ext cx="0" cy="0"/>
+          <a:chOff x="0" y="0"/>
+          <a:chExt cx="0" cy="0"/>
+        </a:xfrm>
+      </p:grpSpPr>
+      <p:sp>
+        <p:nvSpPr>
+          <p:cNvPr id="2" name="Slide Image Placeholder 1"/>
+          <p:cNvSpPr>
+            <a:spLocks noGrp="1" noRot="1" noChangeAspect="1"/>
+          </p:cNvSpPr>
+          <p:nvPr>
+            <p:ph type="sldImg"/>
+          </p:nvPr>
+        </p:nvSpPr>
+        <p:spPr/>
+      </p:sp>
+      <p:sp>
+        <p:nvSpPr>
+          <p:cNvPr id="3" name="Notes Placeholder 2"/>
+          <p:cNvSpPr>
+            <a:spLocks noGrp="1"/>
+          </p:cNvSpPr>
+          <p:nvPr>
+            <p:ph type="body" idx="1"/>
+          </p:nvPr>
+        </p:nvSpPr>
+        <p:spPr/>
+        <p:txBody>
+          <a:bodyPr/>
+          <a:lstStyle/>
+          <a:p>
+            <a:r>
+              <a:rPr lang="en-US" dirty="0" smtClean="0"/>
+              <a:t>In this screenshot, I cloned the repository</a:t>
+            </a:r>
+            <a:r>
+              <a:rPr lang="en-US" baseline="0" dirty="0" smtClean="0"/>
+              <a:t> I created on GitHub to my local computer.</a:t>
+            </a:r>
+            <a:endParaRPr lang="en-US" dirty="0"/>
+          </a:p>
+        </p:txBody>
+      </p:sp>
+      <p:sp>
+        <p:nvSpPr>
+          <p:cNvPr id="4" name="Slide Number Placeholder 3"/>
+          <p:cNvSpPr>
+            <a:spLocks noGrp="1"/>
+          </p:cNvSpPr>
+          <p:nvPr>
+            <p:ph type="sldNum" sz="quarter" idx="10"/>
+          </p:nvPr>
+        </p:nvSpPr>
+        <p:spPr/>
+        <p:txBody>
+          <a:bodyPr/>
+          <a:lstStyle/>
+          <a:p>
+            <a:fld id="{587F8519-4A54-4F72-AACD-51BE3B796FF1}" type="slidenum">
+              <a:rPr lang="en-US" smtClean="0"/>
+              <a:t>11</a:t>
+            </a:fld>
+            <a:endParaRPr lang="en-US"/>
+          </a:p>
+        </p:txBody>
+      </p:sp>
+    </p:spTree>
+    <p:extLst>
+      <p:ext uri="{BB962C8B-B14F-4D97-AF65-F5344CB8AC3E}">
+        <p14:creationId xmlns:p14="http://schemas.microsoft.com/office/powerpoint/2010/main" val="2805114640"/>
+      </p:ext>
+    </p:extLst>
+  </p:cSld>
+  <p:clrMapOvr>
+    <a:masterClrMapping/>
+  </p:clrMapOvr>
+</p:notes>
+</file>
+
+<file path=ppt/notesSlides/notesSlide8.xml><?xml version="1.0" encoding="utf-8"?>
+<p:notes xmlns:a="http://schemas.openxmlformats.org/drawingml/2006/main" xmlns:r="http://schemas.openxmlformats.org/officeDocument/2006/relationships" xmlns:p="http://schemas.openxmlformats.org/presentationml/2006/main">
+  <p:cSld>
+    <p:spTree>
+      <p:nvGrpSpPr>
+        <p:cNvPr id="1" name=""/>
+        <p:cNvGrpSpPr/>
+        <p:nvPr/>
+      </p:nvGrpSpPr>
+      <p:grpSpPr>
+        <a:xfrm>
+          <a:off x="0" y="0"/>
+          <a:ext cx="0" cy="0"/>
+          <a:chOff x="0" y="0"/>
+          <a:chExt cx="0" cy="0"/>
+        </a:xfrm>
+      </p:grpSpPr>
+      <p:sp>
+        <p:nvSpPr>
+          <p:cNvPr id="2" name="Slide Image Placeholder 1"/>
+          <p:cNvSpPr>
+            <a:spLocks noGrp="1" noRot="1" noChangeAspect="1"/>
+          </p:cNvSpPr>
+          <p:nvPr>
+            <p:ph type="sldImg"/>
+          </p:nvPr>
+        </p:nvSpPr>
+        <p:spPr/>
+      </p:sp>
+      <p:sp>
+        <p:nvSpPr>
+          <p:cNvPr id="3" name="Notes Placeholder 2"/>
+          <p:cNvSpPr>
+            <a:spLocks noGrp="1"/>
+          </p:cNvSpPr>
+          <p:nvPr>
+            <p:ph type="body" idx="1"/>
+          </p:nvPr>
+        </p:nvSpPr>
+        <p:spPr/>
+        <p:txBody>
+          <a:bodyPr/>
+          <a:lstStyle/>
+          <a:p>
+            <a:r>
+              <a:rPr lang="en-US" dirty="0" smtClean="0"/>
+              <a:t>One project management tool GitHub has is tracking Issues. It</a:t>
+            </a:r>
+            <a:r>
+              <a:rPr lang="en-US" baseline="0" dirty="0" smtClean="0"/>
+              <a:t> can be future features you want to add, bugs, proposed changes. People can discuss the issue, and you can close the issue when it is solved. Solved can mean the changes have been made, or it has been discussed and decided not to act on the issue. </a:t>
+            </a:r>
+            <a:endParaRPr lang="en-US" dirty="0"/>
+          </a:p>
+        </p:txBody>
+      </p:sp>
+      <p:sp>
+        <p:nvSpPr>
+          <p:cNvPr id="4" name="Slide Number Placeholder 3"/>
+          <p:cNvSpPr>
+            <a:spLocks noGrp="1"/>
+          </p:cNvSpPr>
+          <p:nvPr>
+            <p:ph type="sldNum" sz="quarter" idx="10"/>
+          </p:nvPr>
+        </p:nvSpPr>
+        <p:spPr/>
+        <p:txBody>
+          <a:bodyPr/>
+          <a:lstStyle/>
+          <a:p>
+            <a:fld id="{587F8519-4A54-4F72-AACD-51BE3B796FF1}" type="slidenum">
+              <a:rPr lang="en-US" smtClean="0"/>
+              <a:t>13</a:t>
+            </a:fld>
+            <a:endParaRPr lang="en-US"/>
+          </a:p>
+        </p:txBody>
+      </p:sp>
+    </p:spTree>
+    <p:extLst>
+      <p:ext uri="{BB962C8B-B14F-4D97-AF65-F5344CB8AC3E}">
+        <p14:creationId xmlns:p14="http://schemas.microsoft.com/office/powerpoint/2010/main" val="2102573200"/>
+      </p:ext>
+    </p:extLst>
+  </p:cSld>
+  <p:clrMapOvr>
+    <a:masterClrMapping/>
+  </p:clrMapOvr>
+</p:notes>
+</file>
+
+<file path=ppt/notesSlides/notesSlide9.xml><?xml version="1.0" encoding="utf-8"?>
+<p:notes xmlns:a="http://schemas.openxmlformats.org/drawingml/2006/main" xmlns:r="http://schemas.openxmlformats.org/officeDocument/2006/relationships" xmlns:p="http://schemas.openxmlformats.org/presentationml/2006/main">
+  <p:cSld>
+    <p:spTree>
+      <p:nvGrpSpPr>
+        <p:cNvPr id="1" name=""/>
+        <p:cNvGrpSpPr/>
+        <p:nvPr/>
+      </p:nvGrpSpPr>
+      <p:grpSpPr>
+        <a:xfrm>
+          <a:off x="0" y="0"/>
+          <a:ext cx="0" cy="0"/>
+          <a:chOff x="0" y="0"/>
+          <a:chExt cx="0" cy="0"/>
+        </a:xfrm>
+      </p:grpSpPr>
+      <p:sp>
+        <p:nvSpPr>
+          <p:cNvPr id="2" name="Slide Image Placeholder 1"/>
+          <p:cNvSpPr>
+            <a:spLocks noGrp="1" noRot="1" noChangeAspect="1"/>
+          </p:cNvSpPr>
+          <p:nvPr>
+            <p:ph type="sldImg"/>
+          </p:nvPr>
+        </p:nvSpPr>
+        <p:spPr/>
+      </p:sp>
+      <p:sp>
+        <p:nvSpPr>
+          <p:cNvPr id="3" name="Notes Placeholder 2"/>
+          <p:cNvSpPr>
+            <a:spLocks noGrp="1"/>
+          </p:cNvSpPr>
+          <p:nvPr>
+            <p:ph type="body" idx="1"/>
+          </p:nvPr>
+        </p:nvSpPr>
+        <p:spPr/>
+        <p:txBody>
+          <a:bodyPr/>
+          <a:lstStyle/>
+          <a:p>
+            <a:r>
+              <a:rPr lang="en-US" dirty="0" smtClean="0"/>
+              <a:t>Branching is one of the more powerful aspects of version control. You</a:t>
+            </a:r>
+            <a:r>
+              <a:rPr lang="en-US" baseline="0" dirty="0" smtClean="0"/>
+              <a:t> can copy the repo and make separate branch(</a:t>
+            </a:r>
+            <a:r>
+              <a:rPr lang="en-US" baseline="0" dirty="0" err="1" smtClean="0"/>
+              <a:t>es</a:t>
+            </a:r>
+            <a:r>
+              <a:rPr lang="en-US" baseline="0" dirty="0" smtClean="0"/>
+              <a:t>) and edit to your heart’s content. You can branch off of branches.</a:t>
+            </a:r>
+            <a:endParaRPr lang="en-US" dirty="0"/>
+          </a:p>
+        </p:txBody>
+      </p:sp>
+      <p:sp>
+        <p:nvSpPr>
+          <p:cNvPr id="4" name="Slide Number Placeholder 3"/>
+          <p:cNvSpPr>
+            <a:spLocks noGrp="1"/>
+          </p:cNvSpPr>
+          <p:nvPr>
+            <p:ph type="sldNum" sz="quarter" idx="10"/>
+          </p:nvPr>
+        </p:nvSpPr>
+        <p:spPr/>
+        <p:txBody>
+          <a:bodyPr/>
+          <a:lstStyle/>
+          <a:p>
+            <a:fld id="{587F8519-4A54-4F72-AACD-51BE3B796FF1}" type="slidenum">
+              <a:rPr lang="en-US" smtClean="0"/>
+              <a:t>14</a:t>
+            </a:fld>
+            <a:endParaRPr lang="en-US"/>
+          </a:p>
+        </p:txBody>
+      </p:sp>
+    </p:spTree>
+    <p:extLst>
+      <p:ext uri="{BB962C8B-B14F-4D97-AF65-F5344CB8AC3E}">
+        <p14:creationId xmlns:p14="http://schemas.microsoft.com/office/powerpoint/2010/main" val="3342262045"/>
+      </p:ext>
+    </p:extLst>
+  </p:cSld>
+  <p:clrMapOvr>
+    <a:masterClrMapping/>
+  </p:clrMapOvr>
+</p:notes>
 </file>
 
 <file path=ppt/slideLayouts/slideLayout1.xml><?xml version="1.0" encoding="utf-8"?>
@@ -2630,19 +4110,8 @@
                 </a:uFill>
                 <a:latin typeface="Arial"/>
               </a:rPr>
-              <a:t>GitHub Example</a:t>
-            </a:r>
-            <a:endParaRPr lang="en-US" sz="3600" b="0" strike="noStrike" spc="-1" dirty="0" smtClean="0">
-              <a:solidFill>
-                <a:srgbClr val="000000"/>
-              </a:solidFill>
-              <a:uFill>
-                <a:solidFill>
-                  <a:srgbClr val="FFFFFF"/>
-                </a:solidFill>
-              </a:uFill>
-              <a:latin typeface="Arial"/>
-            </a:endParaRPr>
+              <a:t>Walk through a workflow example</a:t>
+            </a:r>
           </a:p>
           <a:p>
             <a:pPr marL="571500" indent="-571500">
@@ -2661,22 +4130,19 @@
                 </a:uFill>
                 <a:latin typeface="Arial"/>
               </a:rPr>
-              <a:t>Examples </a:t>
-            </a:r>
-            <a:r>
-              <a:rPr lang="en-US" sz="3600" b="0" strike="noStrike" spc="-1" dirty="0">
-                <a:solidFill>
-                  <a:srgbClr val="000000"/>
-                </a:solidFill>
-                <a:uFill>
-                  <a:solidFill>
-                    <a:srgbClr val="FFFFFF"/>
-                  </a:solidFill>
-                </a:uFill>
-                <a:latin typeface="Arial"/>
-              </a:rPr>
-              <a:t>of repositories</a:t>
-            </a:r>
+              <a:t>Take a look at the Coalition’s GitHub page</a:t>
+            </a:r>
+            <a:endParaRPr lang="en-US" sz="3600" b="0" strike="noStrike" spc="-1" dirty="0" smtClean="0">
+              <a:solidFill>
+                <a:srgbClr val="000000"/>
+              </a:solidFill>
+              <a:uFill>
+                <a:solidFill>
+                  <a:srgbClr val="FFFFFF"/>
+                </a:solidFill>
+              </a:uFill>
+              <a:latin typeface="Arial"/>
+            </a:endParaRPr>
           </a:p>
         </p:txBody>
       </p:sp>
@@ -2734,6 +4200,30 @@
       </p:grpSpPr>
       <p:sp>
         <p:nvSpPr>
+          <p:cNvPr id="2" name="Title 1"/>
+          <p:cNvSpPr>
+            <a:spLocks noGrp="1"/>
+          </p:cNvSpPr>
+          <p:nvPr>
+            <p:ph type="title"/>
+          </p:nvPr>
+        </p:nvSpPr>
+        <p:spPr/>
+        <p:txBody>
+          <a:bodyPr/>
+          <a:lstStyle/>
+          <a:p>
+            <a:pPr algn="ctr"/>
+            <a:r>
+              <a:rPr lang="en-US" dirty="0" smtClean="0"/>
+              <a:t>GitHub Lingo: Repositories</a:t>
+            </a:r>
+            <a:endParaRPr lang="en-US" dirty="0"/>
+          </a:p>
+        </p:txBody>
+      </p:sp>
+      <p:sp>
+        <p:nvSpPr>
           <p:cNvPr id="3" name="Text Placeholder 2"/>
           <p:cNvSpPr>
             <a:spLocks noGrp="1"/>
@@ -3003,30 +4493,6 @@
             </a:endParaRPr>
           </a:p>
           <a:p>
-            <a:endParaRPr lang="en-US" dirty="0"/>
-          </a:p>
-        </p:txBody>
-      </p:sp>
-      <p:sp>
-        <p:nvSpPr>
-          <p:cNvPr id="2" name="Title 1"/>
-          <p:cNvSpPr>
-            <a:spLocks noGrp="1"/>
-          </p:cNvSpPr>
-          <p:nvPr>
-            <p:ph type="title"/>
-          </p:nvPr>
-        </p:nvSpPr>
-        <p:spPr/>
-        <p:txBody>
-          <a:bodyPr/>
-          <a:lstStyle/>
-          <a:p>
-            <a:pPr algn="ctr"/>
-            <a:r>
-              <a:rPr lang="en-US" dirty="0" smtClean="0"/>
-              <a:t>GitHub Lingo: Repositories</a:t>
-            </a:r>
             <a:endParaRPr lang="en-US" dirty="0"/>
           </a:p>
         </p:txBody>
@@ -3040,7 +4506,7 @@
           <p:nvPr/>
         </p:nvPicPr>
         <p:blipFill>
-          <a:blip r:embed="rId2" cstate="print">
+          <a:blip r:embed="rId3" cstate="print">
             <a:extLst>
               <a:ext uri="{28A0092B-C50C-407E-A947-70E740481C1C}">
                 <a14:useLocalDpi xmlns:a14="http://schemas.microsoft.com/office/drawing/2010/main" val="0"/>
@@ -3100,6 +4566,30 @@
       </p:grpSpPr>
       <p:sp>
         <p:nvSpPr>
+          <p:cNvPr id="2" name="Title 1"/>
+          <p:cNvSpPr>
+            <a:spLocks noGrp="1"/>
+          </p:cNvSpPr>
+          <p:nvPr>
+            <p:ph type="title"/>
+          </p:nvPr>
+        </p:nvSpPr>
+        <p:spPr/>
+        <p:txBody>
+          <a:bodyPr/>
+          <a:lstStyle/>
+          <a:p>
+            <a:pPr algn="ctr"/>
+            <a:r>
+              <a:rPr lang="en-US" dirty="0" smtClean="0"/>
+              <a:t>GitHub Lingo: Initializing/Cloning</a:t>
+            </a:r>
+            <a:endParaRPr lang="en-US" dirty="0"/>
+          </a:p>
+        </p:txBody>
+      </p:sp>
+      <p:sp>
+        <p:nvSpPr>
           <p:cNvPr id="3" name="Text Placeholder 2"/>
           <p:cNvSpPr>
             <a:spLocks noGrp="1"/>
@@ -3151,30 +4641,6 @@
                 </a:schemeClr>
               </a:solidFill>
             </a:endParaRPr>
-          </a:p>
-        </p:txBody>
-      </p:sp>
-      <p:sp>
-        <p:nvSpPr>
-          <p:cNvPr id="2" name="Title 1"/>
-          <p:cNvSpPr>
-            <a:spLocks noGrp="1"/>
-          </p:cNvSpPr>
-          <p:nvPr>
-            <p:ph type="title"/>
-          </p:nvPr>
-        </p:nvSpPr>
-        <p:spPr/>
-        <p:txBody>
-          <a:bodyPr/>
-          <a:lstStyle/>
-          <a:p>
-            <a:pPr algn="ctr"/>
-            <a:r>
-              <a:rPr lang="en-US" dirty="0" smtClean="0"/>
-              <a:t>GitHub Lingo: Initializing/Cloning</a:t>
-            </a:r>
-            <a:endParaRPr lang="en-US" dirty="0"/>
           </a:p>
         </p:txBody>
       </p:sp>
@@ -3187,7 +4653,7 @@
           <p:nvPr/>
         </p:nvPicPr>
         <p:blipFill>
-          <a:blip r:embed="rId2">
+          <a:blip r:embed="rId3">
             <a:extLst>
               <a:ext uri="{28A0092B-C50C-407E-A947-70E740481C1C}">
                 <a14:useLocalDpi xmlns:a14="http://schemas.microsoft.com/office/drawing/2010/main" val="0"/>
@@ -3247,6 +4713,29 @@
       </p:grpSpPr>
       <p:sp>
         <p:nvSpPr>
+          <p:cNvPr id="2" name="Title 1"/>
+          <p:cNvSpPr>
+            <a:spLocks noGrp="1"/>
+          </p:cNvSpPr>
+          <p:nvPr>
+            <p:ph type="title"/>
+          </p:nvPr>
+        </p:nvSpPr>
+        <p:spPr/>
+        <p:txBody>
+          <a:bodyPr/>
+          <a:lstStyle/>
+          <a:p>
+            <a:r>
+              <a:rPr lang="en-US" dirty="0" smtClean="0"/>
+              <a:t>GitHub Lingo: Committing and Pushing Changes</a:t>
+            </a:r>
+            <a:endParaRPr lang="en-US" dirty="0"/>
+          </a:p>
+        </p:txBody>
+      </p:sp>
+      <p:sp>
+        <p:nvSpPr>
           <p:cNvPr id="3" name="Text Placeholder 2"/>
           <p:cNvSpPr>
             <a:spLocks noGrp="1"/>
@@ -3265,7 +4754,7 @@
               <a:t>After creating, adding, editing, or deleting files in local repo, you </a:t>
             </a:r>
             <a:r>
-              <a:rPr lang="en-US" dirty="0" smtClean="0">
+              <a:rPr lang="en-US" b="1" dirty="0" smtClean="0">
                 <a:solidFill>
                   <a:schemeClr val="accent2">
                     <a:lumMod val="75000"/>
@@ -3279,7 +4768,7 @@
               <a:t> the changes and </a:t>
             </a:r>
             <a:r>
-              <a:rPr lang="en-US" dirty="0" smtClean="0">
+              <a:rPr lang="en-US" b="1" dirty="0" smtClean="0">
                 <a:solidFill>
                   <a:schemeClr val="accent1">
                     <a:lumMod val="75000"/>
@@ -3291,29 +4780,6 @@
             <a:r>
               <a:rPr lang="en-US" dirty="0" smtClean="0"/>
               <a:t> them to GitHub.</a:t>
-            </a:r>
-            <a:endParaRPr lang="en-US" dirty="0"/>
-          </a:p>
-        </p:txBody>
-      </p:sp>
-      <p:sp>
-        <p:nvSpPr>
-          <p:cNvPr id="2" name="Title 1"/>
-          <p:cNvSpPr>
-            <a:spLocks noGrp="1"/>
-          </p:cNvSpPr>
-          <p:nvPr>
-            <p:ph type="title"/>
-          </p:nvPr>
-        </p:nvSpPr>
-        <p:spPr/>
-        <p:txBody>
-          <a:bodyPr/>
-          <a:lstStyle/>
-          <a:p>
-            <a:r>
-              <a:rPr lang="en-US" dirty="0" smtClean="0"/>
-              <a:t>GitHub Lingo: Committing and Pushing Changes</a:t>
             </a:r>
             <a:endParaRPr lang="en-US" dirty="0"/>
           </a:p>
@@ -3388,6 +4854,30 @@
       </p:grpSpPr>
       <p:sp>
         <p:nvSpPr>
+          <p:cNvPr id="2" name="Title 1"/>
+          <p:cNvSpPr>
+            <a:spLocks noGrp="1"/>
+          </p:cNvSpPr>
+          <p:nvPr>
+            <p:ph type="title"/>
+          </p:nvPr>
+        </p:nvSpPr>
+        <p:spPr/>
+        <p:txBody>
+          <a:bodyPr/>
+          <a:lstStyle/>
+          <a:p>
+            <a:pPr algn="ctr"/>
+            <a:r>
+              <a:rPr lang="en-US" dirty="0" smtClean="0"/>
+              <a:t>GitHub Lingo: Open and Close an Issue</a:t>
+            </a:r>
+            <a:endParaRPr lang="en-US" dirty="0"/>
+          </a:p>
+        </p:txBody>
+      </p:sp>
+      <p:sp>
+        <p:nvSpPr>
           <p:cNvPr id="3" name="Text Placeholder 2"/>
           <p:cNvSpPr>
             <a:spLocks noGrp="1"/>
@@ -3396,7 +4886,12 @@
             <p:ph type="body"/>
           </p:nvPr>
         </p:nvSpPr>
-        <p:spPr/>
+        <p:spPr>
+          <a:xfrm>
+            <a:off x="504000" y="1769039"/>
+            <a:ext cx="9071640" cy="5238047"/>
+          </a:xfrm>
+        </p:spPr>
         <p:txBody>
           <a:bodyPr/>
           <a:lstStyle/>
@@ -3421,11 +4916,15 @@
             </a:r>
             <a:r>
               <a:rPr lang="en-US" b="1" dirty="0" smtClean="0"/>
-              <a:t>Issue</a:t>
+              <a:t>issue</a:t>
             </a:r>
             <a:r>
               <a:rPr lang="en-US" dirty="0" smtClean="0"/>
-              <a:t> and </a:t>
+              <a:t> </a:t>
+            </a:r>
+            <a:r>
+              <a:rPr lang="en-US" dirty="0" smtClean="0"/>
+              <a:t>and </a:t>
             </a:r>
             <a:r>
               <a:rPr lang="en-US" b="1" dirty="0" smtClean="0">
@@ -3441,30 +4940,6 @@
             <a:r>
               <a:rPr lang="en-US" dirty="0" smtClean="0"/>
               <a:t> it when it is solved. You can also chat about it.</a:t>
-            </a:r>
-            <a:endParaRPr lang="en-US" dirty="0"/>
-          </a:p>
-        </p:txBody>
-      </p:sp>
-      <p:sp>
-        <p:nvSpPr>
-          <p:cNvPr id="2" name="Title 1"/>
-          <p:cNvSpPr>
-            <a:spLocks noGrp="1"/>
-          </p:cNvSpPr>
-          <p:nvPr>
-            <p:ph type="title"/>
-          </p:nvPr>
-        </p:nvSpPr>
-        <p:spPr/>
-        <p:txBody>
-          <a:bodyPr/>
-          <a:lstStyle/>
-          <a:p>
-            <a:pPr algn="ctr"/>
-            <a:r>
-              <a:rPr lang="en-US" dirty="0" smtClean="0"/>
-              <a:t>GitHub Lingo: Open and Close an Issue</a:t>
             </a:r>
             <a:endParaRPr lang="en-US" dirty="0"/>
           </a:p>
@@ -3479,7 +4954,7 @@
           <p:nvPr/>
         </p:nvPicPr>
         <p:blipFill>
-          <a:blip r:embed="rId2">
+          <a:blip r:embed="rId3">
             <a:extLst>
               <a:ext uri="{28A0092B-C50C-407E-A947-70E740481C1C}">
                 <a14:useLocalDpi xmlns:a14="http://schemas.microsoft.com/office/drawing/2010/main" val="0"/>
@@ -3637,7 +5112,9 @@
             <a:r>
               <a:rPr lang="en-US" sz="3200" b="1" strike="noStrike" spc="-1" dirty="0" smtClean="0">
                 <a:solidFill>
-                  <a:srgbClr val="000000"/>
+                  <a:schemeClr val="accent3">
+                    <a:lumMod val="75000"/>
+                  </a:schemeClr>
                 </a:solidFill>
                 <a:uFill>
                   <a:solidFill>
@@ -3651,7 +5128,9 @@
             <a:r>
               <a:rPr lang="en-US" sz="3200" strike="noStrike" spc="-1" dirty="0" smtClean="0">
                 <a:solidFill>
-                  <a:srgbClr val="000000"/>
+                  <a:schemeClr val="accent3">
+                    <a:lumMod val="75000"/>
+                  </a:schemeClr>
                 </a:solidFill>
                 <a:uFill>
                   <a:solidFill>
@@ -3660,7 +5139,81 @@
                 </a:uFill>
                 <a:latin typeface="Arial"/>
               </a:rPr>
-              <a:t> “branch” and save it to another branch.</a:t>
+              <a:t> </a:t>
+            </a:r>
+            <a:r>
+              <a:rPr lang="en-US" sz="3200" b="1" strike="noStrike" spc="-1" dirty="0" smtClean="0">
+                <a:solidFill>
+                  <a:schemeClr val="accent3">
+                    <a:lumMod val="75000"/>
+                  </a:schemeClr>
+                </a:solidFill>
+                <a:uFill>
+                  <a:solidFill>
+                    <a:srgbClr val="FFFFFF"/>
+                  </a:solidFill>
+                </a:uFill>
+                <a:latin typeface="Arial"/>
+              </a:rPr>
+              <a:t>branch</a:t>
+            </a:r>
+            <a:r>
+              <a:rPr lang="en-US" sz="3200" strike="noStrike" spc="-1" dirty="0" smtClean="0">
+                <a:solidFill>
+                  <a:srgbClr val="000000"/>
+                </a:solidFill>
+                <a:uFill>
+                  <a:solidFill>
+                    <a:srgbClr val="FFFFFF"/>
+                  </a:solidFill>
+                </a:uFill>
+                <a:latin typeface="Arial"/>
+              </a:rPr>
+              <a:t> </a:t>
+            </a:r>
+            <a:r>
+              <a:rPr lang="en-US" sz="3200" strike="noStrike" spc="-1" dirty="0" smtClean="0">
+                <a:solidFill>
+                  <a:srgbClr val="000000"/>
+                </a:solidFill>
+                <a:uFill>
+                  <a:solidFill>
+                    <a:srgbClr val="FFFFFF"/>
+                  </a:solidFill>
+                </a:uFill>
+                <a:latin typeface="Arial"/>
+              </a:rPr>
+              <a:t>and save it to another </a:t>
+            </a:r>
+            <a:r>
+              <a:rPr lang="en-US" sz="3200" b="1" strike="noStrike" spc="-1" dirty="0" smtClean="0">
+                <a:solidFill>
+                  <a:schemeClr val="accent2">
+                    <a:lumMod val="75000"/>
+                  </a:schemeClr>
+                </a:solidFill>
+                <a:uFill>
+                  <a:solidFill>
+                    <a:srgbClr val="FFFFFF"/>
+                  </a:solidFill>
+                </a:uFill>
+                <a:latin typeface="Arial"/>
+              </a:rPr>
+              <a:t>branch</a:t>
+            </a:r>
+            <a:r>
+              <a:rPr lang="en-US" sz="3200" strike="noStrike" spc="-1" dirty="0" smtClean="0">
+                <a:solidFill>
+                  <a:srgbClr val="000000"/>
+                </a:solidFill>
+                <a:uFill>
+                  <a:solidFill>
+                    <a:srgbClr val="FFFFFF"/>
+                  </a:solidFill>
+                </a:uFill>
+                <a:latin typeface="Arial"/>
+              </a:rPr>
+              <a:t>.</a:t>
             </a:r>
           </a:p>
           <a:p>
@@ -3672,87 +5225,7 @@
               <a:buFont typeface="Wingdings" charset="2"/>
               <a:buChar char=""/>
             </a:pPr>
-            <a:r>
-              <a:rPr lang="en-US" sz="3200" spc="-1" dirty="0" smtClean="0">
-                <a:solidFill>
-                  <a:srgbClr val="000000"/>
-                </a:solidFill>
-                <a:uFill>
-                  <a:solidFill>
-                    <a:srgbClr val="FFFFFF"/>
-                  </a:solidFill>
-                </a:uFill>
-                <a:latin typeface="Arial"/>
-              </a:rPr>
-              <a:t>Create a </a:t>
-            </a:r>
-            <a:r>
-              <a:rPr lang="en-US" sz="3200" b="1" spc="-1" dirty="0" smtClean="0">
-                <a:solidFill>
-                  <a:srgbClr val="000000"/>
-                </a:solidFill>
-                <a:uFill>
-                  <a:solidFill>
-                    <a:srgbClr val="FFFFFF"/>
-                  </a:solidFill>
-                </a:uFill>
-                <a:latin typeface="Arial"/>
-              </a:rPr>
-              <a:t>pull request</a:t>
-            </a:r>
-            <a:r>
-              <a:rPr lang="en-US" sz="3200" spc="-1" dirty="0" smtClean="0">
-                <a:solidFill>
-                  <a:srgbClr val="000000"/>
-                </a:solidFill>
-                <a:uFill>
-                  <a:solidFill>
-                    <a:srgbClr val="FFFFFF"/>
-                  </a:solidFill>
-                </a:uFill>
-                <a:latin typeface="Arial"/>
-              </a:rPr>
-              <a:t> to notify repo manager of change.</a:t>
-            </a:r>
-          </a:p>
-          <a:p>
-            <a:pPr marL="432000" indent="-324000">
-              <a:buClr>
-                <a:srgbClr val="000000"/>
-              </a:buClr>
-              <a:buSzPct val="45000"/>
-              <a:buFont typeface="Wingdings" charset="2"/>
-              <a:buChar char=""/>
-            </a:pPr>
-            <a:r>
-              <a:rPr lang="en-US" sz="3200" spc="-1" dirty="0" smtClean="0">
-                <a:solidFill>
-                  <a:srgbClr val="000000"/>
-                </a:solidFill>
-                <a:uFill>
-                  <a:solidFill>
-                    <a:srgbClr val="FFFFFF"/>
-                  </a:solidFill>
-                </a:uFill>
-                <a:latin typeface="Arial"/>
-              </a:rPr>
-              <a:t>Repo manager can decide to “pull” the changes into master branch… </a:t>
-            </a:r>
-            <a:r>
-              <a:rPr lang="en-US" sz="3200" spc="-1" smtClean="0">
-                <a:solidFill>
-                  <a:srgbClr val="000000"/>
-                </a:solidFill>
-                <a:uFill>
-                  <a:solidFill>
-                    <a:srgbClr val="FFFFFF"/>
-                  </a:solidFill>
-                </a:uFill>
-                <a:latin typeface="Arial"/>
-              </a:rPr>
-              <a:t>or reject them.</a:t>
-            </a:r>
-            <a:endParaRPr lang="en-US" sz="3200" strike="noStrike" spc="-1" dirty="0">
+            <a:endParaRPr lang="en-US" sz="3200" strike="noStrike" spc="-1" dirty="0" smtClean="0">
               <a:solidFill>
                 <a:srgbClr val="000000"/>
               </a:solidFill>
@@ -3766,6 +5239,36 @@
           </a:p>
         </p:txBody>
       </p:sp>
+      <p:pic>
+        <p:nvPicPr>
+          <p:cNvPr id="4" name="Picture 3"/>
+          <p:cNvPicPr>
+            <a:picLocks noChangeAspect="1"/>
+          </p:cNvPicPr>
+          <p:nvPr/>
+        </p:nvPicPr>
+        <p:blipFill>
+          <a:blip r:embed="rId3">
+            <a:extLst>
+              <a:ext uri="{28A0092B-C50C-407E-A947-70E740481C1C}">
+                <a14:useLocalDpi xmlns:a14="http://schemas.microsoft.com/office/drawing/2010/main" val="0"/>
+              </a:ext>
+            </a:extLst>
+          </a:blip>
+          <a:stretch>
+            <a:fillRect/>
+          </a:stretch>
+        </p:blipFill>
+        <p:spPr>
+          <a:xfrm>
+            <a:off x="905141" y="3086306"/>
+            <a:ext cx="8269357" cy="3272734"/>
+          </a:xfrm>
+          <a:prstGeom prst="rect">
+            <a:avLst/>
+          </a:prstGeom>
+        </p:spPr>
+      </p:pic>
     </p:spTree>
   </p:cSld>
   <p:clrMapOvr>
@@ -3795,6 +5298,714 @@
             </p:seq>
           </p:childTnLst>
         </p:cTn>
+      </p:par>
+    </p:tnLst>
+  </p:timing>
+</p:sld>
+</file>
+
+<file path=ppt/slides/slide15.xml><?xml version="1.0" encoding="utf-8"?>
+<p:sld xmlns:a="http://schemas.openxmlformats.org/drawingml/2006/main" xmlns:r="http://schemas.openxmlformats.org/officeDocument/2006/relationships" xmlns:p="http://schemas.openxmlformats.org/presentationml/2006/main">
+  <p:cSld>
+    <p:spTree>
+      <p:nvGrpSpPr>
+        <p:cNvPr id="1" name=""/>
+        <p:cNvGrpSpPr/>
+        <p:nvPr/>
+      </p:nvGrpSpPr>
+      <p:grpSpPr>
+        <a:xfrm>
+          <a:off x="0" y="0"/>
+          <a:ext cx="0" cy="0"/>
+          <a:chOff x="0" y="0"/>
+          <a:chExt cx="0" cy="0"/>
+        </a:xfrm>
+      </p:grpSpPr>
+      <p:sp>
+        <p:nvSpPr>
+          <p:cNvPr id="3" name="Text Placeholder 2"/>
+          <p:cNvSpPr>
+            <a:spLocks noGrp="1"/>
+          </p:cNvSpPr>
+          <p:nvPr>
+            <p:ph type="body"/>
+          </p:nvPr>
+        </p:nvSpPr>
+        <p:spPr/>
+        <p:txBody>
+          <a:bodyPr/>
+          <a:lstStyle/>
+          <a:p>
+            <a:pPr marL="432000" indent="-324000">
+              <a:buClr>
+                <a:srgbClr val="000000"/>
+              </a:buClr>
+              <a:buSzPct val="45000"/>
+              <a:buFont typeface="Wingdings" charset="2"/>
+              <a:buChar char=""/>
+            </a:pPr>
+            <a:r>
+              <a:rPr lang="en-US" spc="-1" dirty="0">
+                <a:solidFill>
+                  <a:srgbClr val="000000"/>
+                </a:solidFill>
+                <a:uFill>
+                  <a:solidFill>
+                    <a:srgbClr val="FFFFFF"/>
+                  </a:solidFill>
+                </a:uFill>
+              </a:rPr>
+              <a:t>Create a </a:t>
+            </a:r>
+            <a:r>
+              <a:rPr lang="en-US" b="1" spc="-1" dirty="0">
+                <a:solidFill>
+                  <a:schemeClr val="accent2">
+                    <a:lumMod val="75000"/>
+                  </a:schemeClr>
+                </a:solidFill>
+                <a:uFill>
+                  <a:solidFill>
+                    <a:srgbClr val="FFFFFF"/>
+                  </a:solidFill>
+                </a:uFill>
+              </a:rPr>
+              <a:t>pull request</a:t>
+            </a:r>
+            <a:r>
+              <a:rPr lang="en-US" spc="-1" dirty="0">
+                <a:solidFill>
+                  <a:srgbClr val="000000"/>
+                </a:solidFill>
+                <a:uFill>
+                  <a:solidFill>
+                    <a:srgbClr val="FFFFFF"/>
+                  </a:solidFill>
+                </a:uFill>
+              </a:rPr>
+              <a:t> to notify </a:t>
+            </a:r>
+            <a:r>
+              <a:rPr lang="en-US" b="1" spc="-1" dirty="0">
+                <a:solidFill>
+                  <a:schemeClr val="accent3">
+                    <a:lumMod val="75000"/>
+                  </a:schemeClr>
+                </a:solidFill>
+                <a:uFill>
+                  <a:solidFill>
+                    <a:srgbClr val="FFFFFF"/>
+                  </a:solidFill>
+                </a:uFill>
+              </a:rPr>
+              <a:t>repo owner</a:t>
+            </a:r>
+            <a:r>
+              <a:rPr lang="en-US" b="1" spc="-1" dirty="0">
+                <a:solidFill>
+                  <a:srgbClr val="000000"/>
+                </a:solidFill>
+                <a:uFill>
+                  <a:solidFill>
+                    <a:srgbClr val="FFFFFF"/>
+                  </a:solidFill>
+                </a:uFill>
+              </a:rPr>
+              <a:t> </a:t>
+            </a:r>
+            <a:r>
+              <a:rPr lang="en-US" spc="-1" dirty="0">
+                <a:solidFill>
+                  <a:srgbClr val="000000"/>
+                </a:solidFill>
+                <a:uFill>
+                  <a:solidFill>
+                    <a:srgbClr val="FFFFFF"/>
+                  </a:solidFill>
+                </a:uFill>
+              </a:rPr>
+              <a:t>of change</a:t>
+            </a:r>
+            <a:r>
+              <a:rPr lang="en-US" spc="-1" dirty="0" smtClean="0">
+                <a:solidFill>
+                  <a:srgbClr val="000000"/>
+                </a:solidFill>
+                <a:uFill>
+                  <a:solidFill>
+                    <a:srgbClr val="FFFFFF"/>
+                  </a:solidFill>
+                </a:uFill>
+              </a:rPr>
+              <a:t>.</a:t>
+            </a:r>
+          </a:p>
+          <a:p>
+            <a:pPr marL="432000" indent="-324000">
+              <a:buClr>
+                <a:srgbClr val="000000"/>
+              </a:buClr>
+              <a:buSzPct val="45000"/>
+              <a:buFont typeface="Wingdings" charset="2"/>
+              <a:buChar char=""/>
+            </a:pPr>
+            <a:endParaRPr lang="en-US" spc="-1" dirty="0" smtClean="0">
+              <a:solidFill>
+                <a:srgbClr val="000000"/>
+              </a:solidFill>
+              <a:uFill>
+                <a:solidFill>
+                  <a:srgbClr val="FFFFFF"/>
+                </a:solidFill>
+              </a:uFill>
+            </a:endParaRPr>
+          </a:p>
+          <a:p>
+            <a:pPr marL="432000" indent="-324000">
+              <a:buClr>
+                <a:srgbClr val="000000"/>
+              </a:buClr>
+              <a:buSzPct val="45000"/>
+              <a:buFont typeface="Wingdings" charset="2"/>
+              <a:buChar char=""/>
+            </a:pPr>
+            <a:endParaRPr lang="en-US" spc="-1" dirty="0">
+              <a:solidFill>
+                <a:srgbClr val="000000"/>
+              </a:solidFill>
+              <a:uFill>
+                <a:solidFill>
+                  <a:srgbClr val="FFFFFF"/>
+                </a:solidFill>
+              </a:uFill>
+            </a:endParaRPr>
+          </a:p>
+          <a:p>
+            <a:endParaRPr lang="en-US" dirty="0"/>
+          </a:p>
+        </p:txBody>
+      </p:sp>
+      <p:sp>
+        <p:nvSpPr>
+          <p:cNvPr id="2" name="Title 1"/>
+          <p:cNvSpPr>
+            <a:spLocks noGrp="1"/>
+          </p:cNvSpPr>
+          <p:nvPr>
+            <p:ph type="title"/>
+          </p:nvPr>
+        </p:nvSpPr>
+        <p:spPr/>
+        <p:txBody>
+          <a:bodyPr>
+            <a:normAutofit fontScale="90000"/>
+          </a:bodyPr>
+          <a:lstStyle/>
+          <a:p>
+            <a:pPr algn="ctr"/>
+            <a:r>
+              <a:rPr lang="en-US" spc="-1" dirty="0" smtClean="0">
+                <a:solidFill>
+                  <a:srgbClr val="000000"/>
+                </a:solidFill>
+                <a:uFill>
+                  <a:solidFill>
+                    <a:srgbClr val="FFFFFF"/>
+                  </a:solidFill>
+                </a:uFill>
+              </a:rPr>
+              <a:t/>
+            </a:r>
+            <a:br>
+              <a:rPr lang="en-US" spc="-1" dirty="0" smtClean="0">
+                <a:solidFill>
+                  <a:srgbClr val="000000"/>
+                </a:solidFill>
+                <a:uFill>
+                  <a:solidFill>
+                    <a:srgbClr val="FFFFFF"/>
+                  </a:solidFill>
+                </a:uFill>
+              </a:rPr>
+            </a:br>
+            <a:r>
+              <a:rPr lang="en-US" spc="-1" dirty="0" smtClean="0">
+                <a:solidFill>
+                  <a:srgbClr val="000000"/>
+                </a:solidFill>
+                <a:uFill>
+                  <a:solidFill>
+                    <a:srgbClr val="FFFFFF"/>
+                  </a:solidFill>
+                </a:uFill>
+              </a:rPr>
+              <a:t>GitHub </a:t>
+            </a:r>
+            <a:r>
+              <a:rPr lang="en-US" spc="-1" dirty="0">
+                <a:solidFill>
+                  <a:srgbClr val="000000"/>
+                </a:solidFill>
+                <a:uFill>
+                  <a:solidFill>
+                    <a:srgbClr val="FFFFFF"/>
+                  </a:solidFill>
+                </a:uFill>
+              </a:rPr>
+              <a:t>Lingo: Branching &amp; Pull Requests</a:t>
+            </a:r>
+            <a:br>
+              <a:rPr lang="en-US" spc="-1" dirty="0">
+                <a:solidFill>
+                  <a:srgbClr val="000000"/>
+                </a:solidFill>
+                <a:uFill>
+                  <a:solidFill>
+                    <a:srgbClr val="FFFFFF"/>
+                  </a:solidFill>
+                </a:uFill>
+              </a:rPr>
+            </a:br>
+            <a:endParaRPr lang="en-US" dirty="0"/>
+          </a:p>
+        </p:txBody>
+      </p:sp>
+      <p:pic>
+        <p:nvPicPr>
+          <p:cNvPr id="5" name="Picture 4"/>
+          <p:cNvPicPr>
+            <a:picLocks noChangeAspect="1"/>
+          </p:cNvPicPr>
+          <p:nvPr/>
+        </p:nvPicPr>
+        <p:blipFill>
+          <a:blip r:embed="rId3">
+            <a:extLst>
+              <a:ext uri="{28A0092B-C50C-407E-A947-70E740481C1C}">
+                <a14:useLocalDpi xmlns:a14="http://schemas.microsoft.com/office/drawing/2010/main" val="0"/>
+              </a:ext>
+            </a:extLst>
+          </a:blip>
+          <a:stretch>
+            <a:fillRect/>
+          </a:stretch>
+        </p:blipFill>
+        <p:spPr>
+          <a:xfrm>
+            <a:off x="1332524" y="2473624"/>
+            <a:ext cx="7414591" cy="3885416"/>
+          </a:xfrm>
+          <a:prstGeom prst="rect">
+            <a:avLst/>
+          </a:prstGeom>
+        </p:spPr>
+      </p:pic>
+    </p:spTree>
+    <p:extLst>
+      <p:ext uri="{BB962C8B-B14F-4D97-AF65-F5344CB8AC3E}">
+        <p14:creationId xmlns:p14="http://schemas.microsoft.com/office/powerpoint/2010/main" val="3911011718"/>
+      </p:ext>
+    </p:extLst>
+  </p:cSld>
+  <p:clrMapOvr>
+    <a:masterClrMapping/>
+  </p:clrMapOvr>
+  <p:timing>
+    <p:tnLst>
+      <p:par>
+        <p:cTn id="1" dur="indefinite" restart="never" nodeType="tmRoot"/>
+      </p:par>
+    </p:tnLst>
+  </p:timing>
+</p:sld>
+</file>
+
+<file path=ppt/slides/slide16.xml><?xml version="1.0" encoding="utf-8"?>
+<p:sld xmlns:a="http://schemas.openxmlformats.org/drawingml/2006/main" xmlns:r="http://schemas.openxmlformats.org/officeDocument/2006/relationships" xmlns:p="http://schemas.openxmlformats.org/presentationml/2006/main">
+  <p:cSld>
+    <p:spTree>
+      <p:nvGrpSpPr>
+        <p:cNvPr id="1" name=""/>
+        <p:cNvGrpSpPr/>
+        <p:nvPr/>
+      </p:nvGrpSpPr>
+      <p:grpSpPr>
+        <a:xfrm>
+          <a:off x="0" y="0"/>
+          <a:ext cx="0" cy="0"/>
+          <a:chOff x="0" y="0"/>
+          <a:chExt cx="0" cy="0"/>
+        </a:xfrm>
+      </p:grpSpPr>
+      <p:sp>
+        <p:nvSpPr>
+          <p:cNvPr id="3" name="Text Placeholder 2"/>
+          <p:cNvSpPr>
+            <a:spLocks noGrp="1"/>
+          </p:cNvSpPr>
+          <p:nvPr>
+            <p:ph type="body"/>
+          </p:nvPr>
+        </p:nvSpPr>
+        <p:spPr/>
+        <p:txBody>
+          <a:bodyPr/>
+          <a:lstStyle/>
+          <a:p>
+            <a:r>
+              <a:rPr lang="en-US" b="1" spc="-1" dirty="0">
+                <a:solidFill>
+                  <a:schemeClr val="accent4">
+                    <a:lumMod val="75000"/>
+                  </a:schemeClr>
+                </a:solidFill>
+                <a:uFill>
+                  <a:solidFill>
+                    <a:srgbClr val="FFFFFF"/>
+                  </a:solidFill>
+                </a:uFill>
+              </a:rPr>
+              <a:t>Repo owner</a:t>
+            </a:r>
+            <a:r>
+              <a:rPr lang="en-US" b="1" spc="-1" dirty="0">
+                <a:solidFill>
+                  <a:srgbClr val="000000"/>
+                </a:solidFill>
+                <a:uFill>
+                  <a:solidFill>
+                    <a:srgbClr val="FFFFFF"/>
+                  </a:solidFill>
+                </a:uFill>
+              </a:rPr>
+              <a:t> </a:t>
+            </a:r>
+            <a:r>
+              <a:rPr lang="en-US" spc="-1" dirty="0">
+                <a:solidFill>
+                  <a:srgbClr val="000000"/>
+                </a:solidFill>
+                <a:uFill>
+                  <a:solidFill>
+                    <a:srgbClr val="FFFFFF"/>
+                  </a:solidFill>
+                </a:uFill>
+              </a:rPr>
+              <a:t>can decide to </a:t>
+            </a:r>
+            <a:r>
+              <a:rPr lang="en-US" b="1" spc="-1" dirty="0">
+                <a:solidFill>
+                  <a:schemeClr val="accent2">
+                    <a:lumMod val="75000"/>
+                  </a:schemeClr>
+                </a:solidFill>
+                <a:uFill>
+                  <a:solidFill>
+                    <a:srgbClr val="FFFFFF"/>
+                  </a:solidFill>
+                </a:uFill>
+              </a:rPr>
+              <a:t>pull</a:t>
+            </a:r>
+            <a:r>
+              <a:rPr lang="en-US" spc="-1" dirty="0">
+                <a:solidFill>
+                  <a:srgbClr val="000000"/>
+                </a:solidFill>
+                <a:uFill>
+                  <a:solidFill>
+                    <a:srgbClr val="FFFFFF"/>
+                  </a:solidFill>
+                </a:uFill>
+              </a:rPr>
+              <a:t> the changes into </a:t>
+            </a:r>
+            <a:r>
+              <a:rPr lang="en-US" b="1" spc="-1" dirty="0">
+                <a:solidFill>
+                  <a:schemeClr val="accent1">
+                    <a:lumMod val="75000"/>
+                  </a:schemeClr>
+                </a:solidFill>
+                <a:uFill>
+                  <a:solidFill>
+                    <a:srgbClr val="FFFFFF"/>
+                  </a:solidFill>
+                </a:uFill>
+              </a:rPr>
+              <a:t>master</a:t>
+            </a:r>
+            <a:r>
+              <a:rPr lang="en-US" spc="-1" dirty="0">
+                <a:solidFill>
+                  <a:schemeClr val="accent1">
+                    <a:lumMod val="75000"/>
+                  </a:schemeClr>
+                </a:solidFill>
+                <a:uFill>
+                  <a:solidFill>
+                    <a:srgbClr val="FFFFFF"/>
+                  </a:solidFill>
+                </a:uFill>
+              </a:rPr>
+              <a:t> </a:t>
+            </a:r>
+            <a:r>
+              <a:rPr lang="en-US" b="1" spc="-1" dirty="0">
+                <a:solidFill>
+                  <a:schemeClr val="accent1">
+                    <a:lumMod val="75000"/>
+                  </a:schemeClr>
+                </a:solidFill>
+                <a:uFill>
+                  <a:solidFill>
+                    <a:srgbClr val="FFFFFF"/>
+                  </a:solidFill>
+                </a:uFill>
+              </a:rPr>
+              <a:t>branch</a:t>
+            </a:r>
+            <a:r>
+              <a:rPr lang="en-US" spc="-1" dirty="0">
+                <a:solidFill>
+                  <a:srgbClr val="000000"/>
+                </a:solidFill>
+                <a:uFill>
+                  <a:solidFill>
+                    <a:srgbClr val="FFFFFF"/>
+                  </a:solidFill>
+                </a:uFill>
+              </a:rPr>
+              <a:t>… or reject them.</a:t>
+            </a:r>
+          </a:p>
+          <a:p>
+            <a:endParaRPr lang="en-US" dirty="0"/>
+          </a:p>
+        </p:txBody>
+      </p:sp>
+      <p:sp>
+        <p:nvSpPr>
+          <p:cNvPr id="2" name="Title 1"/>
+          <p:cNvSpPr>
+            <a:spLocks noGrp="1"/>
+          </p:cNvSpPr>
+          <p:nvPr>
+            <p:ph type="title"/>
+          </p:nvPr>
+        </p:nvSpPr>
+        <p:spPr/>
+        <p:txBody>
+          <a:bodyPr>
+            <a:normAutofit fontScale="90000"/>
+          </a:bodyPr>
+          <a:lstStyle/>
+          <a:p>
+            <a:pPr algn="ctr"/>
+            <a:r>
+              <a:rPr lang="en-US" spc="-1" dirty="0" smtClean="0">
+                <a:solidFill>
+                  <a:srgbClr val="000000"/>
+                </a:solidFill>
+                <a:uFill>
+                  <a:solidFill>
+                    <a:srgbClr val="FFFFFF"/>
+                  </a:solidFill>
+                </a:uFill>
+              </a:rPr>
+              <a:t/>
+            </a:r>
+            <a:br>
+              <a:rPr lang="en-US" spc="-1" dirty="0" smtClean="0">
+                <a:solidFill>
+                  <a:srgbClr val="000000"/>
+                </a:solidFill>
+                <a:uFill>
+                  <a:solidFill>
+                    <a:srgbClr val="FFFFFF"/>
+                  </a:solidFill>
+                </a:uFill>
+              </a:rPr>
+            </a:br>
+            <a:r>
+              <a:rPr lang="en-US" spc="-1" dirty="0" smtClean="0">
+                <a:solidFill>
+                  <a:srgbClr val="000000"/>
+                </a:solidFill>
+                <a:uFill>
+                  <a:solidFill>
+                    <a:srgbClr val="FFFFFF"/>
+                  </a:solidFill>
+                </a:uFill>
+              </a:rPr>
+              <a:t>GitHub </a:t>
+            </a:r>
+            <a:r>
+              <a:rPr lang="en-US" spc="-1" dirty="0">
+                <a:solidFill>
+                  <a:srgbClr val="000000"/>
+                </a:solidFill>
+                <a:uFill>
+                  <a:solidFill>
+                    <a:srgbClr val="FFFFFF"/>
+                  </a:solidFill>
+                </a:uFill>
+              </a:rPr>
+              <a:t>Lingo: Branching &amp; Pull Requests</a:t>
+            </a:r>
+            <a:br>
+              <a:rPr lang="en-US" spc="-1" dirty="0">
+                <a:solidFill>
+                  <a:srgbClr val="000000"/>
+                </a:solidFill>
+                <a:uFill>
+                  <a:solidFill>
+                    <a:srgbClr val="FFFFFF"/>
+                  </a:solidFill>
+                </a:uFill>
+              </a:rPr>
+            </a:br>
+            <a:endParaRPr lang="en-US" dirty="0"/>
+          </a:p>
+        </p:txBody>
+      </p:sp>
+      <p:pic>
+        <p:nvPicPr>
+          <p:cNvPr id="4" name="Picture 3"/>
+          <p:cNvPicPr>
+            <a:picLocks noChangeAspect="1"/>
+          </p:cNvPicPr>
+          <p:nvPr/>
+        </p:nvPicPr>
+        <p:blipFill>
+          <a:blip r:embed="rId3">
+            <a:extLst>
+              <a:ext uri="{28A0092B-C50C-407E-A947-70E740481C1C}">
+                <a14:useLocalDpi xmlns:a14="http://schemas.microsoft.com/office/drawing/2010/main" val="0"/>
+              </a:ext>
+            </a:extLst>
+          </a:blip>
+          <a:stretch>
+            <a:fillRect/>
+          </a:stretch>
+        </p:blipFill>
+        <p:spPr>
+          <a:xfrm>
+            <a:off x="1445651" y="2691300"/>
+            <a:ext cx="7188338" cy="3809078"/>
+          </a:xfrm>
+          <a:prstGeom prst="rect">
+            <a:avLst/>
+          </a:prstGeom>
+        </p:spPr>
+      </p:pic>
+    </p:spTree>
+    <p:extLst>
+      <p:ext uri="{BB962C8B-B14F-4D97-AF65-F5344CB8AC3E}">
+        <p14:creationId xmlns:p14="http://schemas.microsoft.com/office/powerpoint/2010/main" val="3717095842"/>
+      </p:ext>
+    </p:extLst>
+  </p:cSld>
+  <p:clrMapOvr>
+    <a:masterClrMapping/>
+  </p:clrMapOvr>
+  <p:timing>
+    <p:tnLst>
+      <p:par>
+        <p:cTn id="1" dur="indefinite" restart="never" nodeType="tmRoot"/>
+      </p:par>
+    </p:tnLst>
+  </p:timing>
+</p:sld>
+</file>
+
+<file path=ppt/slides/slide17.xml><?xml version="1.0" encoding="utf-8"?>
+<p:sld xmlns:a="http://schemas.openxmlformats.org/drawingml/2006/main" xmlns:r="http://schemas.openxmlformats.org/officeDocument/2006/relationships" xmlns:p="http://schemas.openxmlformats.org/presentationml/2006/main">
+  <p:cSld>
+    <p:spTree>
+      <p:nvGrpSpPr>
+        <p:cNvPr id="1" name=""/>
+        <p:cNvGrpSpPr/>
+        <p:nvPr/>
+      </p:nvGrpSpPr>
+      <p:grpSpPr>
+        <a:xfrm>
+          <a:off x="0" y="0"/>
+          <a:ext cx="0" cy="0"/>
+          <a:chOff x="0" y="0"/>
+          <a:chExt cx="0" cy="0"/>
+        </a:xfrm>
+      </p:grpSpPr>
+      <p:sp>
+        <p:nvSpPr>
+          <p:cNvPr id="3" name="Text Placeholder 2"/>
+          <p:cNvSpPr>
+            <a:spLocks noGrp="1"/>
+          </p:cNvSpPr>
+          <p:nvPr>
+            <p:ph type="body"/>
+          </p:nvPr>
+        </p:nvSpPr>
+        <p:spPr/>
+        <p:txBody>
+          <a:bodyPr/>
+          <a:lstStyle/>
+          <a:p>
+            <a:r>
+              <a:rPr lang="en-US" dirty="0" smtClean="0"/>
+              <a:t>Any questions? </a:t>
+            </a:r>
+          </a:p>
+          <a:p>
+            <a:r>
+              <a:rPr lang="en-US" dirty="0" smtClean="0"/>
+              <a:t>We’ll also take a quick look at the Camden Coalition’s </a:t>
+            </a:r>
+            <a:r>
+              <a:rPr lang="en-US" dirty="0"/>
+              <a:t>GitHub organization page: https://github.com/CamdenCoalitionOfHealthcareProviders</a:t>
+            </a:r>
+          </a:p>
+        </p:txBody>
+      </p:sp>
+      <p:sp>
+        <p:nvSpPr>
+          <p:cNvPr id="2" name="Title 1"/>
+          <p:cNvSpPr>
+            <a:spLocks noGrp="1"/>
+          </p:cNvSpPr>
+          <p:nvPr>
+            <p:ph type="title"/>
+          </p:nvPr>
+        </p:nvSpPr>
+        <p:spPr/>
+        <p:txBody>
+          <a:bodyPr/>
+          <a:lstStyle/>
+          <a:p>
+            <a:r>
+              <a:rPr lang="en-US" dirty="0" smtClean="0"/>
+              <a:t>That’s the basics of GitHub</a:t>
+            </a:r>
+            <a:endParaRPr lang="en-US" dirty="0"/>
+          </a:p>
+        </p:txBody>
+      </p:sp>
+    </p:spTree>
+    <p:extLst>
+      <p:ext uri="{BB962C8B-B14F-4D97-AF65-F5344CB8AC3E}">
+        <p14:creationId xmlns:p14="http://schemas.microsoft.com/office/powerpoint/2010/main" val="2759490953"/>
+      </p:ext>
+    </p:extLst>
+  </p:cSld>
+  <p:clrMapOvr>
+    <a:masterClrMapping/>
+  </p:clrMapOvr>
+  <p:timing>
+    <p:tnLst>
+      <p:par>
+        <p:cTn id="1" dur="indefinite" restart="never" nodeType="tmRoot"/>
       </p:par>
     </p:tnLst>
   </p:timing>
@@ -4180,8 +6391,8 @@
         </p:nvSpPr>
         <p:spPr>
           <a:xfrm>
-            <a:off x="504000" y="1769040"/>
-            <a:ext cx="9071640" cy="4384440"/>
+            <a:off x="504000" y="1769039"/>
+            <a:ext cx="9071640" cy="5118777"/>
           </a:xfrm>
           <a:prstGeom prst="rect">
             <a:avLst/>
@@ -4402,7 +6613,35 @@
                 </a:uFill>
                 <a:latin typeface="Arial"/>
               </a:rPr>
-              <a:t>Linus Torvalds also created Linux, an open source operating system in the early 1990s that’s actively developed and used in Android devices and other computer hardware</a:t>
+              <a:t>Linus Torvalds also created Linux, an open source operating system in the early 1990s that’s actively developed </a:t>
+            </a:r>
+            <a:r>
+              <a:rPr lang="en-US" sz="2800" b="0" strike="noStrike" spc="-1" dirty="0" smtClean="0">
+                <a:solidFill>
+                  <a:srgbClr val="000000"/>
+                </a:solidFill>
+                <a:uFill>
+                  <a:solidFill>
+                    <a:srgbClr val="FFFFFF"/>
+                  </a:solidFill>
+                </a:uFill>
+                <a:latin typeface="Arial"/>
+              </a:rPr>
+              <a:t>today and </a:t>
+            </a:r>
+            <a:r>
+              <a:rPr lang="en-US" sz="2800" b="0" strike="noStrike" spc="-1" dirty="0">
+                <a:solidFill>
+                  <a:srgbClr val="000000"/>
+                </a:solidFill>
+                <a:uFill>
+                  <a:solidFill>
+                    <a:srgbClr val="FFFFFF"/>
+                  </a:solidFill>
+                </a:uFill>
+                <a:latin typeface="Arial"/>
+              </a:rPr>
+              <a:t>used in Android devices and other computer hardware</a:t>
             </a:r>
           </a:p>
         </p:txBody>
@@ -4491,6 +6730,34 @@
       </p:grpSpPr>
       <p:sp>
         <p:nvSpPr>
+          <p:cNvPr id="2" name="Title 1"/>
+          <p:cNvSpPr>
+            <a:spLocks noGrp="1"/>
+          </p:cNvSpPr>
+          <p:nvPr>
+            <p:ph type="title"/>
+          </p:nvPr>
+        </p:nvSpPr>
+        <p:spPr/>
+        <p:txBody>
+          <a:bodyPr/>
+          <a:lstStyle/>
+          <a:p>
+            <a:pPr algn="ctr"/>
+            <a:r>
+              <a:rPr lang="en-US" dirty="0" err="1" smtClean="0"/>
+              <a:t>Git</a:t>
+            </a:r>
+            <a:r>
+              <a:rPr lang="en-US" dirty="0" smtClean="0"/>
+              <a:t>: Cons (And Pros)</a:t>
+            </a:r>
+            <a:endParaRPr lang="en-US" dirty="0"/>
+          </a:p>
+        </p:txBody>
+      </p:sp>
+      <p:sp>
+        <p:nvSpPr>
           <p:cNvPr id="3" name="Text Placeholder 2"/>
           <p:cNvSpPr>
             <a:spLocks noGrp="1"/>
@@ -4563,14 +6830,14 @@
           <a:p>
             <a:pPr lvl="1"/>
             <a:r>
-              <a:rPr lang="en-US" sz="2200" dirty="0" smtClean="0"/>
+              <a:rPr lang="en-US" dirty="0" smtClean="0"/>
               <a:t>That said, there are a lot of ways to do the same thing</a:t>
             </a:r>
           </a:p>
           <a:p>
             <a:pPr lvl="2"/>
             <a:r>
-              <a:rPr lang="en-US" sz="1800" dirty="0" smtClean="0"/>
+              <a:rPr lang="en-US" dirty="0" smtClean="0"/>
               <a:t>This depends on how you interact with GitHub</a:t>
             </a:r>
           </a:p>
@@ -4585,34 +6852,6 @@
           <a:p>
             <a:pPr lvl="1"/>
             <a:endParaRPr lang="en-US" dirty="0" smtClean="0"/>
-          </a:p>
-        </p:txBody>
-      </p:sp>
-      <p:sp>
-        <p:nvSpPr>
-          <p:cNvPr id="2" name="Title 1"/>
-          <p:cNvSpPr>
-            <a:spLocks noGrp="1"/>
-          </p:cNvSpPr>
-          <p:nvPr>
-            <p:ph type="title"/>
-          </p:nvPr>
-        </p:nvSpPr>
-        <p:spPr/>
-        <p:txBody>
-          <a:bodyPr/>
-          <a:lstStyle/>
-          <a:p>
-            <a:pPr algn="ctr"/>
-            <a:r>
-              <a:rPr lang="en-US" dirty="0" err="1" smtClean="0"/>
-              <a:t>Git</a:t>
-            </a:r>
-            <a:r>
-              <a:rPr lang="en-US" dirty="0" smtClean="0"/>
-              <a:t>: Cons (And Pros)</a:t>
-            </a:r>
-            <a:endParaRPr lang="en-US" dirty="0"/>
           </a:p>
         </p:txBody>
       </p:sp>
@@ -4970,7 +7209,7 @@
           <p:nvPr/>
         </p:nvPicPr>
         <p:blipFill>
-          <a:blip r:embed="rId2">
+          <a:blip r:embed="rId3">
             <a:extLst>
               <a:ext uri="{28A0092B-C50C-407E-A947-70E740481C1C}">
                 <a14:useLocalDpi xmlns:a14="http://schemas.microsoft.com/office/drawing/2010/main" val="0"/>
@@ -5000,7 +7239,7 @@
           <p:nvPr/>
         </p:nvPicPr>
         <p:blipFill>
-          <a:blip r:embed="rId3" cstate="print">
+          <a:blip r:embed="rId4" cstate="print">
             <a:extLst>
               <a:ext uri="{28A0092B-C50C-407E-A947-70E740481C1C}">
                 <a14:useLocalDpi xmlns:a14="http://schemas.microsoft.com/office/drawing/2010/main" val="0"/>
@@ -5030,7 +7269,7 @@
           <p:nvPr/>
         </p:nvPicPr>
         <p:blipFill>
-          <a:blip r:embed="rId4" cstate="print">
+          <a:blip r:embed="rId5" cstate="print">
             <a:extLst>
               <a:ext uri="{28A0092B-C50C-407E-A947-70E740481C1C}">
                 <a14:useLocalDpi xmlns:a14="http://schemas.microsoft.com/office/drawing/2010/main" val="0"/>
@@ -5295,7 +7534,7 @@
           <p:nvPr/>
         </p:nvPicPr>
         <p:blipFill>
-          <a:blip r:embed="rId2">
+          <a:blip r:embed="rId3">
             <a:extLst>
               <a:ext uri="{28A0092B-C50C-407E-A947-70E740481C1C}">
                 <a14:useLocalDpi xmlns:a14="http://schemas.microsoft.com/office/drawing/2010/main" val="0"/>
@@ -5486,7 +7725,7 @@
           <p:nvPr/>
         </p:nvPicPr>
         <p:blipFill>
-          <a:blip r:embed="rId2">
+          <a:blip r:embed="rId3">
             <a:extLst>
               <a:ext uri="{28A0092B-C50C-407E-A947-70E740481C1C}">
                 <a14:useLocalDpi xmlns:a14="http://schemas.microsoft.com/office/drawing/2010/main" val="0"/>
@@ -5680,7 +7919,7 @@
           <p:nvPr/>
         </p:nvPicPr>
         <p:blipFill>
-          <a:blip r:embed="rId2">
+          <a:blip r:embed="rId3">
             <a:extLst>
               <a:ext uri="{28A0092B-C50C-407E-A947-70E740481C1C}">
                 <a14:useLocalDpi xmlns:a14="http://schemas.microsoft.com/office/drawing/2010/main" val="0"/>
@@ -5818,8 +8057,8 @@
         </p:nvSpPr>
         <p:spPr>
           <a:xfrm>
-            <a:off x="504000" y="1769040"/>
-            <a:ext cx="9071640" cy="4384440"/>
+            <a:off x="504000" y="1769039"/>
+            <a:ext cx="9071640" cy="5218169"/>
           </a:xfrm>
           <a:prstGeom prst="rect">
             <a:avLst/>
@@ -5842,6 +8081,20 @@
               <a:buChar char=""/>
             </a:pPr>
             <a:r>
+              <a:rPr lang="en-US" sz="2800" b="0" strike="noStrike" spc="-1" dirty="0" err="1" smtClean="0">
+                <a:solidFill>
+                  <a:srgbClr val="000000"/>
+                </a:solidFill>
+                <a:uFill>
+                  <a:solidFill>
+                    <a:srgbClr val="FFFFFF"/>
+                  </a:solidFill>
+                </a:uFill>
+                <a:latin typeface="Arial"/>
+              </a:rPr>
+              <a:t>Git</a:t>
+            </a:r>
+            <a:r>
               <a:rPr lang="en-US" sz="2800" b="0" strike="noStrike" spc="-1" dirty="0" smtClean="0">
                 <a:solidFill>
                   <a:srgbClr val="000000"/>
@@ -5853,35 +8106,7 @@
                 </a:uFill>
                 <a:latin typeface="Arial"/>
               </a:rPr>
-              <a:t>Following slides show me using </a:t>
-            </a:r>
-            <a:r>
-              <a:rPr lang="en-US" sz="2800" b="0" strike="noStrike" spc="-1" dirty="0" err="1" smtClean="0">
-                <a:solidFill>
-                  <a:srgbClr val="000000"/>
-                </a:solidFill>
-                <a:uFill>
-                  <a:solidFill>
-                    <a:srgbClr val="FFFFFF"/>
-                  </a:solidFill>
-                </a:uFill>
-                <a:latin typeface="Arial"/>
-              </a:rPr>
-              <a:t>Git</a:t>
-            </a:r>
-            <a:r>
-              <a:rPr lang="en-US" sz="2800" b="0" strike="noStrike" spc="-1" dirty="0" smtClean="0">
-                <a:solidFill>
-                  <a:srgbClr val="000000"/>
-                </a:solidFill>
-                <a:uFill>
-                  <a:solidFill>
-                    <a:srgbClr val="FFFFFF"/>
-                  </a:solidFill>
-                </a:uFill>
-                <a:latin typeface="Arial"/>
-              </a:rPr>
-              <a:t> and GitHub tracking the changes of making this </a:t>
+              <a:t> and GitHub use a lot of version control terminology that’s only used in version control.</a:t>
             </a:r>
           </a:p>
           <a:p>
@@ -5893,51 +8118,20 @@
               <a:buFont typeface="Symbol" charset="2"/>
               <a:buChar char=""/>
             </a:pPr>
-            <a:r>
-              <a:rPr lang="en-US" sz="2800" b="0" strike="noStrike" spc="-1" dirty="0" smtClean="0">
-                <a:solidFill>
-                  <a:srgbClr val="000000"/>
-                </a:solidFill>
-                <a:uFill>
-                  <a:solidFill>
-                    <a:srgbClr val="FFFFFF"/>
-                  </a:solidFill>
-                </a:uFill>
-                <a:latin typeface="Arial"/>
-              </a:rPr>
-              <a:t>Repository </a:t>
-            </a:r>
-            <a:r>
-              <a:rPr lang="en-US" sz="2800" b="0" strike="noStrike" spc="-1" dirty="0">
-                <a:solidFill>
-                  <a:srgbClr val="000000"/>
-                </a:solidFill>
-                <a:uFill>
-                  <a:solidFill>
-                    <a:srgbClr val="FFFFFF"/>
-                  </a:solidFill>
-                </a:uFill>
-                <a:latin typeface="Arial"/>
-              </a:rPr>
-              <a:t>(“Repo</a:t>
-            </a:r>
-            <a:r>
-              <a:rPr lang="en-US" sz="2800" b="0" strike="noStrike" spc="-1" dirty="0" smtClean="0">
-                <a:solidFill>
-                  <a:srgbClr val="000000"/>
-                </a:solidFill>
-                <a:uFill>
-                  <a:solidFill>
-                    <a:srgbClr val="FFFFFF"/>
-                  </a:solidFill>
-                </a:uFill>
-                <a:latin typeface="Arial"/>
-              </a:rPr>
-              <a:t>”)</a:t>
-            </a:r>
-          </a:p>
-          <a:p>
-            <a:pPr marL="1321200" lvl="2" indent="-324000">
+            <a:endParaRPr lang="en-US" sz="2800" b="0" strike="noStrike" spc="-1" dirty="0" smtClean="0">
+              <a:solidFill>
+                <a:srgbClr val="000000"/>
+              </a:solidFill>
+              <a:uFill>
+                <a:solidFill>
+                  <a:srgbClr val="FFFFFF"/>
+                </a:solidFill>
+              </a:uFill>
+              <a:latin typeface="Arial"/>
+            </a:endParaRPr>
+          </a:p>
+          <a:p>
+            <a:pPr marL="864000" lvl="1" indent="-324000">
               <a:buClr>
                 <a:srgbClr val="000000"/>
               </a:buClr>
@@ -5957,7 +8151,7 @@
                 </a:uFill>
                 <a:latin typeface="Arial"/>
               </a:rPr>
-              <a:t>Repositories is the name for the folder where the files you are tracking are hosted</a:t>
+              <a:t>Meaning = Lots of very specific words with very specific meanings.</a:t>
             </a:r>
           </a:p>
           <a:p>
@@ -5969,21 +8163,7 @@
               <a:buFont typeface="Symbol" charset="2"/>
               <a:buChar char=""/>
             </a:pPr>
-            <a:r>
-              <a:rPr lang="en-US" sz="2800" b="0" strike="noStrike" spc="-1" dirty="0" smtClean="0">
-                <a:solidFill>
-                  <a:srgbClr val="000000"/>
-                </a:solidFill>
-                <a:uFill>
-                  <a:solidFill>
-                    <a:srgbClr val="FFFFFF"/>
-                  </a:solidFill>
-                </a:uFill>
-                <a:latin typeface="Arial"/>
-              </a:rPr>
-              <a:t>Cloning/Initializing a Repo</a:t>
-            </a:r>
-            <a:endParaRPr lang="en-US" sz="2800" b="0" strike="noStrike" spc="-1" dirty="0">
+            <a:endParaRPr lang="en-US" sz="2800" b="0" strike="noStrike" spc="-1" dirty="0" smtClean="0">
               <a:solidFill>
                 <a:srgbClr val="000000"/>
               </a:solidFill>
@@ -6005,7 +8185,7 @@
               <a:buChar char=""/>
             </a:pPr>
             <a:r>
-              <a:rPr lang="en-US" sz="2800" b="0" strike="noStrike" spc="-1" dirty="0">
+              <a:rPr lang="en-US" sz="2800" b="0" strike="noStrike" spc="-1" dirty="0" smtClean="0">
                 <a:solidFill>
                   <a:srgbClr val="000000"/>
                 </a:solidFill>
@@ -6016,66 +8196,35 @@
                 </a:uFill>
                 <a:latin typeface="Arial"/>
               </a:rPr>
-              <a:t>Local/Remote</a:t>
-            </a:r>
-          </a:p>
-          <a:p>
-            <a:pPr marL="864000" lvl="1" indent="-324000">
-              <a:buClr>
-                <a:srgbClr val="000000"/>
-              </a:buClr>
-              <a:buSzPct val="75000"/>
-              <a:buFont typeface="Symbol" charset="2"/>
-              <a:buChar char=""/>
-            </a:pPr>
-            <a:r>
-              <a:rPr lang="en-US" sz="2800" spc="-1" dirty="0">
-                <a:solidFill>
-                  <a:srgbClr val="000000"/>
-                </a:solidFill>
-                <a:uFill>
-                  <a:solidFill>
-                    <a:srgbClr val="FFFFFF"/>
-                  </a:solidFill>
-                </a:uFill>
-              </a:rPr>
-              <a:t>Pull Request</a:t>
-            </a:r>
-          </a:p>
-          <a:p>
-            <a:pPr marL="864000" lvl="1" indent="-324000">
-              <a:buClr>
-                <a:srgbClr val="000000"/>
-              </a:buClr>
-              <a:buSzPct val="75000"/>
-              <a:buFont typeface="Symbol" charset="2"/>
-              <a:buChar char=""/>
-            </a:pPr>
-            <a:r>
-              <a:rPr lang="en-US" sz="2800" spc="-1" dirty="0">
-                <a:solidFill>
-                  <a:srgbClr val="000000"/>
-                </a:solidFill>
-                <a:uFill>
-                  <a:solidFill>
-                    <a:srgbClr val="FFFFFF"/>
-                  </a:solidFill>
-                </a:uFill>
-              </a:rPr>
-              <a:t>Visual Representation of </a:t>
-            </a:r>
-            <a:r>
-              <a:rPr lang="en-US" sz="2800" spc="-1" dirty="0" smtClean="0">
-                <a:solidFill>
-                  <a:srgbClr val="000000"/>
-                </a:solidFill>
-                <a:uFill>
-                  <a:solidFill>
-                    <a:srgbClr val="FFFFFF"/>
-                  </a:solidFill>
-                </a:uFill>
-              </a:rPr>
-              <a:t>Branches</a:t>
+              <a:t>The following </a:t>
+            </a:r>
+            <a:r>
+              <a:rPr lang="en-US" sz="2800" b="0" strike="noStrike" spc="-1" dirty="0" smtClean="0">
+                <a:solidFill>
+                  <a:srgbClr val="000000"/>
+                </a:solidFill>
+                <a:uFill>
+                  <a:solidFill>
+                    <a:srgbClr val="FFFFFF"/>
+                  </a:solidFill>
+                </a:uFill>
+                <a:latin typeface="Arial"/>
+              </a:rPr>
+              <a:t>slides </a:t>
+            </a:r>
+            <a:r>
+              <a:rPr lang="en-US" sz="2800" b="0" strike="noStrike" spc="-1" dirty="0" smtClean="0">
+                <a:solidFill>
+                  <a:srgbClr val="000000"/>
+                </a:solidFill>
+                <a:uFill>
+                  <a:solidFill>
+                    <a:srgbClr val="FFFFFF"/>
+                  </a:solidFill>
+                </a:uFill>
+                <a:latin typeface="Arial"/>
+              </a:rPr>
+              <a:t>show one way in which you can use GitHub </a:t>
             </a:r>
             <a:endParaRPr lang="en-US" sz="2800" b="0" strike="noStrike" spc="-1" dirty="0" smtClean="0">
               <a:solidFill>
@@ -6088,68 +8237,6 @@
               </a:uFill>
               <a:latin typeface="Arial"/>
             </a:endParaRPr>
-          </a:p>
-          <a:p>
-            <a:pPr marL="864000" lvl="1" indent="-324000">
-              <a:buClr>
-                <a:srgbClr val="000000"/>
-              </a:buClr>
-              <a:buSzPct val="75000"/>
-              <a:buFont typeface="Symbol" charset="2"/>
-              <a:buChar char=""/>
-            </a:pPr>
-            <a:r>
-              <a:rPr lang="en-US" sz="2800" b="0" strike="noStrike" spc="-1" dirty="0" smtClean="0">
-                <a:solidFill>
-                  <a:srgbClr val="000000"/>
-                </a:solidFill>
-                <a:uFill>
-                  <a:solidFill>
-                    <a:srgbClr val="FFFFFF"/>
-                  </a:solidFill>
-                </a:uFill>
-                <a:latin typeface="Arial"/>
-              </a:rPr>
-              <a:t>Pull </a:t>
-            </a:r>
-            <a:r>
-              <a:rPr lang="en-US" sz="2800" b="0" strike="noStrike" spc="-1" dirty="0">
-                <a:solidFill>
-                  <a:srgbClr val="000000"/>
-                </a:solidFill>
-                <a:uFill>
-                  <a:solidFill>
-                    <a:srgbClr val="FFFFFF"/>
-                  </a:solidFill>
-                </a:uFill>
-                <a:latin typeface="Arial"/>
-              </a:rPr>
-              <a:t>Request</a:t>
-            </a:r>
-          </a:p>
-          <a:p>
-            <a:pPr marL="864000" lvl="1" indent="-324000">
-              <a:buClr>
-                <a:srgbClr val="000000"/>
-              </a:buClr>
-              <a:buSzPct val="75000"/>
-              <a:buFont typeface="Symbol" charset="2"/>
-              <a:buChar char=""/>
-            </a:pPr>
-            <a:r>
-              <a:rPr lang="en-US" sz="2800" b="0" strike="noStrike" spc="-1" dirty="0">
-                <a:solidFill>
-                  <a:srgbClr val="000000"/>
-                </a:solidFill>
-                <a:uFill>
-                  <a:solidFill>
-                    <a:srgbClr val="FFFFFF"/>
-                  </a:solidFill>
-                </a:uFill>
-                <a:latin typeface="Arial"/>
-              </a:rPr>
-              <a:t>Branches</a:t>
-            </a:r>
           </a:p>
         </p:txBody>
       </p:sp>
@@ -6411,4 +8498,265 @@
   <a:objectDefaults/>
   <a:extraClrSchemeLst/>
 </a:theme>
+</file>
+
+<file path=ppt/theme/theme2.xml><?xml version="1.0" encoding="utf-8"?>
+<a:theme xmlns:a="http://schemas.openxmlformats.org/drawingml/2006/main" name="Office Theme">
+  <a:themeElements>
+    <a:clrScheme name="Office">
+      <a:dk1>
+        <a:sysClr val="windowText" lastClr="000000"/>
+      </a:dk1>
+      <a:lt1>
+        <a:sysClr val="window" lastClr="FFFFFF"/>
+      </a:lt1>
+      <a:dk2>
+        <a:srgbClr val="44546A"/>
+      </a:dk2>
+      <a:lt2>
+        <a:srgbClr val="E7E6E6"/>
+      </a:lt2>
+      <a:accent1>
+        <a:srgbClr val="5B9BD5"/>
+      </a:accent1>
+      <a:accent2>
+        <a:srgbClr val="ED7D31"/>
+      </a:accent2>
+      <a:accent3>
+        <a:srgbClr val="A5A5A5"/>
+      </a:accent3>
+      <a:accent4>
+        <a:srgbClr val="FFC000"/>
+      </a:accent4>
+      <a:accent5>
+        <a:srgbClr val="4472C4"/>
+      </a:accent5>
+      <a:accent6>
+        <a:srgbClr val="70AD47"/>
+      </a:accent6>
+      <a:hlink>
+        <a:srgbClr val="0563C1"/>
+      </a:hlink>
+      <a:folHlink>
+        <a:srgbClr val="954F72"/>
+      </a:folHlink>
+    </a:clrScheme>
+    <a:fontScheme name="Office">
+      <a:majorFont>
+        <a:latin typeface="Calibri Light" panose="020F0302020204030204"/>
+        <a:ea typeface=""/>
+        <a:cs typeface=""/>
+        <a:font script="Jpan" typeface="ＭＳ Ｐゴシック"/>
+        <a:font script="Hang" typeface="맑은 고딕"/>
+        <a:font script="Hans" typeface="宋体"/>
+        <a:font script="Hant" typeface="新細明體"/>
+        <a:font script="Arab" typeface="Times New Roman"/>
+        <a:font script="Hebr" typeface="Times New Roman"/>
+        <a:font script="Thai" typeface="Angsana New"/>
+        <a:font script="Ethi" typeface="Nyala"/>
+        <a:font script="Beng" typeface="Vrinda"/>
+        <a:font script="Gujr" typeface="Shruti"/>
+        <a:font script="Khmr" typeface="MoolBoran"/>
+        <a:font script="Knda" typeface="Tunga"/>
+        <a:font script="Guru" typeface="Raavi"/>
+        <a:font script="Cans" typeface="Euphemia"/>
+        <a:font script="Cher" typeface="Plantagenet Cherokee"/>
+        <a:font script="Yiii" typeface="Microsoft Yi Baiti"/>
+        <a:font script="Tibt" typeface="Microsoft Himalaya"/>
+        <a:font script="Thaa" typeface="MV Boli"/>
+        <a:font script="Deva" typeface="Mangal"/>
+        <a:font script="Telu" typeface="Gautami"/>
+        <a:font script="Taml" typeface="Latha"/>
+        <a:font script="Syrc" typeface="Estrangelo Edessa"/>
+        <a:font script="Orya" typeface="Kalinga"/>
+        <a:font script="Mlym" typeface="Kartika"/>
+        <a:font script="Laoo" typeface="DokChampa"/>
+        <a:font script="Sinh" typeface="Iskoola Pota"/>
+        <a:font script="Mong" typeface="Mongolian Baiti"/>
+        <a:font script="Viet" typeface="Times New Roman"/>
+        <a:font script="Uigh" typeface="Microsoft Uighur"/>
+        <a:font script="Geor" typeface="Sylfaen"/>
+      </a:majorFont>
+      <a:minorFont>
+        <a:latin typeface="Calibri" panose="020F0502020204030204"/>
+        <a:ea typeface=""/>
+        <a:cs typeface=""/>
+        <a:font script="Jpan" typeface="ＭＳ Ｐゴシック"/>
+        <a:font script="Hang" typeface="맑은 고딕"/>
+        <a:font script="Hans" typeface="宋体"/>
+        <a:font script="Hant" typeface="新細明體"/>
+        <a:font script="Arab" typeface="Arial"/>
+        <a:font script="Hebr" typeface="Arial"/>
+        <a:font script="Thai" typeface="Cordia New"/>
+        <a:font script="Ethi" typeface="Nyala"/>
+        <a:font script="Beng" typeface="Vrinda"/>
+        <a:font script="Gujr" typeface="Shruti"/>
+        <a:font script="Khmr" typeface="DaunPenh"/>
+        <a:font script="Knda" typeface="Tunga"/>
+        <a:font script="Guru" typeface="Raavi"/>
+        <a:font script="Cans" typeface="Euphemia"/>
+        <a:font script="Cher" typeface="Plantagenet Cherokee"/>
+        <a:font script="Yiii" typeface="Microsoft Yi Baiti"/>
+        <a:font script="Tibt" typeface="Microsoft Himalaya"/>
+        <a:font script="Thaa" typeface="MV Boli"/>
+        <a:font script="Deva" typeface="Mangal"/>
+        <a:font script="Telu" typeface="Gautami"/>
+        <a:font script="Taml" typeface="Latha"/>
+        <a:font script="Syrc" typeface="Estrangelo Edessa"/>
+        <a:font script="Orya" typeface="Kalinga"/>
+        <a:font script="Mlym" typeface="Kartika"/>
+        <a:font script="Laoo" typeface="DokChampa"/>
+        <a:font script="Sinh" typeface="Iskoola Pota"/>
+        <a:font script="Mong" typeface="Mongolian Baiti"/>
+        <a:font script="Viet" typeface="Arial"/>
+        <a:font script="Uigh" typeface="Microsoft Uighur"/>
+        <a:font script="Geor" typeface="Sylfaen"/>
+      </a:minorFont>
+    </a:fontScheme>
+    <a:fmtScheme name="Office">
+      <a:fillStyleLst>
+        <a:solidFill>
+          <a:schemeClr val="phClr"/>
+        </a:solidFill>
+        <a:gradFill rotWithShape="1">
+          <a:gsLst>
+            <a:gs pos="0">
+              <a:schemeClr val="phClr">
+                <a:lumMod val="110000"/>
+                <a:satMod val="105000"/>
+                <a:tint val="67000"/>
+              </a:schemeClr>
+            </a:gs>
+            <a:gs pos="50000">
+              <a:schemeClr val="phClr">
+                <a:lumMod val="105000"/>
+                <a:satMod val="103000"/>
+                <a:tint val="73000"/>
+              </a:schemeClr>
+            </a:gs>
+            <a:gs pos="100000">
+              <a:schemeClr val="phClr">
+                <a:lumMod val="105000"/>
+                <a:satMod val="109000"/>
+                <a:tint val="81000"/>
+              </a:schemeClr>
+            </a:gs>
+          </a:gsLst>
+          <a:lin ang="5400000" scaled="0"/>
+        </a:gradFill>
+        <a:gradFill rotWithShape="1">
+          <a:gsLst>
+            <a:gs pos="0">
+              <a:schemeClr val="phClr">
+                <a:satMod val="103000"/>
+                <a:lumMod val="102000"/>
+                <a:tint val="94000"/>
+              </a:schemeClr>
+            </a:gs>
+            <a:gs pos="50000">
+              <a:schemeClr val="phClr">
+                <a:satMod val="110000"/>
+                <a:lumMod val="100000"/>
+                <a:shade val="100000"/>
+              </a:schemeClr>
+            </a:gs>
+            <a:gs pos="100000">
+              <a:schemeClr val="phClr">
+                <a:lumMod val="99000"/>
+                <a:satMod val="120000"/>
+                <a:shade val="78000"/>
+              </a:schemeClr>
+            </a:gs>
+          </a:gsLst>
+          <a:lin ang="5400000" scaled="0"/>
+        </a:gradFill>
+      </a:fillStyleLst>
+      <a:lnStyleLst>
+        <a:ln w="6350" cap="flat" cmpd="sng" algn="ctr">
+          <a:solidFill>
+            <a:schemeClr val="phClr"/>
+          </a:solidFill>
+          <a:prstDash val="solid"/>
+          <a:miter lim="800000"/>
+        </a:ln>
+        <a:ln w="12700" cap="flat" cmpd="sng" algn="ctr">
+          <a:solidFill>
+            <a:schemeClr val="phClr"/>
+          </a:solidFill>
+          <a:prstDash val="solid"/>
+          <a:miter lim="800000"/>
+        </a:ln>
+        <a:ln w="19050" cap="flat" cmpd="sng" algn="ctr">
+          <a:solidFill>
+            <a:schemeClr val="phClr"/>
+          </a:solidFill>
+          <a:prstDash val="solid"/>
+          <a:miter lim="800000"/>
+        </a:ln>
+      </a:lnStyleLst>
+      <a:effectStyleLst>
+        <a:effectStyle>
+          <a:effectLst/>
+        </a:effectStyle>
+        <a:effectStyle>
+          <a:effectLst/>
+        </a:effectStyle>
+        <a:effectStyle>
+          <a:effectLst>
+            <a:outerShdw blurRad="57150" dist="19050" dir="5400000" algn="ctr" rotWithShape="0">
+              <a:srgbClr val="000000">
+                <a:alpha val="63000"/>
+              </a:srgbClr>
+            </a:outerShdw>
+          </a:effectLst>
+        </a:effectStyle>
+      </a:effectStyleLst>
+      <a:bgFillStyleLst>
+        <a:solidFill>
+          <a:schemeClr val="phClr"/>
+        </a:solidFill>
+        <a:solidFill>
+          <a:schemeClr val="phClr">
+            <a:tint val="95000"/>
+            <a:satMod val="170000"/>
+          </a:schemeClr>
+        </a:solidFill>
+        <a:gradFill rotWithShape="1">
+          <a:gsLst>
+            <a:gs pos="0">
+              <a:schemeClr val="phClr">
+                <a:tint val="93000"/>
+                <a:satMod val="150000"/>
+                <a:shade val="98000"/>
+                <a:lumMod val="102000"/>
+              </a:schemeClr>
+            </a:gs>
+            <a:gs pos="50000">
+              <a:schemeClr val="phClr">
+                <a:tint val="98000"/>
+                <a:satMod val="130000"/>
+                <a:shade val="90000"/>
+                <a:lumMod val="103000"/>
+              </a:schemeClr>
+            </a:gs>
+            <a:gs pos="100000">
+              <a:schemeClr val="phClr">
+                <a:shade val="63000"/>
+                <a:satMod val="120000"/>
+              </a:schemeClr>
+            </a:gs>
+          </a:gsLst>
+          <a:lin ang="5400000" scaled="0"/>
+        </a:gradFill>
+      </a:bgFillStyleLst>
+    </a:fmtScheme>
+  </a:themeElements>
+  <a:objectDefaults/>
+  <a:extraClrSchemeLst/>
+  <a:extLst>
+    <a:ext uri="{05A4C25C-085E-4340-85A3-A5531E510DB2}">
+      <thm15:themeFamily xmlns:thm15="http://schemas.microsoft.com/office/thememl/2012/main" name="Office Theme" id="{62F939B6-93AF-4DB8-9C6B-D6C7DFDC589F}" vid="{4A3C46E8-61CC-4603-A589-7422A47A8E4A}"/>
+    </a:ext>
+  </a:extLst>
+</a:theme>
 </file>
</xml_diff>